<commit_message>
Unity version downgrade & 'AddForce' be replaced to '+velocity'
</commit_message>
<xml_diff>
--- a/중간 프로젝트 상세 계획서 - 2조.pptx
+++ b/중간 프로젝트 상세 계획서 - 2조.pptx
@@ -163,6 +163,1760 @@
 <file path=ppt/changesInfos/changesInfo1.xml><?xml version="1.0" encoding="utf-8"?>
 <pc:chgInfo xmlns:a="http://schemas.openxmlformats.org/drawingml/2006/main" xmlns:r="http://schemas.openxmlformats.org/officeDocument/2006/relationships" xmlns:ac="http://schemas.microsoft.com/office/drawing/2013/main/command" xmlns:pc="http://schemas.microsoft.com/office/powerpoint/2013/main/command">
   <pc:docChgLst>
+    <pc:chgData name="윤성재" userId="76c7d8b9-0ed6-42c3-8827-8b2f94b0779a" providerId="ADAL" clId="{BE45B969-9097-4DAA-9E48-A61D72BE3E25}"/>
+    <pc:docChg chg="undo custSel mod addSld delSld modSld sldOrd">
+      <pc:chgData name="윤성재" userId="76c7d8b9-0ed6-42c3-8827-8b2f94b0779a" providerId="ADAL" clId="{BE45B969-9097-4DAA-9E48-A61D72BE3E25}" dt="2020-09-29T07:25:35.675" v="6128" actId="20577"/>
+      <pc:docMkLst>
+        <pc:docMk/>
+      </pc:docMkLst>
+      <pc:sldChg chg="modSp mod">
+        <pc:chgData name="윤성재" userId="76c7d8b9-0ed6-42c3-8827-8b2f94b0779a" providerId="ADAL" clId="{BE45B969-9097-4DAA-9E48-A61D72BE3E25}" dt="2020-09-28T06:42:01.853" v="31" actId="403"/>
+        <pc:sldMkLst>
+          <pc:docMk/>
+          <pc:sldMk cId="2089202195" sldId="256"/>
+        </pc:sldMkLst>
+        <pc:spChg chg="mod">
+          <ac:chgData name="윤성재" userId="76c7d8b9-0ed6-42c3-8827-8b2f94b0779a" providerId="ADAL" clId="{BE45B969-9097-4DAA-9E48-A61D72BE3E25}" dt="2020-09-28T06:41:50.980" v="20" actId="27636"/>
+          <ac:spMkLst>
+            <pc:docMk/>
+            <pc:sldMk cId="2089202195" sldId="256"/>
+            <ac:spMk id="2" creationId="{090AB03A-CACF-4A35-9F35-73E5904B6393}"/>
+          </ac:spMkLst>
+        </pc:spChg>
+        <pc:spChg chg="mod">
+          <ac:chgData name="윤성재" userId="76c7d8b9-0ed6-42c3-8827-8b2f94b0779a" providerId="ADAL" clId="{BE45B969-9097-4DAA-9E48-A61D72BE3E25}" dt="2020-09-28T06:42:01.853" v="31" actId="403"/>
+          <ac:spMkLst>
+            <pc:docMk/>
+            <pc:sldMk cId="2089202195" sldId="256"/>
+            <ac:spMk id="3" creationId="{87B49B06-895E-478F-9BB9-B05DE6A61938}"/>
+          </ac:spMkLst>
+        </pc:spChg>
+      </pc:sldChg>
+      <pc:sldChg chg="addSp delSp modSp mod setBg setClrOvrMap">
+        <pc:chgData name="윤성재" userId="76c7d8b9-0ed6-42c3-8827-8b2f94b0779a" providerId="ADAL" clId="{BE45B969-9097-4DAA-9E48-A61D72BE3E25}" dt="2020-09-28T06:51:07.581" v="932" actId="20577"/>
+        <pc:sldMkLst>
+          <pc:docMk/>
+          <pc:sldMk cId="2947182432" sldId="258"/>
+        </pc:sldMkLst>
+        <pc:spChg chg="mod">
+          <ac:chgData name="윤성재" userId="76c7d8b9-0ed6-42c3-8827-8b2f94b0779a" providerId="ADAL" clId="{BE45B969-9097-4DAA-9E48-A61D72BE3E25}" dt="2020-09-28T06:51:07.581" v="932" actId="20577"/>
+          <ac:spMkLst>
+            <pc:docMk/>
+            <pc:sldMk cId="2947182432" sldId="258"/>
+            <ac:spMk id="2" creationId="{5933B7FC-3145-43DE-8EE5-1D99D422E501}"/>
+          </ac:spMkLst>
+        </pc:spChg>
+        <pc:spChg chg="mod">
+          <ac:chgData name="윤성재" userId="76c7d8b9-0ed6-42c3-8827-8b2f94b0779a" providerId="ADAL" clId="{BE45B969-9097-4DAA-9E48-A61D72BE3E25}" dt="2020-09-28T06:43:38.747" v="41" actId="26606"/>
+          <ac:spMkLst>
+            <pc:docMk/>
+            <pc:sldMk cId="2947182432" sldId="258"/>
+            <ac:spMk id="3" creationId="{639CBFE5-1D01-4F0E-97DC-7DD32983EF8F}"/>
+          </ac:spMkLst>
+        </pc:spChg>
+        <pc:spChg chg="add del">
+          <ac:chgData name="윤성재" userId="76c7d8b9-0ed6-42c3-8827-8b2f94b0779a" providerId="ADAL" clId="{BE45B969-9097-4DAA-9E48-A61D72BE3E25}" dt="2020-09-28T06:43:11.996" v="35" actId="26606"/>
+          <ac:spMkLst>
+            <pc:docMk/>
+            <pc:sldMk cId="2947182432" sldId="258"/>
+            <ac:spMk id="71" creationId="{8FC9BE17-9A7B-462D-AE50-3D8777387304}"/>
+          </ac:spMkLst>
+        </pc:spChg>
+        <pc:spChg chg="add del">
+          <ac:chgData name="윤성재" userId="76c7d8b9-0ed6-42c3-8827-8b2f94b0779a" providerId="ADAL" clId="{BE45B969-9097-4DAA-9E48-A61D72BE3E25}" dt="2020-09-28T06:43:11.996" v="35" actId="26606"/>
+          <ac:spMkLst>
+            <pc:docMk/>
+            <pc:sldMk cId="2947182432" sldId="258"/>
+            <ac:spMk id="73" creationId="{3EBE8569-6AEC-4B8C-8D53-2DE337CDBA65}"/>
+          </ac:spMkLst>
+        </pc:spChg>
+        <pc:spChg chg="add del">
+          <ac:chgData name="윤성재" userId="76c7d8b9-0ed6-42c3-8827-8b2f94b0779a" providerId="ADAL" clId="{BE45B969-9097-4DAA-9E48-A61D72BE3E25}" dt="2020-09-28T06:43:11.996" v="35" actId="26606"/>
+          <ac:spMkLst>
+            <pc:docMk/>
+            <pc:sldMk cId="2947182432" sldId="258"/>
+            <ac:spMk id="75" creationId="{55D4142C-5077-457F-A6AD-3FECFDB39685}"/>
+          </ac:spMkLst>
+        </pc:spChg>
+        <pc:spChg chg="add del">
+          <ac:chgData name="윤성재" userId="76c7d8b9-0ed6-42c3-8827-8b2f94b0779a" providerId="ADAL" clId="{BE45B969-9097-4DAA-9E48-A61D72BE3E25}" dt="2020-09-28T06:43:11.996" v="35" actId="26606"/>
+          <ac:spMkLst>
+            <pc:docMk/>
+            <pc:sldMk cId="2947182432" sldId="258"/>
+            <ac:spMk id="77" creationId="{7A5F0580-5EE9-419F-96EE-B6529EF6E7D0}"/>
+          </ac:spMkLst>
+        </pc:spChg>
+        <pc:spChg chg="add del">
+          <ac:chgData name="윤성재" userId="76c7d8b9-0ed6-42c3-8827-8b2f94b0779a" providerId="ADAL" clId="{BE45B969-9097-4DAA-9E48-A61D72BE3E25}" dt="2020-09-28T06:43:38.747" v="41" actId="26606"/>
+          <ac:spMkLst>
+            <pc:docMk/>
+            <pc:sldMk cId="2947182432" sldId="258"/>
+            <ac:spMk id="1030" creationId="{9AA72BD9-2C5A-4EDC-931F-5AA08EACA0F3}"/>
+          </ac:spMkLst>
+        </pc:spChg>
+        <pc:spChg chg="add del">
+          <ac:chgData name="윤성재" userId="76c7d8b9-0ed6-42c3-8827-8b2f94b0779a" providerId="ADAL" clId="{BE45B969-9097-4DAA-9E48-A61D72BE3E25}" dt="2020-09-28T06:43:38.747" v="41" actId="26606"/>
+          <ac:spMkLst>
+            <pc:docMk/>
+            <pc:sldMk cId="2947182432" sldId="258"/>
+            <ac:spMk id="1031" creationId="{DD3981AC-7B61-4947-BCF3-F7AA7FA385B9}"/>
+          </ac:spMkLst>
+        </pc:spChg>
+        <pc:spChg chg="add del">
+          <ac:chgData name="윤성재" userId="76c7d8b9-0ed6-42c3-8827-8b2f94b0779a" providerId="ADAL" clId="{BE45B969-9097-4DAA-9E48-A61D72BE3E25}" dt="2020-09-28T06:43:38.747" v="41" actId="26606"/>
+          <ac:spMkLst>
+            <pc:docMk/>
+            <pc:sldMk cId="2947182432" sldId="258"/>
+            <ac:spMk id="1032" creationId="{55D4142C-5077-457F-A6AD-3FECFDB39685}"/>
+          </ac:spMkLst>
+        </pc:spChg>
+        <pc:spChg chg="add del">
+          <ac:chgData name="윤성재" userId="76c7d8b9-0ed6-42c3-8827-8b2f94b0779a" providerId="ADAL" clId="{BE45B969-9097-4DAA-9E48-A61D72BE3E25}" dt="2020-09-28T06:43:38.747" v="41" actId="26606"/>
+          <ac:spMkLst>
+            <pc:docMk/>
+            <pc:sldMk cId="2947182432" sldId="258"/>
+            <ac:spMk id="1033" creationId="{7A5F0580-5EE9-419F-96EE-B6529EF6E7D0}"/>
+          </ac:spMkLst>
+        </pc:spChg>
+        <pc:picChg chg="add mod ord">
+          <ac:chgData name="윤성재" userId="76c7d8b9-0ed6-42c3-8827-8b2f94b0779a" providerId="ADAL" clId="{BE45B969-9097-4DAA-9E48-A61D72BE3E25}" dt="2020-09-28T06:43:38.747" v="41" actId="26606"/>
+          <ac:picMkLst>
+            <pc:docMk/>
+            <pc:sldMk cId="2947182432" sldId="258"/>
+            <ac:picMk id="1026" creationId="{030F5514-C2DB-4DFD-BBEE-BE29E1D5A47C}"/>
+          </ac:picMkLst>
+        </pc:picChg>
+        <pc:picChg chg="add del">
+          <ac:chgData name="윤성재" userId="76c7d8b9-0ed6-42c3-8827-8b2f94b0779a" providerId="ADAL" clId="{BE45B969-9097-4DAA-9E48-A61D72BE3E25}" dt="2020-09-28T06:43:17.434" v="37" actId="26606"/>
+          <ac:picMkLst>
+            <pc:docMk/>
+            <pc:sldMk cId="2947182432" sldId="258"/>
+            <ac:picMk id="1028" creationId="{54DDEBDD-D8BD-41A6-8A0D-B00E3768B0F9}"/>
+          </ac:picMkLst>
+        </pc:picChg>
+        <pc:picChg chg="add del">
+          <ac:chgData name="윤성재" userId="76c7d8b9-0ed6-42c3-8827-8b2f94b0779a" providerId="ADAL" clId="{BE45B969-9097-4DAA-9E48-A61D72BE3E25}" dt="2020-09-28T06:43:20.590" v="39" actId="26606"/>
+          <ac:picMkLst>
+            <pc:docMk/>
+            <pc:sldMk cId="2947182432" sldId="258"/>
+            <ac:picMk id="1029" creationId="{54DDEBDD-D8BD-41A6-8A0D-B00E3768B0F9}"/>
+          </ac:picMkLst>
+        </pc:picChg>
+      </pc:sldChg>
+      <pc:sldChg chg="modSp add del mod">
+        <pc:chgData name="윤성재" userId="76c7d8b9-0ed6-42c3-8827-8b2f94b0779a" providerId="ADAL" clId="{BE45B969-9097-4DAA-9E48-A61D72BE3E25}" dt="2020-09-28T07:14:02.761" v="2944" actId="27636"/>
+        <pc:sldMkLst>
+          <pc:docMk/>
+          <pc:sldMk cId="1781822367" sldId="259"/>
+        </pc:sldMkLst>
+        <pc:spChg chg="mod">
+          <ac:chgData name="윤성재" userId="76c7d8b9-0ed6-42c3-8827-8b2f94b0779a" providerId="ADAL" clId="{BE45B969-9097-4DAA-9E48-A61D72BE3E25}" dt="2020-09-28T07:14:02.761" v="2944" actId="27636"/>
+          <ac:spMkLst>
+            <pc:docMk/>
+            <pc:sldMk cId="1781822367" sldId="259"/>
+            <ac:spMk id="23" creationId="{0082D82D-C43D-4444-9232-99F6A5CF6A42}"/>
+          </ac:spMkLst>
+        </pc:spChg>
+      </pc:sldChg>
+      <pc:sldChg chg="del">
+        <pc:chgData name="윤성재" userId="76c7d8b9-0ed6-42c3-8827-8b2f94b0779a" providerId="ADAL" clId="{BE45B969-9097-4DAA-9E48-A61D72BE3E25}" dt="2020-09-28T06:44:06.695" v="45" actId="47"/>
+        <pc:sldMkLst>
+          <pc:docMk/>
+          <pc:sldMk cId="478057021" sldId="260"/>
+        </pc:sldMkLst>
+      </pc:sldChg>
+      <pc:sldChg chg="modSp del mod">
+        <pc:chgData name="윤성재" userId="76c7d8b9-0ed6-42c3-8827-8b2f94b0779a" providerId="ADAL" clId="{BE45B969-9097-4DAA-9E48-A61D72BE3E25}" dt="2020-09-28T06:44:06.695" v="45" actId="47"/>
+        <pc:sldMkLst>
+          <pc:docMk/>
+          <pc:sldMk cId="3101797987" sldId="261"/>
+        </pc:sldMkLst>
+        <pc:spChg chg="mod">
+          <ac:chgData name="윤성재" userId="76c7d8b9-0ed6-42c3-8827-8b2f94b0779a" providerId="ADAL" clId="{BE45B969-9097-4DAA-9E48-A61D72BE3E25}" dt="2020-09-28T06:41:20.635" v="11" actId="27636"/>
+          <ac:spMkLst>
+            <pc:docMk/>
+            <pc:sldMk cId="3101797987" sldId="261"/>
+            <ac:spMk id="23" creationId="{0082D82D-C43D-4444-9232-99F6A5CF6A42}"/>
+          </ac:spMkLst>
+        </pc:spChg>
+      </pc:sldChg>
+      <pc:sldChg chg="modSp del mod">
+        <pc:chgData name="윤성재" userId="76c7d8b9-0ed6-42c3-8827-8b2f94b0779a" providerId="ADAL" clId="{BE45B969-9097-4DAA-9E48-A61D72BE3E25}" dt="2020-09-28T06:44:06.695" v="45" actId="47"/>
+        <pc:sldMkLst>
+          <pc:docMk/>
+          <pc:sldMk cId="1195832901" sldId="262"/>
+        </pc:sldMkLst>
+        <pc:spChg chg="mod">
+          <ac:chgData name="윤성재" userId="76c7d8b9-0ed6-42c3-8827-8b2f94b0779a" providerId="ADAL" clId="{BE45B969-9097-4DAA-9E48-A61D72BE3E25}" dt="2020-09-28T06:41:20.643" v="12" actId="27636"/>
+          <ac:spMkLst>
+            <pc:docMk/>
+            <pc:sldMk cId="1195832901" sldId="262"/>
+            <ac:spMk id="23" creationId="{0082D82D-C43D-4444-9232-99F6A5CF6A42}"/>
+          </ac:spMkLst>
+        </pc:spChg>
+      </pc:sldChg>
+      <pc:sldChg chg="del ord">
+        <pc:chgData name="윤성재" userId="76c7d8b9-0ed6-42c3-8827-8b2f94b0779a" providerId="ADAL" clId="{BE45B969-9097-4DAA-9E48-A61D72BE3E25}" dt="2020-09-28T06:44:10.445" v="47" actId="47"/>
+        <pc:sldMkLst>
+          <pc:docMk/>
+          <pc:sldMk cId="3398729810" sldId="263"/>
+        </pc:sldMkLst>
+      </pc:sldChg>
+      <pc:sldChg chg="modSp mod">
+        <pc:chgData name="윤성재" userId="76c7d8b9-0ed6-42c3-8827-8b2f94b0779a" providerId="ADAL" clId="{BE45B969-9097-4DAA-9E48-A61D72BE3E25}" dt="2020-09-28T07:27:04.304" v="4266"/>
+        <pc:sldMkLst>
+          <pc:docMk/>
+          <pc:sldMk cId="2824757258" sldId="264"/>
+        </pc:sldMkLst>
+        <pc:spChg chg="mod">
+          <ac:chgData name="윤성재" userId="76c7d8b9-0ed6-42c3-8827-8b2f94b0779a" providerId="ADAL" clId="{BE45B969-9097-4DAA-9E48-A61D72BE3E25}" dt="2020-09-28T07:27:04.304" v="4266"/>
+          <ac:spMkLst>
+            <pc:docMk/>
+            <pc:sldMk cId="2824757258" sldId="264"/>
+            <ac:spMk id="3" creationId="{639CBFE5-1D01-4F0E-97DC-7DD32983EF8F}"/>
+          </ac:spMkLst>
+        </pc:spChg>
+      </pc:sldChg>
+      <pc:sldChg chg="addSp delSp modSp new mod">
+        <pc:chgData name="윤성재" userId="76c7d8b9-0ed6-42c3-8827-8b2f94b0779a" providerId="ADAL" clId="{BE45B969-9097-4DAA-9E48-A61D72BE3E25}" dt="2020-09-28T07:07:25.206" v="2446" actId="693"/>
+        <pc:sldMkLst>
+          <pc:docMk/>
+          <pc:sldMk cId="859258854" sldId="265"/>
+        </pc:sldMkLst>
+        <pc:spChg chg="mod">
+          <ac:chgData name="윤성재" userId="76c7d8b9-0ed6-42c3-8827-8b2f94b0779a" providerId="ADAL" clId="{BE45B969-9097-4DAA-9E48-A61D72BE3E25}" dt="2020-09-28T06:51:09.864" v="936" actId="20577"/>
+          <ac:spMkLst>
+            <pc:docMk/>
+            <pc:sldMk cId="859258854" sldId="265"/>
+            <ac:spMk id="2" creationId="{A4EC35AD-8BE7-4CD8-9D12-1B839F81710A}"/>
+          </ac:spMkLst>
+        </pc:spChg>
+        <pc:spChg chg="del">
+          <ac:chgData name="윤성재" userId="76c7d8b9-0ed6-42c3-8827-8b2f94b0779a" providerId="ADAL" clId="{BE45B969-9097-4DAA-9E48-A61D72BE3E25}" dt="2020-09-28T06:46:33.767" v="584" actId="478"/>
+          <ac:spMkLst>
+            <pc:docMk/>
+            <pc:sldMk cId="859258854" sldId="265"/>
+            <ac:spMk id="3" creationId="{CA8C31FF-D58F-49C3-AAB8-E21BA4774D2A}"/>
+          </ac:spMkLst>
+        </pc:spChg>
+        <pc:spChg chg="add mod">
+          <ac:chgData name="윤성재" userId="76c7d8b9-0ed6-42c3-8827-8b2f94b0779a" providerId="ADAL" clId="{BE45B969-9097-4DAA-9E48-A61D72BE3E25}" dt="2020-09-28T06:51:20.404" v="955" actId="207"/>
+          <ac:spMkLst>
+            <pc:docMk/>
+            <pc:sldMk cId="859258854" sldId="265"/>
+            <ac:spMk id="4" creationId="{813B28F4-2027-4E54-9241-CE46C8A92752}"/>
+          </ac:spMkLst>
+        </pc:spChg>
+        <pc:spChg chg="add mod">
+          <ac:chgData name="윤성재" userId="76c7d8b9-0ed6-42c3-8827-8b2f94b0779a" providerId="ADAL" clId="{BE45B969-9097-4DAA-9E48-A61D72BE3E25}" dt="2020-09-28T06:47:56.227" v="733" actId="1076"/>
+          <ac:spMkLst>
+            <pc:docMk/>
+            <pc:sldMk cId="859258854" sldId="265"/>
+            <ac:spMk id="6" creationId="{E53A9888-AB66-4B1A-9B45-8FE05370A2D5}"/>
+          </ac:spMkLst>
+        </pc:spChg>
+        <pc:spChg chg="add mod">
+          <ac:chgData name="윤성재" userId="76c7d8b9-0ed6-42c3-8827-8b2f94b0779a" providerId="ADAL" clId="{BE45B969-9097-4DAA-9E48-A61D72BE3E25}" dt="2020-09-28T06:51:26.371" v="956" actId="207"/>
+          <ac:spMkLst>
+            <pc:docMk/>
+            <pc:sldMk cId="859258854" sldId="265"/>
+            <ac:spMk id="8" creationId="{4ABC94F9-6D3C-4CE8-8212-E1204E218655}"/>
+          </ac:spMkLst>
+        </pc:spChg>
+        <pc:spChg chg="add mod">
+          <ac:chgData name="윤성재" userId="76c7d8b9-0ed6-42c3-8827-8b2f94b0779a" providerId="ADAL" clId="{BE45B969-9097-4DAA-9E48-A61D72BE3E25}" dt="2020-09-28T06:48:27.092" v="769" actId="1076"/>
+          <ac:spMkLst>
+            <pc:docMk/>
+            <pc:sldMk cId="859258854" sldId="265"/>
+            <ac:spMk id="10" creationId="{760C6E2D-181F-4140-87D7-654BB1B87B65}"/>
+          </ac:spMkLst>
+        </pc:spChg>
+        <pc:spChg chg="add mod">
+          <ac:chgData name="윤성재" userId="76c7d8b9-0ed6-42c3-8827-8b2f94b0779a" providerId="ADAL" clId="{BE45B969-9097-4DAA-9E48-A61D72BE3E25}" dt="2020-09-28T06:48:37.176" v="781" actId="20577"/>
+          <ac:spMkLst>
+            <pc:docMk/>
+            <pc:sldMk cId="859258854" sldId="265"/>
+            <ac:spMk id="12" creationId="{F2C30F78-491E-424A-80E0-E3148AADCBD5}"/>
+          </ac:spMkLst>
+        </pc:spChg>
+        <pc:spChg chg="add mod">
+          <ac:chgData name="윤성재" userId="76c7d8b9-0ed6-42c3-8827-8b2f94b0779a" providerId="ADAL" clId="{BE45B969-9097-4DAA-9E48-A61D72BE3E25}" dt="2020-09-28T06:50:04.357" v="902" actId="207"/>
+          <ac:spMkLst>
+            <pc:docMk/>
+            <pc:sldMk cId="859258854" sldId="265"/>
+            <ac:spMk id="14" creationId="{CB397FA2-9465-4ABC-8610-1A408218C74C}"/>
+          </ac:spMkLst>
+        </pc:spChg>
+        <pc:spChg chg="add mod">
+          <ac:chgData name="윤성재" userId="76c7d8b9-0ed6-42c3-8827-8b2f94b0779a" providerId="ADAL" clId="{BE45B969-9097-4DAA-9E48-A61D72BE3E25}" dt="2020-09-28T06:50:16.465" v="929" actId="404"/>
+          <ac:spMkLst>
+            <pc:docMk/>
+            <pc:sldMk cId="859258854" sldId="265"/>
+            <ac:spMk id="16" creationId="{6C360D18-3324-4E26-96CA-DEF0F92B2637}"/>
+          </ac:spMkLst>
+        </pc:spChg>
+        <pc:spChg chg="add del">
+          <ac:chgData name="윤성재" userId="76c7d8b9-0ed6-42c3-8827-8b2f94b0779a" providerId="ADAL" clId="{BE45B969-9097-4DAA-9E48-A61D72BE3E25}" dt="2020-09-28T06:48:54.332" v="797" actId="478"/>
+          <ac:spMkLst>
+            <pc:docMk/>
+            <pc:sldMk cId="859258854" sldId="265"/>
+            <ac:spMk id="41" creationId="{2BE63D7A-A8DA-4485-A7DA-DA8E7C221FE8}"/>
+          </ac:spMkLst>
+        </pc:spChg>
+        <pc:spChg chg="add mod">
+          <ac:chgData name="윤성재" userId="76c7d8b9-0ed6-42c3-8827-8b2f94b0779a" providerId="ADAL" clId="{BE45B969-9097-4DAA-9E48-A61D72BE3E25}" dt="2020-09-28T06:49:13.283" v="824" actId="1076"/>
+          <ac:spMkLst>
+            <pc:docMk/>
+            <pc:sldMk cId="859258854" sldId="265"/>
+            <ac:spMk id="44" creationId="{AF97DFF0-708E-4109-8C5B-0DC966B187A8}"/>
+          </ac:spMkLst>
+        </pc:spChg>
+        <pc:spChg chg="add mod">
+          <ac:chgData name="윤성재" userId="76c7d8b9-0ed6-42c3-8827-8b2f94b0779a" providerId="ADAL" clId="{BE45B969-9097-4DAA-9E48-A61D72BE3E25}" dt="2020-09-28T06:50:04.357" v="902" actId="207"/>
+          <ac:spMkLst>
+            <pc:docMk/>
+            <pc:sldMk cId="859258854" sldId="265"/>
+            <ac:spMk id="54" creationId="{51EECC09-F19B-4A28-B863-FC329AD533E2}"/>
+          </ac:spMkLst>
+        </pc:spChg>
+        <pc:spChg chg="add mod">
+          <ac:chgData name="윤성재" userId="76c7d8b9-0ed6-42c3-8827-8b2f94b0779a" providerId="ADAL" clId="{BE45B969-9097-4DAA-9E48-A61D72BE3E25}" dt="2020-09-28T06:52:13.340" v="1005" actId="208"/>
+          <ac:spMkLst>
+            <pc:docMk/>
+            <pc:sldMk cId="859258854" sldId="265"/>
+            <ac:spMk id="66" creationId="{C7D78D21-966B-4065-8828-B504AA4F3F6E}"/>
+          </ac:spMkLst>
+        </pc:spChg>
+        <pc:spChg chg="add mod">
+          <ac:chgData name="윤성재" userId="76c7d8b9-0ed6-42c3-8827-8b2f94b0779a" providerId="ADAL" clId="{BE45B969-9097-4DAA-9E48-A61D72BE3E25}" dt="2020-09-28T06:52:13.340" v="1005" actId="208"/>
+          <ac:spMkLst>
+            <pc:docMk/>
+            <pc:sldMk cId="859258854" sldId="265"/>
+            <ac:spMk id="68" creationId="{2C016DE1-E224-48BB-92A2-F2D173B7C2DB}"/>
+          </ac:spMkLst>
+        </pc:spChg>
+        <pc:spChg chg="add mod">
+          <ac:chgData name="윤성재" userId="76c7d8b9-0ed6-42c3-8827-8b2f94b0779a" providerId="ADAL" clId="{BE45B969-9097-4DAA-9E48-A61D72BE3E25}" dt="2020-09-28T06:52:13.340" v="1005" actId="208"/>
+          <ac:spMkLst>
+            <pc:docMk/>
+            <pc:sldMk cId="859258854" sldId="265"/>
+            <ac:spMk id="69" creationId="{B65C3B0C-7CF8-4529-9F9A-C3BEAE9C5AA0}"/>
+          </ac:spMkLst>
+        </pc:spChg>
+        <pc:spChg chg="add mod">
+          <ac:chgData name="윤성재" userId="76c7d8b9-0ed6-42c3-8827-8b2f94b0779a" providerId="ADAL" clId="{BE45B969-9097-4DAA-9E48-A61D72BE3E25}" dt="2020-09-28T06:52:13.340" v="1005" actId="208"/>
+          <ac:spMkLst>
+            <pc:docMk/>
+            <pc:sldMk cId="859258854" sldId="265"/>
+            <ac:spMk id="71" creationId="{13D8B77A-341D-441D-851C-FCC4D381CBFF}"/>
+          </ac:spMkLst>
+        </pc:spChg>
+        <pc:spChg chg="add mod">
+          <ac:chgData name="윤성재" userId="76c7d8b9-0ed6-42c3-8827-8b2f94b0779a" providerId="ADAL" clId="{BE45B969-9097-4DAA-9E48-A61D72BE3E25}" dt="2020-09-28T07:07:25.206" v="2446" actId="693"/>
+          <ac:spMkLst>
+            <pc:docMk/>
+            <pc:sldMk cId="859258854" sldId="265"/>
+            <ac:spMk id="73" creationId="{CDE410AD-3703-4839-A938-9D1D960B5EA8}"/>
+          </ac:spMkLst>
+        </pc:spChg>
+        <pc:grpChg chg="add mod">
+          <ac:chgData name="윤성재" userId="76c7d8b9-0ed6-42c3-8827-8b2f94b0779a" providerId="ADAL" clId="{BE45B969-9097-4DAA-9E48-A61D72BE3E25}" dt="2020-09-28T06:52:09.003" v="1003" actId="1076"/>
+          <ac:grpSpMkLst>
+            <pc:docMk/>
+            <pc:sldMk cId="859258854" sldId="265"/>
+            <ac:grpSpMk id="72" creationId="{E35EEA10-1B4F-440E-B295-09FEB86F1756}"/>
+          </ac:grpSpMkLst>
+        </pc:grpChg>
+        <pc:cxnChg chg="add">
+          <ac:chgData name="윤성재" userId="76c7d8b9-0ed6-42c3-8827-8b2f94b0779a" providerId="ADAL" clId="{BE45B969-9097-4DAA-9E48-A61D72BE3E25}" dt="2020-09-28T06:48:02.507" v="735" actId="11529"/>
+          <ac:cxnSpMkLst>
+            <pc:docMk/>
+            <pc:sldMk cId="859258854" sldId="265"/>
+            <ac:cxnSpMk id="18" creationId="{F22B87B9-80FA-4354-941E-005D54976A22}"/>
+          </ac:cxnSpMkLst>
+        </pc:cxnChg>
+        <pc:cxnChg chg="add mod">
+          <ac:chgData name="윤성재" userId="76c7d8b9-0ed6-42c3-8827-8b2f94b0779a" providerId="ADAL" clId="{BE45B969-9097-4DAA-9E48-A61D72BE3E25}" dt="2020-09-28T06:48:05.492" v="738" actId="14100"/>
+          <ac:cxnSpMkLst>
+            <pc:docMk/>
+            <pc:sldMk cId="859258854" sldId="265"/>
+            <ac:cxnSpMk id="19" creationId="{5D1AA3DF-C46C-463F-A337-9845E10095CE}"/>
+          </ac:cxnSpMkLst>
+        </pc:cxnChg>
+        <pc:cxnChg chg="add mod">
+          <ac:chgData name="윤성재" userId="76c7d8b9-0ed6-42c3-8827-8b2f94b0779a" providerId="ADAL" clId="{BE45B969-9097-4DAA-9E48-A61D72BE3E25}" dt="2020-09-28T06:48:19.731" v="764" actId="1076"/>
+          <ac:cxnSpMkLst>
+            <pc:docMk/>
+            <pc:sldMk cId="859258854" sldId="265"/>
+            <ac:cxnSpMk id="22" creationId="{CA265E36-F5DA-492B-995C-B675D63A858A}"/>
+          </ac:cxnSpMkLst>
+        </pc:cxnChg>
+        <pc:cxnChg chg="add mod">
+          <ac:chgData name="윤성재" userId="76c7d8b9-0ed6-42c3-8827-8b2f94b0779a" providerId="ADAL" clId="{BE45B969-9097-4DAA-9E48-A61D72BE3E25}" dt="2020-09-28T06:48:27.092" v="769" actId="1076"/>
+          <ac:cxnSpMkLst>
+            <pc:docMk/>
+            <pc:sldMk cId="859258854" sldId="265"/>
+            <ac:cxnSpMk id="28" creationId="{DD562DDD-D483-4A8D-BD1D-164BF1E940BB}"/>
+          </ac:cxnSpMkLst>
+        </pc:cxnChg>
+        <pc:cxnChg chg="add mod">
+          <ac:chgData name="윤성재" userId="76c7d8b9-0ed6-42c3-8827-8b2f94b0779a" providerId="ADAL" clId="{BE45B969-9097-4DAA-9E48-A61D72BE3E25}" dt="2020-09-28T06:48:35.299" v="772" actId="14100"/>
+          <ac:cxnSpMkLst>
+            <pc:docMk/>
+            <pc:sldMk cId="859258854" sldId="265"/>
+            <ac:cxnSpMk id="32" creationId="{3348B17B-3CD6-4F49-A65D-9EAB22A8FF7B}"/>
+          </ac:cxnSpMkLst>
+        </pc:cxnChg>
+        <pc:cxnChg chg="add mod">
+          <ac:chgData name="윤성재" userId="76c7d8b9-0ed6-42c3-8827-8b2f94b0779a" providerId="ADAL" clId="{BE45B969-9097-4DAA-9E48-A61D72BE3E25}" dt="2020-09-28T06:50:00.979" v="901" actId="1076"/>
+          <ac:cxnSpMkLst>
+            <pc:docMk/>
+            <pc:sldMk cId="859258854" sldId="265"/>
+            <ac:cxnSpMk id="35" creationId="{28D5812A-2BE5-40EE-B1DA-AB55B4ACA91D}"/>
+          </ac:cxnSpMkLst>
+        </pc:cxnChg>
+        <pc:cxnChg chg="add del mod">
+          <ac:chgData name="윤성재" userId="76c7d8b9-0ed6-42c3-8827-8b2f94b0779a" providerId="ADAL" clId="{BE45B969-9097-4DAA-9E48-A61D72BE3E25}" dt="2020-09-28T06:48:56.622" v="799"/>
+          <ac:cxnSpMkLst>
+            <pc:docMk/>
+            <pc:sldMk cId="859258854" sldId="265"/>
+            <ac:cxnSpMk id="42" creationId="{56709C71-5642-41B0-8E00-B25E736DFAD7}"/>
+          </ac:cxnSpMkLst>
+        </pc:cxnChg>
+        <pc:cxnChg chg="add mod">
+          <ac:chgData name="윤성재" userId="76c7d8b9-0ed6-42c3-8827-8b2f94b0779a" providerId="ADAL" clId="{BE45B969-9097-4DAA-9E48-A61D72BE3E25}" dt="2020-09-28T06:50:00.979" v="901" actId="1076"/>
+          <ac:cxnSpMkLst>
+            <pc:docMk/>
+            <pc:sldMk cId="859258854" sldId="265"/>
+            <ac:cxnSpMk id="45" creationId="{2CFA4546-B81B-4580-B579-F49E11B1F92F}"/>
+          </ac:cxnSpMkLst>
+        </pc:cxnChg>
+        <pc:cxnChg chg="add mod">
+          <ac:chgData name="윤성재" userId="76c7d8b9-0ed6-42c3-8827-8b2f94b0779a" providerId="ADAL" clId="{BE45B969-9097-4DAA-9E48-A61D72BE3E25}" dt="2020-09-28T06:49:13.283" v="824" actId="1076"/>
+          <ac:cxnSpMkLst>
+            <pc:docMk/>
+            <pc:sldMk cId="859258854" sldId="265"/>
+            <ac:cxnSpMk id="48" creationId="{7A532701-593A-486A-8F5F-536DB9BEEEC2}"/>
+          </ac:cxnSpMkLst>
+        </pc:cxnChg>
+        <pc:cxnChg chg="add mod">
+          <ac:chgData name="윤성재" userId="76c7d8b9-0ed6-42c3-8827-8b2f94b0779a" providerId="ADAL" clId="{BE45B969-9097-4DAA-9E48-A61D72BE3E25}" dt="2020-09-28T06:49:31.795" v="888" actId="14100"/>
+          <ac:cxnSpMkLst>
+            <pc:docMk/>
+            <pc:sldMk cId="859258854" sldId="265"/>
+            <ac:cxnSpMk id="55" creationId="{CABCFDA5-670E-4A35-9562-DBE1430B5174}"/>
+          </ac:cxnSpMkLst>
+        </pc:cxnChg>
+        <pc:cxnChg chg="add del mod">
+          <ac:chgData name="윤성재" userId="76c7d8b9-0ed6-42c3-8827-8b2f94b0779a" providerId="ADAL" clId="{BE45B969-9097-4DAA-9E48-A61D72BE3E25}" dt="2020-09-28T06:49:40.223" v="892" actId="478"/>
+          <ac:cxnSpMkLst>
+            <pc:docMk/>
+            <pc:sldMk cId="859258854" sldId="265"/>
+            <ac:cxnSpMk id="58" creationId="{6FB019B3-497A-4103-A9B2-737A6668D425}"/>
+          </ac:cxnSpMkLst>
+        </pc:cxnChg>
+        <pc:cxnChg chg="add">
+          <ac:chgData name="윤성재" userId="76c7d8b9-0ed6-42c3-8827-8b2f94b0779a" providerId="ADAL" clId="{BE45B969-9097-4DAA-9E48-A61D72BE3E25}" dt="2020-09-28T06:49:46.614" v="893" actId="11529"/>
+          <ac:cxnSpMkLst>
+            <pc:docMk/>
+            <pc:sldMk cId="859258854" sldId="265"/>
+            <ac:cxnSpMk id="62" creationId="{42DF98BA-81A6-4DDE-B562-95B383BD1B78}"/>
+          </ac:cxnSpMkLst>
+        </pc:cxnChg>
+      </pc:sldChg>
+      <pc:sldChg chg="addSp delSp modSp new mod addCm delCm">
+        <pc:chgData name="윤성재" userId="76c7d8b9-0ed6-42c3-8827-8b2f94b0779a" providerId="ADAL" clId="{BE45B969-9097-4DAA-9E48-A61D72BE3E25}" dt="2020-09-28T08:48:09.184" v="4341" actId="27636"/>
+        <pc:sldMkLst>
+          <pc:docMk/>
+          <pc:sldMk cId="3558948170" sldId="266"/>
+        </pc:sldMkLst>
+        <pc:spChg chg="mod">
+          <ac:chgData name="윤성재" userId="76c7d8b9-0ed6-42c3-8827-8b2f94b0779a" providerId="ADAL" clId="{BE45B969-9097-4DAA-9E48-A61D72BE3E25}" dt="2020-09-28T06:51:15.330" v="954"/>
+          <ac:spMkLst>
+            <pc:docMk/>
+            <pc:sldMk cId="3558948170" sldId="266"/>
+            <ac:spMk id="2" creationId="{198FDC86-4AFC-4D63-9C30-65D37AA7B68B}"/>
+          </ac:spMkLst>
+        </pc:spChg>
+        <pc:spChg chg="mod">
+          <ac:chgData name="윤성재" userId="76c7d8b9-0ed6-42c3-8827-8b2f94b0779a" providerId="ADAL" clId="{BE45B969-9097-4DAA-9E48-A61D72BE3E25}" dt="2020-09-28T08:48:09.184" v="4341" actId="27636"/>
+          <ac:spMkLst>
+            <pc:docMk/>
+            <pc:sldMk cId="3558948170" sldId="266"/>
+            <ac:spMk id="3" creationId="{BAAF2B9A-042F-4182-A4BE-A88E581229C6}"/>
+          </ac:spMkLst>
+        </pc:spChg>
+        <pc:spChg chg="add del mod">
+          <ac:chgData name="윤성재" userId="76c7d8b9-0ed6-42c3-8827-8b2f94b0779a" providerId="ADAL" clId="{BE45B969-9097-4DAA-9E48-A61D72BE3E25}" dt="2020-09-28T06:55:18.529" v="1344" actId="478"/>
+          <ac:spMkLst>
+            <pc:docMk/>
+            <pc:sldMk cId="3558948170" sldId="266"/>
+            <ac:spMk id="4" creationId="{003C310D-E26D-4C1B-89FC-A0CC67B92050}"/>
+          </ac:spMkLst>
+        </pc:spChg>
+        <pc:spChg chg="add mod">
+          <ac:chgData name="윤성재" userId="76c7d8b9-0ed6-42c3-8827-8b2f94b0779a" providerId="ADAL" clId="{BE45B969-9097-4DAA-9E48-A61D72BE3E25}" dt="2020-09-28T07:09:25.490" v="2447" actId="1076"/>
+          <ac:spMkLst>
+            <pc:docMk/>
+            <pc:sldMk cId="3558948170" sldId="266"/>
+            <ac:spMk id="5" creationId="{EB660DA8-AFA6-4B62-8B8C-A8AB1DF2C84C}"/>
+          </ac:spMkLst>
+        </pc:spChg>
+        <pc:spChg chg="add mod">
+          <ac:chgData name="윤성재" userId="76c7d8b9-0ed6-42c3-8827-8b2f94b0779a" providerId="ADAL" clId="{BE45B969-9097-4DAA-9E48-A61D72BE3E25}" dt="2020-09-28T07:09:25.490" v="2447" actId="1076"/>
+          <ac:spMkLst>
+            <pc:docMk/>
+            <pc:sldMk cId="3558948170" sldId="266"/>
+            <ac:spMk id="6" creationId="{B3CA8E49-0310-447E-A536-EBD6F990B361}"/>
+          </ac:spMkLst>
+        </pc:spChg>
+        <pc:spChg chg="mod">
+          <ac:chgData name="윤성재" userId="76c7d8b9-0ed6-42c3-8827-8b2f94b0779a" providerId="ADAL" clId="{BE45B969-9097-4DAA-9E48-A61D72BE3E25}" dt="2020-09-28T07:09:25.490" v="2447" actId="1076"/>
+          <ac:spMkLst>
+            <pc:docMk/>
+            <pc:sldMk cId="3558948170" sldId="266"/>
+            <ac:spMk id="8" creationId="{D22A2774-8D38-4590-BE60-B3D3851B1E3C}"/>
+          </ac:spMkLst>
+        </pc:spChg>
+        <pc:spChg chg="mod">
+          <ac:chgData name="윤성재" userId="76c7d8b9-0ed6-42c3-8827-8b2f94b0779a" providerId="ADAL" clId="{BE45B969-9097-4DAA-9E48-A61D72BE3E25}" dt="2020-09-28T07:09:25.490" v="2447" actId="1076"/>
+          <ac:spMkLst>
+            <pc:docMk/>
+            <pc:sldMk cId="3558948170" sldId="266"/>
+            <ac:spMk id="9" creationId="{66D1EC44-8606-4C27-8E23-C3A7E0C8C5FA}"/>
+          </ac:spMkLst>
+        </pc:spChg>
+        <pc:spChg chg="add del mod">
+          <ac:chgData name="윤성재" userId="76c7d8b9-0ed6-42c3-8827-8b2f94b0779a" providerId="ADAL" clId="{BE45B969-9097-4DAA-9E48-A61D72BE3E25}" dt="2020-09-28T06:55:13.947" v="1342" actId="478"/>
+          <ac:spMkLst>
+            <pc:docMk/>
+            <pc:sldMk cId="3558948170" sldId="266"/>
+            <ac:spMk id="11" creationId="{DA087FDB-372E-4978-814E-AAA59E67E1BE}"/>
+          </ac:spMkLst>
+        </pc:spChg>
+        <pc:spChg chg="mod">
+          <ac:chgData name="윤성재" userId="76c7d8b9-0ed6-42c3-8827-8b2f94b0779a" providerId="ADAL" clId="{BE45B969-9097-4DAA-9E48-A61D72BE3E25}" dt="2020-09-28T06:53:01.957" v="1006"/>
+          <ac:spMkLst>
+            <pc:docMk/>
+            <pc:sldMk cId="3558948170" sldId="266"/>
+            <ac:spMk id="14" creationId="{C0A9966D-B375-4CAF-9F3C-530AD9A074C1}"/>
+          </ac:spMkLst>
+        </pc:spChg>
+        <pc:spChg chg="add mod">
+          <ac:chgData name="윤성재" userId="76c7d8b9-0ed6-42c3-8827-8b2f94b0779a" providerId="ADAL" clId="{BE45B969-9097-4DAA-9E48-A61D72BE3E25}" dt="2020-09-28T07:09:25.490" v="2447" actId="1076"/>
+          <ac:spMkLst>
+            <pc:docMk/>
+            <pc:sldMk cId="3558948170" sldId="266"/>
+            <ac:spMk id="16" creationId="{D61317E7-43A8-41D6-AFB6-18DC0DF9D71A}"/>
+          </ac:spMkLst>
+        </pc:spChg>
+        <pc:spChg chg="add mod ord">
+          <ac:chgData name="윤성재" userId="76c7d8b9-0ed6-42c3-8827-8b2f94b0779a" providerId="ADAL" clId="{BE45B969-9097-4DAA-9E48-A61D72BE3E25}" dt="2020-09-28T07:09:25.490" v="2447" actId="1076"/>
+          <ac:spMkLst>
+            <pc:docMk/>
+            <pc:sldMk cId="3558948170" sldId="266"/>
+            <ac:spMk id="20" creationId="{04B7D4C5-E1CE-48FD-A808-7C38FC2800AC}"/>
+          </ac:spMkLst>
+        </pc:spChg>
+        <pc:spChg chg="add mod">
+          <ac:chgData name="윤성재" userId="76c7d8b9-0ed6-42c3-8827-8b2f94b0779a" providerId="ADAL" clId="{BE45B969-9097-4DAA-9E48-A61D72BE3E25}" dt="2020-09-28T07:09:25.490" v="2447" actId="1076"/>
+          <ac:spMkLst>
+            <pc:docMk/>
+            <pc:sldMk cId="3558948170" sldId="266"/>
+            <ac:spMk id="25" creationId="{F2F3FA1F-7342-4F96-929F-A06D1E7F4879}"/>
+          </ac:spMkLst>
+        </pc:spChg>
+        <pc:spChg chg="add del">
+          <ac:chgData name="윤성재" userId="76c7d8b9-0ed6-42c3-8827-8b2f94b0779a" providerId="ADAL" clId="{BE45B969-9097-4DAA-9E48-A61D72BE3E25}" dt="2020-09-28T06:59:01.036" v="1567" actId="22"/>
+          <ac:spMkLst>
+            <pc:docMk/>
+            <pc:sldMk cId="3558948170" sldId="266"/>
+            <ac:spMk id="27" creationId="{4EB4EE20-AD32-40A6-AFEA-1C2A678F6584}"/>
+          </ac:spMkLst>
+        </pc:spChg>
+        <pc:spChg chg="mod">
+          <ac:chgData name="윤성재" userId="76c7d8b9-0ed6-42c3-8827-8b2f94b0779a" providerId="ADAL" clId="{BE45B969-9097-4DAA-9E48-A61D72BE3E25}" dt="2020-09-28T07:09:25.490" v="2447" actId="1076"/>
+          <ac:spMkLst>
+            <pc:docMk/>
+            <pc:sldMk cId="3558948170" sldId="266"/>
+            <ac:spMk id="30" creationId="{B9C0C9AC-E2DB-4032-B38C-20721A88D727}"/>
+          </ac:spMkLst>
+        </pc:spChg>
+        <pc:grpChg chg="add mod ord">
+          <ac:chgData name="윤성재" userId="76c7d8b9-0ed6-42c3-8827-8b2f94b0779a" providerId="ADAL" clId="{BE45B969-9097-4DAA-9E48-A61D72BE3E25}" dt="2020-09-28T07:09:25.490" v="2447" actId="1076"/>
+          <ac:grpSpMkLst>
+            <pc:docMk/>
+            <pc:sldMk cId="3558948170" sldId="266"/>
+            <ac:grpSpMk id="7" creationId="{97FA19EF-5FBD-4B56-8C52-002CAB2F5F2B}"/>
+          </ac:grpSpMkLst>
+        </pc:grpChg>
+        <pc:grpChg chg="add del mod">
+          <ac:chgData name="윤성재" userId="76c7d8b9-0ed6-42c3-8827-8b2f94b0779a" providerId="ADAL" clId="{BE45B969-9097-4DAA-9E48-A61D72BE3E25}" dt="2020-09-28T06:55:13.947" v="1342" actId="478"/>
+          <ac:grpSpMkLst>
+            <pc:docMk/>
+            <pc:sldMk cId="3558948170" sldId="266"/>
+            <ac:grpSpMk id="12" creationId="{5A217172-D947-4FBC-A799-07A7F2B17BD5}"/>
+          </ac:grpSpMkLst>
+        </pc:grpChg>
+        <pc:grpChg chg="add mod">
+          <ac:chgData name="윤성재" userId="76c7d8b9-0ed6-42c3-8827-8b2f94b0779a" providerId="ADAL" clId="{BE45B969-9097-4DAA-9E48-A61D72BE3E25}" dt="2020-09-28T07:09:25.490" v="2447" actId="1076"/>
+          <ac:grpSpMkLst>
+            <pc:docMk/>
+            <pc:sldMk cId="3558948170" sldId="266"/>
+            <ac:grpSpMk id="28" creationId="{0F00144C-C0DB-456B-A4F3-697D0464368B}"/>
+          </ac:grpSpMkLst>
+        </pc:grpChg>
+        <pc:picChg chg="add del mod">
+          <ac:chgData name="윤성재" userId="76c7d8b9-0ed6-42c3-8827-8b2f94b0779a" providerId="ADAL" clId="{BE45B969-9097-4DAA-9E48-A61D72BE3E25}" dt="2020-09-28T06:55:13.947" v="1342" actId="478"/>
+          <ac:picMkLst>
+            <pc:docMk/>
+            <pc:sldMk cId="3558948170" sldId="266"/>
+            <ac:picMk id="10" creationId="{B2814514-5F92-4A93-97FC-758BF01B712E}"/>
+          </ac:picMkLst>
+        </pc:picChg>
+        <pc:picChg chg="mod">
+          <ac:chgData name="윤성재" userId="76c7d8b9-0ed6-42c3-8827-8b2f94b0779a" providerId="ADAL" clId="{BE45B969-9097-4DAA-9E48-A61D72BE3E25}" dt="2020-09-28T06:53:01.957" v="1006"/>
+          <ac:picMkLst>
+            <pc:docMk/>
+            <pc:sldMk cId="3558948170" sldId="266"/>
+            <ac:picMk id="13" creationId="{41B2EF92-7FD5-4299-B1C3-5DF5E94A2424}"/>
+          </ac:picMkLst>
+        </pc:picChg>
+        <pc:picChg chg="add mod">
+          <ac:chgData name="윤성재" userId="76c7d8b9-0ed6-42c3-8827-8b2f94b0779a" providerId="ADAL" clId="{BE45B969-9097-4DAA-9E48-A61D72BE3E25}" dt="2020-09-28T07:09:25.490" v="2447" actId="1076"/>
+          <ac:picMkLst>
+            <pc:docMk/>
+            <pc:sldMk cId="3558948170" sldId="266"/>
+            <ac:picMk id="23" creationId="{94EC8BAD-2906-4F54-AEB0-C795AF73FCE3}"/>
+          </ac:picMkLst>
+        </pc:picChg>
+        <pc:picChg chg="mod">
+          <ac:chgData name="윤성재" userId="76c7d8b9-0ed6-42c3-8827-8b2f94b0779a" providerId="ADAL" clId="{BE45B969-9097-4DAA-9E48-A61D72BE3E25}" dt="2020-09-28T07:09:25.490" v="2447" actId="1076"/>
+          <ac:picMkLst>
+            <pc:docMk/>
+            <pc:sldMk cId="3558948170" sldId="266"/>
+            <ac:picMk id="29" creationId="{C6F7E66D-5390-4AE4-95DC-AA0424486831}"/>
+          </ac:picMkLst>
+        </pc:picChg>
+        <pc:cxnChg chg="add mod">
+          <ac:chgData name="윤성재" userId="76c7d8b9-0ed6-42c3-8827-8b2f94b0779a" providerId="ADAL" clId="{BE45B969-9097-4DAA-9E48-A61D72BE3E25}" dt="2020-09-28T07:09:25.490" v="2447" actId="1076"/>
+          <ac:cxnSpMkLst>
+            <pc:docMk/>
+            <pc:sldMk cId="3558948170" sldId="266"/>
+            <ac:cxnSpMk id="18" creationId="{5987F4CD-63B5-419C-A093-BA48056BA70C}"/>
+          </ac:cxnSpMkLst>
+        </pc:cxnChg>
+      </pc:sldChg>
+      <pc:sldChg chg="addSp modSp new mod">
+        <pc:chgData name="윤성재" userId="76c7d8b9-0ed6-42c3-8827-8b2f94b0779a" providerId="ADAL" clId="{BE45B969-9097-4DAA-9E48-A61D72BE3E25}" dt="2020-09-28T08:48:34.645" v="4343" actId="207"/>
+        <pc:sldMkLst>
+          <pc:docMk/>
+          <pc:sldMk cId="4027514140" sldId="267"/>
+        </pc:sldMkLst>
+        <pc:spChg chg="mod">
+          <ac:chgData name="윤성재" userId="76c7d8b9-0ed6-42c3-8827-8b2f94b0779a" providerId="ADAL" clId="{BE45B969-9097-4DAA-9E48-A61D72BE3E25}" dt="2020-09-28T07:13:49.830" v="2933" actId="6549"/>
+          <ac:spMkLst>
+            <pc:docMk/>
+            <pc:sldMk cId="4027514140" sldId="267"/>
+            <ac:spMk id="2" creationId="{A7470B02-A05D-4B1F-B07F-F0FC4AB720A8}"/>
+          </ac:spMkLst>
+        </pc:spChg>
+        <pc:spChg chg="mod">
+          <ac:chgData name="윤성재" userId="76c7d8b9-0ed6-42c3-8827-8b2f94b0779a" providerId="ADAL" clId="{BE45B969-9097-4DAA-9E48-A61D72BE3E25}" dt="2020-09-28T08:48:34.645" v="4343" actId="207"/>
+          <ac:spMkLst>
+            <pc:docMk/>
+            <pc:sldMk cId="4027514140" sldId="267"/>
+            <ac:spMk id="3" creationId="{880AF685-A918-4776-BE68-37BFB1210B50}"/>
+          </ac:spMkLst>
+        </pc:spChg>
+        <pc:picChg chg="add mod">
+          <ac:chgData name="윤성재" userId="76c7d8b9-0ed6-42c3-8827-8b2f94b0779a" providerId="ADAL" clId="{BE45B969-9097-4DAA-9E48-A61D72BE3E25}" dt="2020-09-28T07:18:11.985" v="3686" actId="14100"/>
+          <ac:picMkLst>
+            <pc:docMk/>
+            <pc:sldMk cId="4027514140" sldId="267"/>
+            <ac:picMk id="2050" creationId="{3561BB9F-9CB2-4738-8658-9F0C8B8681C7}"/>
+          </ac:picMkLst>
+        </pc:picChg>
+      </pc:sldChg>
+      <pc:sldChg chg="addSp delSp modSp new mod">
+        <pc:chgData name="윤성재" userId="76c7d8b9-0ed6-42c3-8827-8b2f94b0779a" providerId="ADAL" clId="{BE45B969-9097-4DAA-9E48-A61D72BE3E25}" dt="2020-09-29T07:25:27.930" v="6124" actId="6549"/>
+        <pc:sldMkLst>
+          <pc:docMk/>
+          <pc:sldMk cId="2042955228" sldId="268"/>
+        </pc:sldMkLst>
+        <pc:spChg chg="mod">
+          <ac:chgData name="윤성재" userId="76c7d8b9-0ed6-42c3-8827-8b2f94b0779a" providerId="ADAL" clId="{BE45B969-9097-4DAA-9E48-A61D72BE3E25}" dt="2020-09-29T06:28:53.337" v="5989"/>
+          <ac:spMkLst>
+            <pc:docMk/>
+            <pc:sldMk cId="2042955228" sldId="268"/>
+            <ac:spMk id="2" creationId="{8DC282CA-30F9-4B25-A229-375EC981A70B}"/>
+          </ac:spMkLst>
+        </pc:spChg>
+        <pc:spChg chg="del">
+          <ac:chgData name="윤성재" userId="76c7d8b9-0ed6-42c3-8827-8b2f94b0779a" providerId="ADAL" clId="{BE45B969-9097-4DAA-9E48-A61D72BE3E25}" dt="2020-09-29T06:13:33.856" v="4385" actId="478"/>
+          <ac:spMkLst>
+            <pc:docMk/>
+            <pc:sldMk cId="2042955228" sldId="268"/>
+            <ac:spMk id="3" creationId="{39D8FB74-7574-4A7C-A71C-62B10933C7F9}"/>
+          </ac:spMkLst>
+        </pc:spChg>
+        <pc:spChg chg="add mod">
+          <ac:chgData name="윤성재" userId="76c7d8b9-0ed6-42c3-8827-8b2f94b0779a" providerId="ADAL" clId="{BE45B969-9097-4DAA-9E48-A61D72BE3E25}" dt="2020-09-29T06:20:24.485" v="4832" actId="164"/>
+          <ac:spMkLst>
+            <pc:docMk/>
+            <pc:sldMk cId="2042955228" sldId="268"/>
+            <ac:spMk id="4" creationId="{546C1C8D-8527-4202-95D5-43B4FEBB3DE7}"/>
+          </ac:spMkLst>
+        </pc:spChg>
+        <pc:spChg chg="add mod">
+          <ac:chgData name="윤성재" userId="76c7d8b9-0ed6-42c3-8827-8b2f94b0779a" providerId="ADAL" clId="{BE45B969-9097-4DAA-9E48-A61D72BE3E25}" dt="2020-09-29T06:20:24.485" v="4832" actId="164"/>
+          <ac:spMkLst>
+            <pc:docMk/>
+            <pc:sldMk cId="2042955228" sldId="268"/>
+            <ac:spMk id="6" creationId="{1D33AF0D-139F-44AD-B10F-CEBFBD00ACBE}"/>
+          </ac:spMkLst>
+        </pc:spChg>
+        <pc:spChg chg="add mod">
+          <ac:chgData name="윤성재" userId="76c7d8b9-0ed6-42c3-8827-8b2f94b0779a" providerId="ADAL" clId="{BE45B969-9097-4DAA-9E48-A61D72BE3E25}" dt="2020-09-29T06:20:24.485" v="4832" actId="164"/>
+          <ac:spMkLst>
+            <pc:docMk/>
+            <pc:sldMk cId="2042955228" sldId="268"/>
+            <ac:spMk id="8" creationId="{A7F61406-EFBE-451B-B60A-FD3E9D5703E3}"/>
+          </ac:spMkLst>
+        </pc:spChg>
+        <pc:spChg chg="add mod">
+          <ac:chgData name="윤성재" userId="76c7d8b9-0ed6-42c3-8827-8b2f94b0779a" providerId="ADAL" clId="{BE45B969-9097-4DAA-9E48-A61D72BE3E25}" dt="2020-09-29T06:20:24.485" v="4832" actId="164"/>
+          <ac:spMkLst>
+            <pc:docMk/>
+            <pc:sldMk cId="2042955228" sldId="268"/>
+            <ac:spMk id="10" creationId="{81467237-12CC-45C3-B0EC-477A39CADEBD}"/>
+          </ac:spMkLst>
+        </pc:spChg>
+        <pc:spChg chg="add mod">
+          <ac:chgData name="윤성재" userId="76c7d8b9-0ed6-42c3-8827-8b2f94b0779a" providerId="ADAL" clId="{BE45B969-9097-4DAA-9E48-A61D72BE3E25}" dt="2020-09-29T06:20:24.485" v="4832" actId="164"/>
+          <ac:spMkLst>
+            <pc:docMk/>
+            <pc:sldMk cId="2042955228" sldId="268"/>
+            <ac:spMk id="12" creationId="{31F6869D-E20E-43C2-872D-7BF06B327E55}"/>
+          </ac:spMkLst>
+        </pc:spChg>
+        <pc:spChg chg="add mod">
+          <ac:chgData name="윤성재" userId="76c7d8b9-0ed6-42c3-8827-8b2f94b0779a" providerId="ADAL" clId="{BE45B969-9097-4DAA-9E48-A61D72BE3E25}" dt="2020-09-29T06:20:24.485" v="4832" actId="164"/>
+          <ac:spMkLst>
+            <pc:docMk/>
+            <pc:sldMk cId="2042955228" sldId="268"/>
+            <ac:spMk id="14" creationId="{7D116FF5-88BA-444E-A62D-5180A1091471}"/>
+          </ac:spMkLst>
+        </pc:spChg>
+        <pc:spChg chg="add del mod">
+          <ac:chgData name="윤성재" userId="76c7d8b9-0ed6-42c3-8827-8b2f94b0779a" providerId="ADAL" clId="{BE45B969-9097-4DAA-9E48-A61D72BE3E25}" dt="2020-09-29T06:15:59.405" v="4494" actId="478"/>
+          <ac:spMkLst>
+            <pc:docMk/>
+            <pc:sldMk cId="2042955228" sldId="268"/>
+            <ac:spMk id="16" creationId="{CF6291A3-BBA6-41D9-8B4F-E3C36716564A}"/>
+          </ac:spMkLst>
+        </pc:spChg>
+        <pc:spChg chg="add mod">
+          <ac:chgData name="윤성재" userId="76c7d8b9-0ed6-42c3-8827-8b2f94b0779a" providerId="ADAL" clId="{BE45B969-9097-4DAA-9E48-A61D72BE3E25}" dt="2020-09-29T06:20:24.485" v="4832" actId="164"/>
+          <ac:spMkLst>
+            <pc:docMk/>
+            <pc:sldMk cId="2042955228" sldId="268"/>
+            <ac:spMk id="18" creationId="{6260F2DF-0F2A-4901-BBC1-D461585DFC0F}"/>
+          </ac:spMkLst>
+        </pc:spChg>
+        <pc:spChg chg="add mod">
+          <ac:chgData name="윤성재" userId="76c7d8b9-0ed6-42c3-8827-8b2f94b0779a" providerId="ADAL" clId="{BE45B969-9097-4DAA-9E48-A61D72BE3E25}" dt="2020-09-29T06:20:24.485" v="4832" actId="164"/>
+          <ac:spMkLst>
+            <pc:docMk/>
+            <pc:sldMk cId="2042955228" sldId="268"/>
+            <ac:spMk id="20" creationId="{9CE5E5F9-4BCB-401B-AA77-2E0E725D0B4D}"/>
+          </ac:spMkLst>
+        </pc:spChg>
+        <pc:spChg chg="add mod">
+          <ac:chgData name="윤성재" userId="76c7d8b9-0ed6-42c3-8827-8b2f94b0779a" providerId="ADAL" clId="{BE45B969-9097-4DAA-9E48-A61D72BE3E25}" dt="2020-09-29T06:20:24.485" v="4832" actId="164"/>
+          <ac:spMkLst>
+            <pc:docMk/>
+            <pc:sldMk cId="2042955228" sldId="268"/>
+            <ac:spMk id="22" creationId="{A16E8507-F4BD-4861-8CEC-1543FEDC8E37}"/>
+          </ac:spMkLst>
+        </pc:spChg>
+        <pc:spChg chg="add mod">
+          <ac:chgData name="윤성재" userId="76c7d8b9-0ed6-42c3-8827-8b2f94b0779a" providerId="ADAL" clId="{BE45B969-9097-4DAA-9E48-A61D72BE3E25}" dt="2020-09-29T06:20:24.485" v="4832" actId="164"/>
+          <ac:spMkLst>
+            <pc:docMk/>
+            <pc:sldMk cId="2042955228" sldId="268"/>
+            <ac:spMk id="24" creationId="{E08BE75C-AC27-47E0-B8F6-8AA2E6EF36C1}"/>
+          </ac:spMkLst>
+        </pc:spChg>
+        <pc:spChg chg="add del">
+          <ac:chgData name="윤성재" userId="76c7d8b9-0ed6-42c3-8827-8b2f94b0779a" providerId="ADAL" clId="{BE45B969-9097-4DAA-9E48-A61D72BE3E25}" dt="2020-09-29T06:17:23.324" v="4565" actId="478"/>
+          <ac:spMkLst>
+            <pc:docMk/>
+            <pc:sldMk cId="2042955228" sldId="268"/>
+            <ac:spMk id="26" creationId="{E5DF18F2-CBD0-4111-BC6C-815870D97870}"/>
+          </ac:spMkLst>
+        </pc:spChg>
+        <pc:spChg chg="add mod">
+          <ac:chgData name="윤성재" userId="76c7d8b9-0ed6-42c3-8827-8b2f94b0779a" providerId="ADAL" clId="{BE45B969-9097-4DAA-9E48-A61D72BE3E25}" dt="2020-09-29T06:20:24.485" v="4832" actId="164"/>
+          <ac:spMkLst>
+            <pc:docMk/>
+            <pc:sldMk cId="2042955228" sldId="268"/>
+            <ac:spMk id="28" creationId="{74523349-E141-4614-A63B-5E5307EA244B}"/>
+          </ac:spMkLst>
+        </pc:spChg>
+        <pc:spChg chg="add mod">
+          <ac:chgData name="윤성재" userId="76c7d8b9-0ed6-42c3-8827-8b2f94b0779a" providerId="ADAL" clId="{BE45B969-9097-4DAA-9E48-A61D72BE3E25}" dt="2020-09-29T06:20:24.485" v="4832" actId="164"/>
+          <ac:spMkLst>
+            <pc:docMk/>
+            <pc:sldMk cId="2042955228" sldId="268"/>
+            <ac:spMk id="30" creationId="{E1AF28B2-3B6F-4052-ADF9-00CC894413FD}"/>
+          </ac:spMkLst>
+        </pc:spChg>
+        <pc:spChg chg="add mod">
+          <ac:chgData name="윤성재" userId="76c7d8b9-0ed6-42c3-8827-8b2f94b0779a" providerId="ADAL" clId="{BE45B969-9097-4DAA-9E48-A61D72BE3E25}" dt="2020-09-29T06:20:24.485" v="4832" actId="164"/>
+          <ac:spMkLst>
+            <pc:docMk/>
+            <pc:sldMk cId="2042955228" sldId="268"/>
+            <ac:spMk id="32" creationId="{06F997F2-65A8-44FE-B39D-D960107F3822}"/>
+          </ac:spMkLst>
+        </pc:spChg>
+        <pc:spChg chg="add mod">
+          <ac:chgData name="윤성재" userId="76c7d8b9-0ed6-42c3-8827-8b2f94b0779a" providerId="ADAL" clId="{BE45B969-9097-4DAA-9E48-A61D72BE3E25}" dt="2020-09-29T06:20:24.485" v="4832" actId="164"/>
+          <ac:spMkLst>
+            <pc:docMk/>
+            <pc:sldMk cId="2042955228" sldId="268"/>
+            <ac:spMk id="34" creationId="{767665A5-A1FD-4D8D-AEF0-991E8D58C946}"/>
+          </ac:spMkLst>
+        </pc:spChg>
+        <pc:spChg chg="add mod">
+          <ac:chgData name="윤성재" userId="76c7d8b9-0ed6-42c3-8827-8b2f94b0779a" providerId="ADAL" clId="{BE45B969-9097-4DAA-9E48-A61D72BE3E25}" dt="2020-09-29T06:20:24.485" v="4832" actId="164"/>
+          <ac:spMkLst>
+            <pc:docMk/>
+            <pc:sldMk cId="2042955228" sldId="268"/>
+            <ac:spMk id="36" creationId="{1E4F70E2-62E4-4A91-81F8-DBC9DD2E7A7F}"/>
+          </ac:spMkLst>
+        </pc:spChg>
+        <pc:spChg chg="add mod">
+          <ac:chgData name="윤성재" userId="76c7d8b9-0ed6-42c3-8827-8b2f94b0779a" providerId="ADAL" clId="{BE45B969-9097-4DAA-9E48-A61D72BE3E25}" dt="2020-09-29T06:18:41.922" v="4623" actId="1076"/>
+          <ac:spMkLst>
+            <pc:docMk/>
+            <pc:sldMk cId="2042955228" sldId="268"/>
+            <ac:spMk id="38" creationId="{7697E859-69C4-454F-9F21-B6F30613A898}"/>
+          </ac:spMkLst>
+        </pc:spChg>
+        <pc:spChg chg="add mod">
+          <ac:chgData name="윤성재" userId="76c7d8b9-0ed6-42c3-8827-8b2f94b0779a" providerId="ADAL" clId="{BE45B969-9097-4DAA-9E48-A61D72BE3E25}" dt="2020-09-29T06:18:39.675" v="4622" actId="207"/>
+          <ac:spMkLst>
+            <pc:docMk/>
+            <pc:sldMk cId="2042955228" sldId="268"/>
+            <ac:spMk id="40" creationId="{E6B90C67-0AA2-414C-98EB-DAC7CA559BD3}"/>
+          </ac:spMkLst>
+        </pc:spChg>
+        <pc:spChg chg="add mod">
+          <ac:chgData name="윤성재" userId="76c7d8b9-0ed6-42c3-8827-8b2f94b0779a" providerId="ADAL" clId="{BE45B969-9097-4DAA-9E48-A61D72BE3E25}" dt="2020-09-29T06:18:47.139" v="4634" actId="1076"/>
+          <ac:spMkLst>
+            <pc:docMk/>
+            <pc:sldMk cId="2042955228" sldId="268"/>
+            <ac:spMk id="42" creationId="{1E6176C7-47F5-49E5-AB5D-7E2CD955EC0E}"/>
+          </ac:spMkLst>
+        </pc:spChg>
+        <pc:spChg chg="add mod">
+          <ac:chgData name="윤성재" userId="76c7d8b9-0ed6-42c3-8827-8b2f94b0779a" providerId="ADAL" clId="{BE45B969-9097-4DAA-9E48-A61D72BE3E25}" dt="2020-09-29T06:20:24.485" v="4832" actId="164"/>
+          <ac:spMkLst>
+            <pc:docMk/>
+            <pc:sldMk cId="2042955228" sldId="268"/>
+            <ac:spMk id="44" creationId="{49DB4571-8F1E-473C-A39A-1341878B46E5}"/>
+          </ac:spMkLst>
+        </pc:spChg>
+        <pc:spChg chg="add mod">
+          <ac:chgData name="윤성재" userId="76c7d8b9-0ed6-42c3-8827-8b2f94b0779a" providerId="ADAL" clId="{BE45B969-9097-4DAA-9E48-A61D72BE3E25}" dt="2020-09-29T06:18:58.505" v="4656" actId="1076"/>
+          <ac:spMkLst>
+            <pc:docMk/>
+            <pc:sldMk cId="2042955228" sldId="268"/>
+            <ac:spMk id="46" creationId="{FC868735-43BC-4357-82BA-339350CD8E6A}"/>
+          </ac:spMkLst>
+        </pc:spChg>
+        <pc:spChg chg="add mod">
+          <ac:chgData name="윤성재" userId="76c7d8b9-0ed6-42c3-8827-8b2f94b0779a" providerId="ADAL" clId="{BE45B969-9097-4DAA-9E48-A61D72BE3E25}" dt="2020-09-29T07:25:27.930" v="6124" actId="6549"/>
+          <ac:spMkLst>
+            <pc:docMk/>
+            <pc:sldMk cId="2042955228" sldId="268"/>
+            <ac:spMk id="51" creationId="{74B0F85C-B08B-4FBE-8563-41DE777D9AA9}"/>
+          </ac:spMkLst>
+        </pc:spChg>
+        <pc:spChg chg="add mod">
+          <ac:chgData name="윤성재" userId="76c7d8b9-0ed6-42c3-8827-8b2f94b0779a" providerId="ADAL" clId="{BE45B969-9097-4DAA-9E48-A61D72BE3E25}" dt="2020-09-29T06:24:23.610" v="5023" actId="1076"/>
+          <ac:spMkLst>
+            <pc:docMk/>
+            <pc:sldMk cId="2042955228" sldId="268"/>
+            <ac:spMk id="54" creationId="{6FA503E1-C355-4BB9-8A8D-C33B023D0877}"/>
+          </ac:spMkLst>
+        </pc:spChg>
+        <pc:grpChg chg="add mod">
+          <ac:chgData name="윤성재" userId="76c7d8b9-0ed6-42c3-8827-8b2f94b0779a" providerId="ADAL" clId="{BE45B969-9097-4DAA-9E48-A61D72BE3E25}" dt="2020-09-29T06:20:24.485" v="4832" actId="164"/>
+          <ac:grpSpMkLst>
+            <pc:docMk/>
+            <pc:sldMk cId="2042955228" sldId="268"/>
+            <ac:grpSpMk id="52" creationId="{CDF757E4-7F13-4D32-8051-C34631A3C07E}"/>
+          </ac:grpSpMkLst>
+        </pc:grpChg>
+        <pc:cxnChg chg="add mod">
+          <ac:chgData name="윤성재" userId="76c7d8b9-0ed6-42c3-8827-8b2f94b0779a" providerId="ADAL" clId="{BE45B969-9097-4DAA-9E48-A61D72BE3E25}" dt="2020-09-29T06:19:31.818" v="4684" actId="1076"/>
+          <ac:cxnSpMkLst>
+            <pc:docMk/>
+            <pc:sldMk cId="2042955228" sldId="268"/>
+            <ac:cxnSpMk id="47" creationId="{A8540E20-AFF2-4E40-B10D-050620E662B5}"/>
+          </ac:cxnSpMkLst>
+        </pc:cxnChg>
+      </pc:sldChg>
+      <pc:sldChg chg="addSp delSp modSp new mod">
+        <pc:chgData name="윤성재" userId="76c7d8b9-0ed6-42c3-8827-8b2f94b0779a" providerId="ADAL" clId="{BE45B969-9097-4DAA-9E48-A61D72BE3E25}" dt="2020-09-29T06:29:03.435" v="6011" actId="6549"/>
+        <pc:sldMkLst>
+          <pc:docMk/>
+          <pc:sldMk cId="745412383" sldId="269"/>
+        </pc:sldMkLst>
+        <pc:spChg chg="mod">
+          <ac:chgData name="윤성재" userId="76c7d8b9-0ed6-42c3-8827-8b2f94b0779a" providerId="ADAL" clId="{BE45B969-9097-4DAA-9E48-A61D72BE3E25}" dt="2020-09-29T06:28:58.283" v="6008"/>
+          <ac:spMkLst>
+            <pc:docMk/>
+            <pc:sldMk cId="745412383" sldId="269"/>
+            <ac:spMk id="2" creationId="{C05FD4FC-AD69-47D4-84F3-131F318CC2BD}"/>
+          </ac:spMkLst>
+        </pc:spChg>
+        <pc:spChg chg="del">
+          <ac:chgData name="윤성재" userId="76c7d8b9-0ed6-42c3-8827-8b2f94b0779a" providerId="ADAL" clId="{BE45B969-9097-4DAA-9E48-A61D72BE3E25}" dt="2020-09-29T06:20:27.146" v="4834" actId="478"/>
+          <ac:spMkLst>
+            <pc:docMk/>
+            <pc:sldMk cId="745412383" sldId="269"/>
+            <ac:spMk id="3" creationId="{FF66B148-228E-46BD-85CC-EE08E997D5AC}"/>
+          </ac:spMkLst>
+        </pc:spChg>
+        <pc:spChg chg="mod">
+          <ac:chgData name="윤성재" userId="76c7d8b9-0ed6-42c3-8827-8b2f94b0779a" providerId="ADAL" clId="{BE45B969-9097-4DAA-9E48-A61D72BE3E25}" dt="2020-09-29T06:20:25.588" v="4833"/>
+          <ac:spMkLst>
+            <pc:docMk/>
+            <pc:sldMk cId="745412383" sldId="269"/>
+            <ac:spMk id="5" creationId="{726F551C-5CF0-4748-8E92-C42F0740CB9F}"/>
+          </ac:spMkLst>
+        </pc:spChg>
+        <pc:spChg chg="mod">
+          <ac:chgData name="윤성재" userId="76c7d8b9-0ed6-42c3-8827-8b2f94b0779a" providerId="ADAL" clId="{BE45B969-9097-4DAA-9E48-A61D72BE3E25}" dt="2020-09-29T06:20:25.588" v="4833"/>
+          <ac:spMkLst>
+            <pc:docMk/>
+            <pc:sldMk cId="745412383" sldId="269"/>
+            <ac:spMk id="6" creationId="{7056E405-8AE2-4B37-907F-75052B837F8E}"/>
+          </ac:spMkLst>
+        </pc:spChg>
+        <pc:spChg chg="mod">
+          <ac:chgData name="윤성재" userId="76c7d8b9-0ed6-42c3-8827-8b2f94b0779a" providerId="ADAL" clId="{BE45B969-9097-4DAA-9E48-A61D72BE3E25}" dt="2020-09-29T06:20:25.588" v="4833"/>
+          <ac:spMkLst>
+            <pc:docMk/>
+            <pc:sldMk cId="745412383" sldId="269"/>
+            <ac:spMk id="7" creationId="{76101337-A9F5-430D-8223-464D38799ECC}"/>
+          </ac:spMkLst>
+        </pc:spChg>
+        <pc:spChg chg="mod">
+          <ac:chgData name="윤성재" userId="76c7d8b9-0ed6-42c3-8827-8b2f94b0779a" providerId="ADAL" clId="{BE45B969-9097-4DAA-9E48-A61D72BE3E25}" dt="2020-09-29T06:20:25.588" v="4833"/>
+          <ac:spMkLst>
+            <pc:docMk/>
+            <pc:sldMk cId="745412383" sldId="269"/>
+            <ac:spMk id="8" creationId="{2147FA68-95D3-4F49-A0DB-6B3DF41E10AD}"/>
+          </ac:spMkLst>
+        </pc:spChg>
+        <pc:spChg chg="mod">
+          <ac:chgData name="윤성재" userId="76c7d8b9-0ed6-42c3-8827-8b2f94b0779a" providerId="ADAL" clId="{BE45B969-9097-4DAA-9E48-A61D72BE3E25}" dt="2020-09-29T06:20:25.588" v="4833"/>
+          <ac:spMkLst>
+            <pc:docMk/>
+            <pc:sldMk cId="745412383" sldId="269"/>
+            <ac:spMk id="9" creationId="{D51E7E73-91AC-48BE-AB42-0FCB83A9D830}"/>
+          </ac:spMkLst>
+        </pc:spChg>
+        <pc:spChg chg="mod">
+          <ac:chgData name="윤성재" userId="76c7d8b9-0ed6-42c3-8827-8b2f94b0779a" providerId="ADAL" clId="{BE45B969-9097-4DAA-9E48-A61D72BE3E25}" dt="2020-09-29T06:20:25.588" v="4833"/>
+          <ac:spMkLst>
+            <pc:docMk/>
+            <pc:sldMk cId="745412383" sldId="269"/>
+            <ac:spMk id="10" creationId="{1817EE94-6F5C-47B0-9F0F-442708444651}"/>
+          </ac:spMkLst>
+        </pc:spChg>
+        <pc:spChg chg="mod">
+          <ac:chgData name="윤성재" userId="76c7d8b9-0ed6-42c3-8827-8b2f94b0779a" providerId="ADAL" clId="{BE45B969-9097-4DAA-9E48-A61D72BE3E25}" dt="2020-09-29T06:20:25.588" v="4833"/>
+          <ac:spMkLst>
+            <pc:docMk/>
+            <pc:sldMk cId="745412383" sldId="269"/>
+            <ac:spMk id="11" creationId="{96BFB4EC-25EB-42BD-AFCA-2666EE0E3921}"/>
+          </ac:spMkLst>
+        </pc:spChg>
+        <pc:spChg chg="mod">
+          <ac:chgData name="윤성재" userId="76c7d8b9-0ed6-42c3-8827-8b2f94b0779a" providerId="ADAL" clId="{BE45B969-9097-4DAA-9E48-A61D72BE3E25}" dt="2020-09-29T06:20:25.588" v="4833"/>
+          <ac:spMkLst>
+            <pc:docMk/>
+            <pc:sldMk cId="745412383" sldId="269"/>
+            <ac:spMk id="12" creationId="{C619ECF8-93BE-48C6-B3A6-1FE3B540224A}"/>
+          </ac:spMkLst>
+        </pc:spChg>
+        <pc:spChg chg="mod">
+          <ac:chgData name="윤성재" userId="76c7d8b9-0ed6-42c3-8827-8b2f94b0779a" providerId="ADAL" clId="{BE45B969-9097-4DAA-9E48-A61D72BE3E25}" dt="2020-09-29T06:20:25.588" v="4833"/>
+          <ac:spMkLst>
+            <pc:docMk/>
+            <pc:sldMk cId="745412383" sldId="269"/>
+            <ac:spMk id="13" creationId="{0C762D78-9030-4D0F-9A66-0040049CB407}"/>
+          </ac:spMkLst>
+        </pc:spChg>
+        <pc:spChg chg="mod">
+          <ac:chgData name="윤성재" userId="76c7d8b9-0ed6-42c3-8827-8b2f94b0779a" providerId="ADAL" clId="{BE45B969-9097-4DAA-9E48-A61D72BE3E25}" dt="2020-09-29T06:20:25.588" v="4833"/>
+          <ac:spMkLst>
+            <pc:docMk/>
+            <pc:sldMk cId="745412383" sldId="269"/>
+            <ac:spMk id="14" creationId="{E32B808A-CDF8-4B87-B140-733B8960D755}"/>
+          </ac:spMkLst>
+        </pc:spChg>
+        <pc:spChg chg="mod">
+          <ac:chgData name="윤성재" userId="76c7d8b9-0ed6-42c3-8827-8b2f94b0779a" providerId="ADAL" clId="{BE45B969-9097-4DAA-9E48-A61D72BE3E25}" dt="2020-09-29T06:20:25.588" v="4833"/>
+          <ac:spMkLst>
+            <pc:docMk/>
+            <pc:sldMk cId="745412383" sldId="269"/>
+            <ac:spMk id="15" creationId="{5503648B-722E-479F-BDFB-4D95F7077C07}"/>
+          </ac:spMkLst>
+        </pc:spChg>
+        <pc:spChg chg="mod">
+          <ac:chgData name="윤성재" userId="76c7d8b9-0ed6-42c3-8827-8b2f94b0779a" providerId="ADAL" clId="{BE45B969-9097-4DAA-9E48-A61D72BE3E25}" dt="2020-09-29T06:20:25.588" v="4833"/>
+          <ac:spMkLst>
+            <pc:docMk/>
+            <pc:sldMk cId="745412383" sldId="269"/>
+            <ac:spMk id="16" creationId="{EB20A092-1C4B-4B65-909B-2717A56FFD95}"/>
+          </ac:spMkLst>
+        </pc:spChg>
+        <pc:spChg chg="mod">
+          <ac:chgData name="윤성재" userId="76c7d8b9-0ed6-42c3-8827-8b2f94b0779a" providerId="ADAL" clId="{BE45B969-9097-4DAA-9E48-A61D72BE3E25}" dt="2020-09-29T06:20:25.588" v="4833"/>
+          <ac:spMkLst>
+            <pc:docMk/>
+            <pc:sldMk cId="745412383" sldId="269"/>
+            <ac:spMk id="17" creationId="{58A1CA52-B464-4B4B-82A1-166C2040122F}"/>
+          </ac:spMkLst>
+        </pc:spChg>
+        <pc:spChg chg="mod">
+          <ac:chgData name="윤성재" userId="76c7d8b9-0ed6-42c3-8827-8b2f94b0779a" providerId="ADAL" clId="{BE45B969-9097-4DAA-9E48-A61D72BE3E25}" dt="2020-09-29T06:20:25.588" v="4833"/>
+          <ac:spMkLst>
+            <pc:docMk/>
+            <pc:sldMk cId="745412383" sldId="269"/>
+            <ac:spMk id="18" creationId="{AC0ED61B-B508-44A2-AA47-018321F563E5}"/>
+          </ac:spMkLst>
+        </pc:spChg>
+        <pc:spChg chg="del mod">
+          <ac:chgData name="윤성재" userId="76c7d8b9-0ed6-42c3-8827-8b2f94b0779a" providerId="ADAL" clId="{BE45B969-9097-4DAA-9E48-A61D72BE3E25}" dt="2020-09-29T06:20:29.684" v="4836" actId="478"/>
+          <ac:spMkLst>
+            <pc:docMk/>
+            <pc:sldMk cId="745412383" sldId="269"/>
+            <ac:spMk id="19" creationId="{DACAC704-F107-4FC3-86A7-A3C5FC2D165F}"/>
+          </ac:spMkLst>
+        </pc:spChg>
+        <pc:spChg chg="del mod">
+          <ac:chgData name="윤성재" userId="76c7d8b9-0ed6-42c3-8827-8b2f94b0779a" providerId="ADAL" clId="{BE45B969-9097-4DAA-9E48-A61D72BE3E25}" dt="2020-09-29T06:20:28.792" v="4835" actId="478"/>
+          <ac:spMkLst>
+            <pc:docMk/>
+            <pc:sldMk cId="745412383" sldId="269"/>
+            <ac:spMk id="20" creationId="{9941F198-3AC4-448A-B786-01D46B2FFD33}"/>
+          </ac:spMkLst>
+        </pc:spChg>
+        <pc:spChg chg="add del mod">
+          <ac:chgData name="윤성재" userId="76c7d8b9-0ed6-42c3-8827-8b2f94b0779a" providerId="ADAL" clId="{BE45B969-9097-4DAA-9E48-A61D72BE3E25}" dt="2020-09-29T06:20:46.044" v="4841" actId="478"/>
+          <ac:spMkLst>
+            <pc:docMk/>
+            <pc:sldMk cId="745412383" sldId="269"/>
+            <ac:spMk id="21" creationId="{27EDDDC9-B34E-4298-9DAF-F20E55B30F1D}"/>
+          </ac:spMkLst>
+        </pc:spChg>
+        <pc:spChg chg="add mod">
+          <ac:chgData name="윤성재" userId="76c7d8b9-0ed6-42c3-8827-8b2f94b0779a" providerId="ADAL" clId="{BE45B969-9097-4DAA-9E48-A61D72BE3E25}" dt="2020-09-29T06:22:38.731" v="4876" actId="1037"/>
+          <ac:spMkLst>
+            <pc:docMk/>
+            <pc:sldMk cId="745412383" sldId="269"/>
+            <ac:spMk id="40" creationId="{B782FD96-A568-4EE9-9D8C-94AD757F09BA}"/>
+          </ac:spMkLst>
+        </pc:spChg>
+        <pc:spChg chg="add mod">
+          <ac:chgData name="윤성재" userId="76c7d8b9-0ed6-42c3-8827-8b2f94b0779a" providerId="ADAL" clId="{BE45B969-9097-4DAA-9E48-A61D72BE3E25}" dt="2020-09-29T06:29:03.435" v="6011" actId="6549"/>
+          <ac:spMkLst>
+            <pc:docMk/>
+            <pc:sldMk cId="745412383" sldId="269"/>
+            <ac:spMk id="96" creationId="{0A6991DC-4E23-410C-BD7D-0B6EB844F579}"/>
+          </ac:spMkLst>
+        </pc:spChg>
+        <pc:spChg chg="add del">
+          <ac:chgData name="윤성재" userId="76c7d8b9-0ed6-42c3-8827-8b2f94b0779a" providerId="ADAL" clId="{BE45B969-9097-4DAA-9E48-A61D72BE3E25}" dt="2020-09-29T06:24:29.429" v="5025" actId="22"/>
+          <ac:spMkLst>
+            <pc:docMk/>
+            <pc:sldMk cId="745412383" sldId="269"/>
+            <ac:spMk id="98" creationId="{791F167B-2783-4B9B-992C-B0C4388366EB}"/>
+          </ac:spMkLst>
+        </pc:spChg>
+        <pc:spChg chg="add mod">
+          <ac:chgData name="윤성재" userId="76c7d8b9-0ed6-42c3-8827-8b2f94b0779a" providerId="ADAL" clId="{BE45B969-9097-4DAA-9E48-A61D72BE3E25}" dt="2020-09-29T06:24:33.732" v="5027" actId="1076"/>
+          <ac:spMkLst>
+            <pc:docMk/>
+            <pc:sldMk cId="745412383" sldId="269"/>
+            <ac:spMk id="100" creationId="{DD28F1FE-D4B8-422E-B2FB-0CDF573E325D}"/>
+          </ac:spMkLst>
+        </pc:spChg>
+        <pc:spChg chg="add mod">
+          <ac:chgData name="윤성재" userId="76c7d8b9-0ed6-42c3-8827-8b2f94b0779a" providerId="ADAL" clId="{BE45B969-9097-4DAA-9E48-A61D72BE3E25}" dt="2020-09-29T06:27:51.333" v="5970" actId="20577"/>
+          <ac:spMkLst>
+            <pc:docMk/>
+            <pc:sldMk cId="745412383" sldId="269"/>
+            <ac:spMk id="116" creationId="{66898A8E-1C7F-4764-B2F6-1F284B1CDD40}"/>
+          </ac:spMkLst>
+        </pc:spChg>
+        <pc:grpChg chg="add mod">
+          <ac:chgData name="윤성재" userId="76c7d8b9-0ed6-42c3-8827-8b2f94b0779a" providerId="ADAL" clId="{BE45B969-9097-4DAA-9E48-A61D72BE3E25}" dt="2020-09-29T06:20:34.314" v="4838" actId="1076"/>
+          <ac:grpSpMkLst>
+            <pc:docMk/>
+            <pc:sldMk cId="745412383" sldId="269"/>
+            <ac:grpSpMk id="4" creationId="{875AA8F6-8090-4C2A-BE7F-24210FC7A81F}"/>
+          </ac:grpSpMkLst>
+        </pc:grpChg>
+        <pc:cxnChg chg="add del mod">
+          <ac:chgData name="윤성재" userId="76c7d8b9-0ed6-42c3-8827-8b2f94b0779a" providerId="ADAL" clId="{BE45B969-9097-4DAA-9E48-A61D72BE3E25}" dt="2020-09-29T06:20:56.017" v="4844" actId="478"/>
+          <ac:cxnSpMkLst>
+            <pc:docMk/>
+            <pc:sldMk cId="745412383" sldId="269"/>
+            <ac:cxnSpMk id="23" creationId="{69FE14A5-51D7-482D-8533-F97936862950}"/>
+          </ac:cxnSpMkLst>
+        </pc:cxnChg>
+        <pc:cxnChg chg="add del mod">
+          <ac:chgData name="윤성재" userId="76c7d8b9-0ed6-42c3-8827-8b2f94b0779a" providerId="ADAL" clId="{BE45B969-9097-4DAA-9E48-A61D72BE3E25}" dt="2020-09-29T06:21:11.268" v="4848" actId="11529"/>
+          <ac:cxnSpMkLst>
+            <pc:docMk/>
+            <pc:sldMk cId="745412383" sldId="269"/>
+            <ac:cxnSpMk id="26" creationId="{B5290548-2438-4BA1-ABDB-5DC576F7081B}"/>
+          </ac:cxnSpMkLst>
+        </pc:cxnChg>
+        <pc:cxnChg chg="add mod">
+          <ac:chgData name="윤성재" userId="76c7d8b9-0ed6-42c3-8827-8b2f94b0779a" providerId="ADAL" clId="{BE45B969-9097-4DAA-9E48-A61D72BE3E25}" dt="2020-09-29T06:21:29.601" v="4851" actId="208"/>
+          <ac:cxnSpMkLst>
+            <pc:docMk/>
+            <pc:sldMk cId="745412383" sldId="269"/>
+            <ac:cxnSpMk id="29" creationId="{D4706248-7533-48A6-B37A-21F8C40B84D5}"/>
+          </ac:cxnSpMkLst>
+        </pc:cxnChg>
+        <pc:cxnChg chg="add del mod">
+          <ac:chgData name="윤성재" userId="76c7d8b9-0ed6-42c3-8827-8b2f94b0779a" providerId="ADAL" clId="{BE45B969-9097-4DAA-9E48-A61D72BE3E25}" dt="2020-09-29T06:21:32.961" v="4853" actId="478"/>
+          <ac:cxnSpMkLst>
+            <pc:docMk/>
+            <pc:sldMk cId="745412383" sldId="269"/>
+            <ac:cxnSpMk id="31" creationId="{7A886F54-901D-41A0-AA00-C7A97FB3B0BB}"/>
+          </ac:cxnSpMkLst>
+        </pc:cxnChg>
+        <pc:cxnChg chg="add del mod">
+          <ac:chgData name="윤성재" userId="76c7d8b9-0ed6-42c3-8827-8b2f94b0779a" providerId="ADAL" clId="{BE45B969-9097-4DAA-9E48-A61D72BE3E25}" dt="2020-09-29T06:21:41.955" v="4855" actId="478"/>
+          <ac:cxnSpMkLst>
+            <pc:docMk/>
+            <pc:sldMk cId="745412383" sldId="269"/>
+            <ac:cxnSpMk id="33" creationId="{50CA704C-8CC9-45F8-B659-7065B81DCC21}"/>
+          </ac:cxnSpMkLst>
+        </pc:cxnChg>
+        <pc:cxnChg chg="add mod">
+          <ac:chgData name="윤성재" userId="76c7d8b9-0ed6-42c3-8827-8b2f94b0779a" providerId="ADAL" clId="{BE45B969-9097-4DAA-9E48-A61D72BE3E25}" dt="2020-09-29T06:24:38.483" v="5029" actId="14100"/>
+          <ac:cxnSpMkLst>
+            <pc:docMk/>
+            <pc:sldMk cId="745412383" sldId="269"/>
+            <ac:cxnSpMk id="35" creationId="{1E7A633D-2707-4527-AE67-6234659C255E}"/>
+          </ac:cxnSpMkLst>
+        </pc:cxnChg>
+        <pc:cxnChg chg="add mod">
+          <ac:chgData name="윤성재" userId="76c7d8b9-0ed6-42c3-8827-8b2f94b0779a" providerId="ADAL" clId="{BE45B969-9097-4DAA-9E48-A61D72BE3E25}" dt="2020-09-29T06:21:56.939" v="4859" actId="1076"/>
+          <ac:cxnSpMkLst>
+            <pc:docMk/>
+            <pc:sldMk cId="745412383" sldId="269"/>
+            <ac:cxnSpMk id="36" creationId="{A487FF07-85A9-476B-B0E2-EBF01E941F3E}"/>
+          </ac:cxnSpMkLst>
+        </pc:cxnChg>
+        <pc:cxnChg chg="add mod">
+          <ac:chgData name="윤성재" userId="76c7d8b9-0ed6-42c3-8827-8b2f94b0779a" providerId="ADAL" clId="{BE45B969-9097-4DAA-9E48-A61D72BE3E25}" dt="2020-09-29T06:22:00.517" v="4861" actId="1076"/>
+          <ac:cxnSpMkLst>
+            <pc:docMk/>
+            <pc:sldMk cId="745412383" sldId="269"/>
+            <ac:cxnSpMk id="37" creationId="{059DAB48-53AA-4119-9DA7-0CF105B7021F}"/>
+          </ac:cxnSpMkLst>
+        </pc:cxnChg>
+        <pc:cxnChg chg="add del mod">
+          <ac:chgData name="윤성재" userId="76c7d8b9-0ed6-42c3-8827-8b2f94b0779a" providerId="ADAL" clId="{BE45B969-9097-4DAA-9E48-A61D72BE3E25}" dt="2020-09-29T06:22:11.687" v="4863" actId="478"/>
+          <ac:cxnSpMkLst>
+            <pc:docMk/>
+            <pc:sldMk cId="745412383" sldId="269"/>
+            <ac:cxnSpMk id="39" creationId="{B657AA32-9DF8-42AF-8822-37E0BA00022B}"/>
+          </ac:cxnSpMkLst>
+        </pc:cxnChg>
+        <pc:cxnChg chg="add mod">
+          <ac:chgData name="윤성재" userId="76c7d8b9-0ed6-42c3-8827-8b2f94b0779a" providerId="ADAL" clId="{BE45B969-9097-4DAA-9E48-A61D72BE3E25}" dt="2020-09-29T06:22:46.379" v="4879" actId="14100"/>
+          <ac:cxnSpMkLst>
+            <pc:docMk/>
+            <pc:sldMk cId="745412383" sldId="269"/>
+            <ac:cxnSpMk id="41" creationId="{18623BC2-1179-40DF-A4CC-E07352B48E86}"/>
+          </ac:cxnSpMkLst>
+        </pc:cxnChg>
+        <pc:cxnChg chg="add mod">
+          <ac:chgData name="윤성재" userId="76c7d8b9-0ed6-42c3-8827-8b2f94b0779a" providerId="ADAL" clId="{BE45B969-9097-4DAA-9E48-A61D72BE3E25}" dt="2020-09-29T06:22:49.794" v="4882" actId="14100"/>
+          <ac:cxnSpMkLst>
+            <pc:docMk/>
+            <pc:sldMk cId="745412383" sldId="269"/>
+            <ac:cxnSpMk id="44" creationId="{9E2B1147-598D-4A8C-8C8C-F1923F09C3CE}"/>
+          </ac:cxnSpMkLst>
+        </pc:cxnChg>
+        <pc:cxnChg chg="add mod">
+          <ac:chgData name="윤성재" userId="76c7d8b9-0ed6-42c3-8827-8b2f94b0779a" providerId="ADAL" clId="{BE45B969-9097-4DAA-9E48-A61D72BE3E25}" dt="2020-09-29T06:22:52.764" v="4885" actId="14100"/>
+          <ac:cxnSpMkLst>
+            <pc:docMk/>
+            <pc:sldMk cId="745412383" sldId="269"/>
+            <ac:cxnSpMk id="47" creationId="{CD4FAC89-895C-45AE-8F27-811D8261DCA1}"/>
+          </ac:cxnSpMkLst>
+        </pc:cxnChg>
+        <pc:cxnChg chg="add mod">
+          <ac:chgData name="윤성재" userId="76c7d8b9-0ed6-42c3-8827-8b2f94b0779a" providerId="ADAL" clId="{BE45B969-9097-4DAA-9E48-A61D72BE3E25}" dt="2020-09-29T06:22:56.769" v="4888" actId="14100"/>
+          <ac:cxnSpMkLst>
+            <pc:docMk/>
+            <pc:sldMk cId="745412383" sldId="269"/>
+            <ac:cxnSpMk id="50" creationId="{A62A7C35-AFCD-4F09-8D46-2A52615A7880}"/>
+          </ac:cxnSpMkLst>
+        </pc:cxnChg>
+        <pc:cxnChg chg="add mod">
+          <ac:chgData name="윤성재" userId="76c7d8b9-0ed6-42c3-8827-8b2f94b0779a" providerId="ADAL" clId="{BE45B969-9097-4DAA-9E48-A61D72BE3E25}" dt="2020-09-29T06:23:00.234" v="4891" actId="14100"/>
+          <ac:cxnSpMkLst>
+            <pc:docMk/>
+            <pc:sldMk cId="745412383" sldId="269"/>
+            <ac:cxnSpMk id="53" creationId="{E394813B-B46B-4022-BE51-45D0A70C8DC4}"/>
+          </ac:cxnSpMkLst>
+        </pc:cxnChg>
+        <pc:cxnChg chg="add mod">
+          <ac:chgData name="윤성재" userId="76c7d8b9-0ed6-42c3-8827-8b2f94b0779a" providerId="ADAL" clId="{BE45B969-9097-4DAA-9E48-A61D72BE3E25}" dt="2020-09-29T06:23:03.313" v="4894" actId="14100"/>
+          <ac:cxnSpMkLst>
+            <pc:docMk/>
+            <pc:sldMk cId="745412383" sldId="269"/>
+            <ac:cxnSpMk id="56" creationId="{20BF709C-61E5-4C43-934E-9C33EB87AD8F}"/>
+          </ac:cxnSpMkLst>
+        </pc:cxnChg>
+        <pc:cxnChg chg="add del mod">
+          <ac:chgData name="윤성재" userId="76c7d8b9-0ed6-42c3-8827-8b2f94b0779a" providerId="ADAL" clId="{BE45B969-9097-4DAA-9E48-A61D72BE3E25}" dt="2020-09-29T06:23:17.899" v="4901" actId="478"/>
+          <ac:cxnSpMkLst>
+            <pc:docMk/>
+            <pc:sldMk cId="745412383" sldId="269"/>
+            <ac:cxnSpMk id="59" creationId="{7A195467-7E50-486C-844C-B868756DF8C9}"/>
+          </ac:cxnSpMkLst>
+        </pc:cxnChg>
+        <pc:cxnChg chg="add del mod">
+          <ac:chgData name="윤성재" userId="76c7d8b9-0ed6-42c3-8827-8b2f94b0779a" providerId="ADAL" clId="{BE45B969-9097-4DAA-9E48-A61D72BE3E25}" dt="2020-09-29T06:23:17.899" v="4901" actId="478"/>
+          <ac:cxnSpMkLst>
+            <pc:docMk/>
+            <pc:sldMk cId="745412383" sldId="269"/>
+            <ac:cxnSpMk id="60" creationId="{29A53881-DE25-4C92-9E86-13EA93F3B086}"/>
+          </ac:cxnSpMkLst>
+        </pc:cxnChg>
+        <pc:cxnChg chg="add del mod">
+          <ac:chgData name="윤성재" userId="76c7d8b9-0ed6-42c3-8827-8b2f94b0779a" providerId="ADAL" clId="{BE45B969-9097-4DAA-9E48-A61D72BE3E25}" dt="2020-09-29T06:23:17.899" v="4901" actId="478"/>
+          <ac:cxnSpMkLst>
+            <pc:docMk/>
+            <pc:sldMk cId="745412383" sldId="269"/>
+            <ac:cxnSpMk id="61" creationId="{85664941-8321-45BA-BF80-AACD3109798D}"/>
+          </ac:cxnSpMkLst>
+        </pc:cxnChg>
+        <pc:cxnChg chg="add del mod">
+          <ac:chgData name="윤성재" userId="76c7d8b9-0ed6-42c3-8827-8b2f94b0779a" providerId="ADAL" clId="{BE45B969-9097-4DAA-9E48-A61D72BE3E25}" dt="2020-09-29T06:23:17.899" v="4901" actId="478"/>
+          <ac:cxnSpMkLst>
+            <pc:docMk/>
+            <pc:sldMk cId="745412383" sldId="269"/>
+            <ac:cxnSpMk id="62" creationId="{9798A991-8C17-40F0-95E5-2D4D8BF0D9C3}"/>
+          </ac:cxnSpMkLst>
+        </pc:cxnChg>
+        <pc:cxnChg chg="add del mod">
+          <ac:chgData name="윤성재" userId="76c7d8b9-0ed6-42c3-8827-8b2f94b0779a" providerId="ADAL" clId="{BE45B969-9097-4DAA-9E48-A61D72BE3E25}" dt="2020-09-29T06:23:17.899" v="4901" actId="478"/>
+          <ac:cxnSpMkLst>
+            <pc:docMk/>
+            <pc:sldMk cId="745412383" sldId="269"/>
+            <ac:cxnSpMk id="63" creationId="{1A10387E-39CF-41DF-8C4F-FF2DDB9E5E8F}"/>
+          </ac:cxnSpMkLst>
+        </pc:cxnChg>
+        <pc:cxnChg chg="add del mod">
+          <ac:chgData name="윤성재" userId="76c7d8b9-0ed6-42c3-8827-8b2f94b0779a" providerId="ADAL" clId="{BE45B969-9097-4DAA-9E48-A61D72BE3E25}" dt="2020-09-29T06:23:17.899" v="4901" actId="478"/>
+          <ac:cxnSpMkLst>
+            <pc:docMk/>
+            <pc:sldMk cId="745412383" sldId="269"/>
+            <ac:cxnSpMk id="64" creationId="{B2D3DA5A-CB66-4480-AC80-F7302EC464E0}"/>
+          </ac:cxnSpMkLst>
+        </pc:cxnChg>
+        <pc:cxnChg chg="add mod">
+          <ac:chgData name="윤성재" userId="76c7d8b9-0ed6-42c3-8827-8b2f94b0779a" providerId="ADAL" clId="{BE45B969-9097-4DAA-9E48-A61D72BE3E25}" dt="2020-09-29T06:23:22.185" v="4904" actId="14100"/>
+          <ac:cxnSpMkLst>
+            <pc:docMk/>
+            <pc:sldMk cId="745412383" sldId="269"/>
+            <ac:cxnSpMk id="77" creationId="{CC89F590-D686-44C9-8C9E-52741255D79A}"/>
+          </ac:cxnSpMkLst>
+        </pc:cxnChg>
+        <pc:cxnChg chg="add mod">
+          <ac:chgData name="윤성재" userId="76c7d8b9-0ed6-42c3-8827-8b2f94b0779a" providerId="ADAL" clId="{BE45B969-9097-4DAA-9E48-A61D72BE3E25}" dt="2020-09-29T06:23:27.106" v="4907" actId="14100"/>
+          <ac:cxnSpMkLst>
+            <pc:docMk/>
+            <pc:sldMk cId="745412383" sldId="269"/>
+            <ac:cxnSpMk id="80" creationId="{F08B391A-C93A-4A4A-AC4C-D00C68EC93A2}"/>
+          </ac:cxnSpMkLst>
+        </pc:cxnChg>
+        <pc:cxnChg chg="add mod">
+          <ac:chgData name="윤성재" userId="76c7d8b9-0ed6-42c3-8827-8b2f94b0779a" providerId="ADAL" clId="{BE45B969-9097-4DAA-9E48-A61D72BE3E25}" dt="2020-09-29T06:23:29.610" v="4910" actId="14100"/>
+          <ac:cxnSpMkLst>
+            <pc:docMk/>
+            <pc:sldMk cId="745412383" sldId="269"/>
+            <ac:cxnSpMk id="83" creationId="{F79B2ED6-EAA5-4077-82D2-BC13871C3709}"/>
+          </ac:cxnSpMkLst>
+        </pc:cxnChg>
+        <pc:cxnChg chg="add mod">
+          <ac:chgData name="윤성재" userId="76c7d8b9-0ed6-42c3-8827-8b2f94b0779a" providerId="ADAL" clId="{BE45B969-9097-4DAA-9E48-A61D72BE3E25}" dt="2020-09-29T06:23:32.778" v="4913" actId="14100"/>
+          <ac:cxnSpMkLst>
+            <pc:docMk/>
+            <pc:sldMk cId="745412383" sldId="269"/>
+            <ac:cxnSpMk id="86" creationId="{9D63467F-1BCE-4B1B-B2FA-7D316C0137EC}"/>
+          </ac:cxnSpMkLst>
+        </pc:cxnChg>
+        <pc:cxnChg chg="add mod">
+          <ac:chgData name="윤성재" userId="76c7d8b9-0ed6-42c3-8827-8b2f94b0779a" providerId="ADAL" clId="{BE45B969-9097-4DAA-9E48-A61D72BE3E25}" dt="2020-09-29T06:23:35.402" v="4916" actId="14100"/>
+          <ac:cxnSpMkLst>
+            <pc:docMk/>
+            <pc:sldMk cId="745412383" sldId="269"/>
+            <ac:cxnSpMk id="89" creationId="{D5B11397-F25A-4F9E-AFC3-D0BF3DBE28DC}"/>
+          </ac:cxnSpMkLst>
+        </pc:cxnChg>
+        <pc:cxnChg chg="add mod">
+          <ac:chgData name="윤성재" userId="76c7d8b9-0ed6-42c3-8827-8b2f94b0779a" providerId="ADAL" clId="{BE45B969-9097-4DAA-9E48-A61D72BE3E25}" dt="2020-09-29T06:23:38.106" v="4919" actId="14100"/>
+          <ac:cxnSpMkLst>
+            <pc:docMk/>
+            <pc:sldMk cId="745412383" sldId="269"/>
+            <ac:cxnSpMk id="92" creationId="{9B5886FC-CA96-40CE-B36B-F91F8B112098}"/>
+          </ac:cxnSpMkLst>
+        </pc:cxnChg>
+        <pc:cxnChg chg="add mod">
+          <ac:chgData name="윤성재" userId="76c7d8b9-0ed6-42c3-8827-8b2f94b0779a" providerId="ADAL" clId="{BE45B969-9097-4DAA-9E48-A61D72BE3E25}" dt="2020-09-29T06:24:42.451" v="5032" actId="14100"/>
+          <ac:cxnSpMkLst>
+            <pc:docMk/>
+            <pc:sldMk cId="745412383" sldId="269"/>
+            <ac:cxnSpMk id="103" creationId="{13559331-3278-4CDC-86CF-B23DC5109A1E}"/>
+          </ac:cxnSpMkLst>
+        </pc:cxnChg>
+        <pc:cxnChg chg="add mod">
+          <ac:chgData name="윤성재" userId="76c7d8b9-0ed6-42c3-8827-8b2f94b0779a" providerId="ADAL" clId="{BE45B969-9097-4DAA-9E48-A61D72BE3E25}" dt="2020-09-29T06:24:46.033" v="5035" actId="14100"/>
+          <ac:cxnSpMkLst>
+            <pc:docMk/>
+            <pc:sldMk cId="745412383" sldId="269"/>
+            <ac:cxnSpMk id="106" creationId="{85E8D100-D41F-437C-A267-209BE5E68629}"/>
+          </ac:cxnSpMkLst>
+        </pc:cxnChg>
+        <pc:cxnChg chg="add mod">
+          <ac:chgData name="윤성재" userId="76c7d8b9-0ed6-42c3-8827-8b2f94b0779a" providerId="ADAL" clId="{BE45B969-9097-4DAA-9E48-A61D72BE3E25}" dt="2020-09-29T06:25:29.643" v="5307" actId="14100"/>
+          <ac:cxnSpMkLst>
+            <pc:docMk/>
+            <pc:sldMk cId="745412383" sldId="269"/>
+            <ac:cxnSpMk id="110" creationId="{D63B8B5A-F514-4D40-8BCC-52D0121D2494}"/>
+          </ac:cxnSpMkLst>
+        </pc:cxnChg>
+        <pc:cxnChg chg="add mod">
+          <ac:chgData name="윤성재" userId="76c7d8b9-0ed6-42c3-8827-8b2f94b0779a" providerId="ADAL" clId="{BE45B969-9097-4DAA-9E48-A61D72BE3E25}" dt="2020-09-29T06:25:52.578" v="5406" actId="14100"/>
+          <ac:cxnSpMkLst>
+            <pc:docMk/>
+            <pc:sldMk cId="745412383" sldId="269"/>
+            <ac:cxnSpMk id="112" creationId="{686D3582-73B8-4C1A-8990-6CC69221549B}"/>
+          </ac:cxnSpMkLst>
+        </pc:cxnChg>
+      </pc:sldChg>
+      <pc:sldChg chg="addSp delSp modSp add del mod">
+        <pc:chgData name="윤성재" userId="76c7d8b9-0ed6-42c3-8827-8b2f94b0779a" providerId="ADAL" clId="{BE45B969-9097-4DAA-9E48-A61D72BE3E25}" dt="2020-09-29T07:18:49.946" v="6092" actId="47"/>
+        <pc:sldMkLst>
+          <pc:docMk/>
+          <pc:sldMk cId="2013118764" sldId="270"/>
+        </pc:sldMkLst>
+        <pc:spChg chg="mod">
+          <ac:chgData name="윤성재" userId="76c7d8b9-0ed6-42c3-8827-8b2f94b0779a" providerId="ADAL" clId="{BE45B969-9097-4DAA-9E48-A61D72BE3E25}" dt="2020-09-29T06:31:46.449" v="6058" actId="20577"/>
+          <ac:spMkLst>
+            <pc:docMk/>
+            <pc:sldMk cId="2013118764" sldId="270"/>
+            <ac:spMk id="2" creationId="{8DC282CA-30F9-4B25-A229-375EC981A70B}"/>
+          </ac:spMkLst>
+        </pc:spChg>
+        <pc:spChg chg="add mod">
+          <ac:chgData name="윤성재" userId="76c7d8b9-0ed6-42c3-8827-8b2f94b0779a" providerId="ADAL" clId="{BE45B969-9097-4DAA-9E48-A61D72BE3E25}" dt="2020-09-29T06:30:26.856" v="6036" actId="6549"/>
+          <ac:spMkLst>
+            <pc:docMk/>
+            <pc:sldMk cId="2013118764" sldId="270"/>
+            <ac:spMk id="3" creationId="{8A5E5F41-3EA6-4EF5-BAD0-72E99AFC4DC3}"/>
+          </ac:spMkLst>
+        </pc:spChg>
+        <pc:spChg chg="mod topLvl">
+          <ac:chgData name="윤성재" userId="76c7d8b9-0ed6-42c3-8827-8b2f94b0779a" providerId="ADAL" clId="{BE45B969-9097-4DAA-9E48-A61D72BE3E25}" dt="2020-09-29T06:29:48.642" v="6021" actId="1038"/>
+          <ac:spMkLst>
+            <pc:docMk/>
+            <pc:sldMk cId="2013118764" sldId="270"/>
+            <ac:spMk id="4" creationId="{546C1C8D-8527-4202-95D5-43B4FEBB3DE7}"/>
+          </ac:spMkLst>
+        </pc:spChg>
+        <pc:spChg chg="add mod">
+          <ac:chgData name="윤성재" userId="76c7d8b9-0ed6-42c3-8827-8b2f94b0779a" providerId="ADAL" clId="{BE45B969-9097-4DAA-9E48-A61D72BE3E25}" dt="2020-09-29T06:32:36.608" v="6065" actId="1076"/>
+          <ac:spMkLst>
+            <pc:docMk/>
+            <pc:sldMk cId="2013118764" sldId="270"/>
+            <ac:spMk id="5" creationId="{DD83B7BB-4F98-4EC0-A907-832F4FE02C68}"/>
+          </ac:spMkLst>
+        </pc:spChg>
+        <pc:spChg chg="mod topLvl">
+          <ac:chgData name="윤성재" userId="76c7d8b9-0ed6-42c3-8827-8b2f94b0779a" providerId="ADAL" clId="{BE45B969-9097-4DAA-9E48-A61D72BE3E25}" dt="2020-09-29T06:29:46.905" v="6018" actId="1076"/>
+          <ac:spMkLst>
+            <pc:docMk/>
+            <pc:sldMk cId="2013118764" sldId="270"/>
+            <ac:spMk id="6" creationId="{1D33AF0D-139F-44AD-B10F-CEBFBD00ACBE}"/>
+          </ac:spMkLst>
+        </pc:spChg>
+        <pc:spChg chg="add mod">
+          <ac:chgData name="윤성재" userId="76c7d8b9-0ed6-42c3-8827-8b2f94b0779a" providerId="ADAL" clId="{BE45B969-9097-4DAA-9E48-A61D72BE3E25}" dt="2020-09-29T06:31:06.953" v="6047" actId="1076"/>
+          <ac:spMkLst>
+            <pc:docMk/>
+            <pc:sldMk cId="2013118764" sldId="270"/>
+            <ac:spMk id="7" creationId="{A177458D-FD83-4EF6-9D80-D09D32566A94}"/>
+          </ac:spMkLst>
+        </pc:spChg>
+        <pc:spChg chg="mod topLvl">
+          <ac:chgData name="윤성재" userId="76c7d8b9-0ed6-42c3-8827-8b2f94b0779a" providerId="ADAL" clId="{BE45B969-9097-4DAA-9E48-A61D72BE3E25}" dt="2020-09-29T06:30:06.489" v="6030" actId="1076"/>
+          <ac:spMkLst>
+            <pc:docMk/>
+            <pc:sldMk cId="2013118764" sldId="270"/>
+            <ac:spMk id="8" creationId="{A7F61406-EFBE-451B-B60A-FD3E9D5703E3}"/>
+          </ac:spMkLst>
+        </pc:spChg>
+        <pc:spChg chg="add mod">
+          <ac:chgData name="윤성재" userId="76c7d8b9-0ed6-42c3-8827-8b2f94b0779a" providerId="ADAL" clId="{BE45B969-9097-4DAA-9E48-A61D72BE3E25}" dt="2020-09-29T06:31:18.528" v="6054" actId="1036"/>
+          <ac:spMkLst>
+            <pc:docMk/>
+            <pc:sldMk cId="2013118764" sldId="270"/>
+            <ac:spMk id="9" creationId="{2EAF84A9-05E6-41F3-BC99-CBDFACD83A09}"/>
+          </ac:spMkLst>
+        </pc:spChg>
+        <pc:spChg chg="mod topLvl">
+          <ac:chgData name="윤성재" userId="76c7d8b9-0ed6-42c3-8827-8b2f94b0779a" providerId="ADAL" clId="{BE45B969-9097-4DAA-9E48-A61D72BE3E25}" dt="2020-09-29T06:30:02.113" v="6029" actId="1076"/>
+          <ac:spMkLst>
+            <pc:docMk/>
+            <pc:sldMk cId="2013118764" sldId="270"/>
+            <ac:spMk id="10" creationId="{81467237-12CC-45C3-B0EC-477A39CADEBD}"/>
+          </ac:spMkLst>
+        </pc:spChg>
+        <pc:spChg chg="mod topLvl">
+          <ac:chgData name="윤성재" userId="76c7d8b9-0ed6-42c3-8827-8b2f94b0779a" providerId="ADAL" clId="{BE45B969-9097-4DAA-9E48-A61D72BE3E25}" dt="2020-09-29T06:29:44.425" v="6017" actId="165"/>
+          <ac:spMkLst>
+            <pc:docMk/>
+            <pc:sldMk cId="2013118764" sldId="270"/>
+            <ac:spMk id="12" creationId="{31F6869D-E20E-43C2-872D-7BF06B327E55}"/>
+          </ac:spMkLst>
+        </pc:spChg>
+        <pc:spChg chg="del">
+          <ac:chgData name="윤성재" userId="76c7d8b9-0ed6-42c3-8827-8b2f94b0779a" providerId="ADAL" clId="{BE45B969-9097-4DAA-9E48-A61D72BE3E25}" dt="2020-09-29T06:29:36.215" v="6013" actId="478"/>
+          <ac:spMkLst>
+            <pc:docMk/>
+            <pc:sldMk cId="2013118764" sldId="270"/>
+            <ac:spMk id="14" creationId="{7D116FF5-88BA-444E-A62D-5180A1091471}"/>
+          </ac:spMkLst>
+        </pc:spChg>
+        <pc:spChg chg="mod topLvl">
+          <ac:chgData name="윤성재" userId="76c7d8b9-0ed6-42c3-8827-8b2f94b0779a" providerId="ADAL" clId="{BE45B969-9097-4DAA-9E48-A61D72BE3E25}" dt="2020-09-29T06:29:44.425" v="6017" actId="165"/>
+          <ac:spMkLst>
+            <pc:docMk/>
+            <pc:sldMk cId="2013118764" sldId="270"/>
+            <ac:spMk id="18" creationId="{6260F2DF-0F2A-4901-BBC1-D461585DFC0F}"/>
+          </ac:spMkLst>
+        </pc:spChg>
+        <pc:spChg chg="del mod topLvl">
+          <ac:chgData name="윤성재" userId="76c7d8b9-0ed6-42c3-8827-8b2f94b0779a" providerId="ADAL" clId="{BE45B969-9097-4DAA-9E48-A61D72BE3E25}" dt="2020-09-29T06:29:51.148" v="6022" actId="478"/>
+          <ac:spMkLst>
+            <pc:docMk/>
+            <pc:sldMk cId="2013118764" sldId="270"/>
+            <ac:spMk id="20" creationId="{9CE5E5F9-4BCB-401B-AA77-2E0E725D0B4D}"/>
+          </ac:spMkLst>
+        </pc:spChg>
+        <pc:spChg chg="del mod topLvl">
+          <ac:chgData name="윤성재" userId="76c7d8b9-0ed6-42c3-8827-8b2f94b0779a" providerId="ADAL" clId="{BE45B969-9097-4DAA-9E48-A61D72BE3E25}" dt="2020-09-29T06:29:52.756" v="6024" actId="478"/>
+          <ac:spMkLst>
+            <pc:docMk/>
+            <pc:sldMk cId="2013118764" sldId="270"/>
+            <ac:spMk id="22" creationId="{A16E8507-F4BD-4861-8CEC-1543FEDC8E37}"/>
+          </ac:spMkLst>
+        </pc:spChg>
+        <pc:spChg chg="del mod topLvl">
+          <ac:chgData name="윤성재" userId="76c7d8b9-0ed6-42c3-8827-8b2f94b0779a" providerId="ADAL" clId="{BE45B969-9097-4DAA-9E48-A61D72BE3E25}" dt="2020-09-29T06:29:55.807" v="6027" actId="478"/>
+          <ac:spMkLst>
+            <pc:docMk/>
+            <pc:sldMk cId="2013118764" sldId="270"/>
+            <ac:spMk id="24" creationId="{E08BE75C-AC27-47E0-B8F6-8AA2E6EF36C1}"/>
+          </ac:spMkLst>
+        </pc:spChg>
+        <pc:spChg chg="mod topLvl">
+          <ac:chgData name="윤성재" userId="76c7d8b9-0ed6-42c3-8827-8b2f94b0779a" providerId="ADAL" clId="{BE45B969-9097-4DAA-9E48-A61D72BE3E25}" dt="2020-09-29T06:29:44.425" v="6017" actId="165"/>
+          <ac:spMkLst>
+            <pc:docMk/>
+            <pc:sldMk cId="2013118764" sldId="270"/>
+            <ac:spMk id="28" creationId="{74523349-E141-4614-A63B-5E5307EA244B}"/>
+          </ac:spMkLst>
+        </pc:spChg>
+        <pc:spChg chg="del mod topLvl">
+          <ac:chgData name="윤성재" userId="76c7d8b9-0ed6-42c3-8827-8b2f94b0779a" providerId="ADAL" clId="{BE45B969-9097-4DAA-9E48-A61D72BE3E25}" dt="2020-09-29T06:29:54.906" v="6026" actId="478"/>
+          <ac:spMkLst>
+            <pc:docMk/>
+            <pc:sldMk cId="2013118764" sldId="270"/>
+            <ac:spMk id="30" creationId="{E1AF28B2-3B6F-4052-ADF9-00CC894413FD}"/>
+          </ac:spMkLst>
+        </pc:spChg>
+        <pc:spChg chg="del mod topLvl">
+          <ac:chgData name="윤성재" userId="76c7d8b9-0ed6-42c3-8827-8b2f94b0779a" providerId="ADAL" clId="{BE45B969-9097-4DAA-9E48-A61D72BE3E25}" dt="2020-09-29T06:29:56.742" v="6028" actId="478"/>
+          <ac:spMkLst>
+            <pc:docMk/>
+            <pc:sldMk cId="2013118764" sldId="270"/>
+            <ac:spMk id="32" creationId="{06F997F2-65A8-44FE-B39D-D960107F3822}"/>
+          </ac:spMkLst>
+        </pc:spChg>
+        <pc:spChg chg="del mod topLvl">
+          <ac:chgData name="윤성재" userId="76c7d8b9-0ed6-42c3-8827-8b2f94b0779a" providerId="ADAL" clId="{BE45B969-9097-4DAA-9E48-A61D72BE3E25}" dt="2020-09-29T06:29:53.912" v="6025" actId="478"/>
+          <ac:spMkLst>
+            <pc:docMk/>
+            <pc:sldMk cId="2013118764" sldId="270"/>
+            <ac:spMk id="34" creationId="{767665A5-A1FD-4D8D-AEF0-991E8D58C946}"/>
+          </ac:spMkLst>
+        </pc:spChg>
+        <pc:spChg chg="mod topLvl">
+          <ac:chgData name="윤성재" userId="76c7d8b9-0ed6-42c3-8827-8b2f94b0779a" providerId="ADAL" clId="{BE45B969-9097-4DAA-9E48-A61D72BE3E25}" dt="2020-09-29T06:29:44.425" v="6017" actId="165"/>
+          <ac:spMkLst>
+            <pc:docMk/>
+            <pc:sldMk cId="2013118764" sldId="270"/>
+            <ac:spMk id="36" creationId="{1E4F70E2-62E4-4A91-81F8-DBC9DD2E7A7F}"/>
+          </ac:spMkLst>
+        </pc:spChg>
+        <pc:spChg chg="mod topLvl">
+          <ac:chgData name="윤성재" userId="76c7d8b9-0ed6-42c3-8827-8b2f94b0779a" providerId="ADAL" clId="{BE45B969-9097-4DAA-9E48-A61D72BE3E25}" dt="2020-09-29T06:29:44.425" v="6017" actId="165"/>
+          <ac:spMkLst>
+            <pc:docMk/>
+            <pc:sldMk cId="2013118764" sldId="270"/>
+            <ac:spMk id="44" creationId="{49DB4571-8F1E-473C-A39A-1341878B46E5}"/>
+          </ac:spMkLst>
+        </pc:spChg>
+        <pc:spChg chg="mod">
+          <ac:chgData name="윤성재" userId="76c7d8b9-0ed6-42c3-8827-8b2f94b0779a" providerId="ADAL" clId="{BE45B969-9097-4DAA-9E48-A61D72BE3E25}" dt="2020-09-29T06:31:59.945" v="6060" actId="14100"/>
+          <ac:spMkLst>
+            <pc:docMk/>
+            <pc:sldMk cId="2013118764" sldId="270"/>
+            <ac:spMk id="51" creationId="{74B0F85C-B08B-4FBE-8563-41DE777D9AA9}"/>
+          </ac:spMkLst>
+        </pc:spChg>
+        <pc:spChg chg="del">
+          <ac:chgData name="윤성재" userId="76c7d8b9-0ed6-42c3-8827-8b2f94b0779a" providerId="ADAL" clId="{BE45B969-9097-4DAA-9E48-A61D72BE3E25}" dt="2020-09-29T06:29:51.895" v="6023" actId="478"/>
+          <ac:spMkLst>
+            <pc:docMk/>
+            <pc:sldMk cId="2013118764" sldId="270"/>
+            <ac:spMk id="54" creationId="{6FA503E1-C355-4BB9-8A8D-C33B023D0877}"/>
+          </ac:spMkLst>
+        </pc:spChg>
+        <pc:grpChg chg="del mod">
+          <ac:chgData name="윤성재" userId="76c7d8b9-0ed6-42c3-8827-8b2f94b0779a" providerId="ADAL" clId="{BE45B969-9097-4DAA-9E48-A61D72BE3E25}" dt="2020-09-29T06:29:44.425" v="6017" actId="165"/>
+          <ac:grpSpMkLst>
+            <pc:docMk/>
+            <pc:sldMk cId="2013118764" sldId="270"/>
+            <ac:grpSpMk id="52" creationId="{CDF757E4-7F13-4D32-8051-C34631A3C07E}"/>
+          </ac:grpSpMkLst>
+        </pc:grpChg>
+        <pc:cxnChg chg="mod">
+          <ac:chgData name="윤성재" userId="76c7d8b9-0ed6-42c3-8827-8b2f94b0779a" providerId="ADAL" clId="{BE45B969-9097-4DAA-9E48-A61D72BE3E25}" dt="2020-09-29T06:32:03.016" v="6061" actId="14100"/>
+          <ac:cxnSpMkLst>
+            <pc:docMk/>
+            <pc:sldMk cId="2013118764" sldId="270"/>
+            <ac:cxnSpMk id="47" creationId="{A8540E20-AFF2-4E40-B10D-050620E662B5}"/>
+          </ac:cxnSpMkLst>
+        </pc:cxnChg>
+      </pc:sldChg>
+      <pc:sldChg chg="addSp delSp modSp add mod">
+        <pc:chgData name="윤성재" userId="76c7d8b9-0ed6-42c3-8827-8b2f94b0779a" providerId="ADAL" clId="{BE45B969-9097-4DAA-9E48-A61D72BE3E25}" dt="2020-09-29T07:25:35.675" v="6128" actId="20577"/>
+        <pc:sldMkLst>
+          <pc:docMk/>
+          <pc:sldMk cId="69464842" sldId="271"/>
+        </pc:sldMkLst>
+        <pc:spChg chg="mod">
+          <ac:chgData name="윤성재" userId="76c7d8b9-0ed6-42c3-8827-8b2f94b0779a" providerId="ADAL" clId="{BE45B969-9097-4DAA-9E48-A61D72BE3E25}" dt="2020-09-29T06:33:18.087" v="6070" actId="20577"/>
+          <ac:spMkLst>
+            <pc:docMk/>
+            <pc:sldMk cId="69464842" sldId="271"/>
+            <ac:spMk id="2" creationId="{8DC282CA-30F9-4B25-A229-375EC981A70B}"/>
+          </ac:spMkLst>
+        </pc:spChg>
+        <pc:spChg chg="add mod">
+          <ac:chgData name="윤성재" userId="76c7d8b9-0ed6-42c3-8827-8b2f94b0779a" providerId="ADAL" clId="{BE45B969-9097-4DAA-9E48-A61D72BE3E25}" dt="2020-09-29T07:19:52.766" v="6120" actId="1076"/>
+          <ac:spMkLst>
+            <pc:docMk/>
+            <pc:sldMk cId="69464842" sldId="271"/>
+            <ac:spMk id="3" creationId="{67706727-F16F-4232-B554-CA8D2DF6C30B}"/>
+          </ac:spMkLst>
+        </pc:spChg>
+        <pc:spChg chg="mod topLvl">
+          <ac:chgData name="윤성재" userId="76c7d8b9-0ed6-42c3-8827-8b2f94b0779a" providerId="ADAL" clId="{BE45B969-9097-4DAA-9E48-A61D72BE3E25}" dt="2020-09-29T06:33:30.610" v="6080" actId="165"/>
+          <ac:spMkLst>
+            <pc:docMk/>
+            <pc:sldMk cId="69464842" sldId="271"/>
+            <ac:spMk id="4" creationId="{546C1C8D-8527-4202-95D5-43B4FEBB3DE7}"/>
+          </ac:spMkLst>
+        </pc:spChg>
+        <pc:spChg chg="add del">
+          <ac:chgData name="윤성재" userId="76c7d8b9-0ed6-42c3-8827-8b2f94b0779a" providerId="ADAL" clId="{BE45B969-9097-4DAA-9E48-A61D72BE3E25}" dt="2020-09-29T07:19:35.977" v="6099" actId="478"/>
+          <ac:spMkLst>
+            <pc:docMk/>
+            <pc:sldMk cId="69464842" sldId="271"/>
+            <ac:spMk id="5" creationId="{2ACBF8FB-6C3A-4CA2-8950-12F2E2DD7341}"/>
+          </ac:spMkLst>
+        </pc:spChg>
+        <pc:spChg chg="mod topLvl">
+          <ac:chgData name="윤성재" userId="76c7d8b9-0ed6-42c3-8827-8b2f94b0779a" providerId="ADAL" clId="{BE45B969-9097-4DAA-9E48-A61D72BE3E25}" dt="2020-09-29T06:33:30.610" v="6080" actId="165"/>
+          <ac:spMkLst>
+            <pc:docMk/>
+            <pc:sldMk cId="69464842" sldId="271"/>
+            <ac:spMk id="6" creationId="{1D33AF0D-139F-44AD-B10F-CEBFBD00ACBE}"/>
+          </ac:spMkLst>
+        </pc:spChg>
+        <pc:spChg chg="add mod">
+          <ac:chgData name="윤성재" userId="76c7d8b9-0ed6-42c3-8827-8b2f94b0779a" providerId="ADAL" clId="{BE45B969-9097-4DAA-9E48-A61D72BE3E25}" dt="2020-09-29T07:19:51.365" v="6119" actId="1076"/>
+          <ac:spMkLst>
+            <pc:docMk/>
+            <pc:sldMk cId="69464842" sldId="271"/>
+            <ac:spMk id="7" creationId="{A8138C32-62DB-41B8-A9EB-F6A476229384}"/>
+          </ac:spMkLst>
+        </pc:spChg>
+        <pc:spChg chg="mod topLvl">
+          <ac:chgData name="윤성재" userId="76c7d8b9-0ed6-42c3-8827-8b2f94b0779a" providerId="ADAL" clId="{BE45B969-9097-4DAA-9E48-A61D72BE3E25}" dt="2020-09-29T06:33:30.610" v="6080" actId="165"/>
+          <ac:spMkLst>
+            <pc:docMk/>
+            <pc:sldMk cId="69464842" sldId="271"/>
+            <ac:spMk id="8" creationId="{A7F61406-EFBE-451B-B60A-FD3E9D5703E3}"/>
+          </ac:spMkLst>
+        </pc:spChg>
+        <pc:spChg chg="mod topLvl">
+          <ac:chgData name="윤성재" userId="76c7d8b9-0ed6-42c3-8827-8b2f94b0779a" providerId="ADAL" clId="{BE45B969-9097-4DAA-9E48-A61D72BE3E25}" dt="2020-09-29T06:33:30.610" v="6080" actId="165"/>
+          <ac:spMkLst>
+            <pc:docMk/>
+            <pc:sldMk cId="69464842" sldId="271"/>
+            <ac:spMk id="10" creationId="{81467237-12CC-45C3-B0EC-477A39CADEBD}"/>
+          </ac:spMkLst>
+        </pc:spChg>
+        <pc:spChg chg="mod topLvl">
+          <ac:chgData name="윤성재" userId="76c7d8b9-0ed6-42c3-8827-8b2f94b0779a" providerId="ADAL" clId="{BE45B969-9097-4DAA-9E48-A61D72BE3E25}" dt="2020-09-29T06:34:38.625" v="6091" actId="14100"/>
+          <ac:spMkLst>
+            <pc:docMk/>
+            <pc:sldMk cId="69464842" sldId="271"/>
+            <ac:spMk id="12" creationId="{31F6869D-E20E-43C2-872D-7BF06B327E55}"/>
+          </ac:spMkLst>
+        </pc:spChg>
+        <pc:spChg chg="del mod topLvl">
+          <ac:chgData name="윤성재" userId="76c7d8b9-0ed6-42c3-8827-8b2f94b0779a" providerId="ADAL" clId="{BE45B969-9097-4DAA-9E48-A61D72BE3E25}" dt="2020-09-29T06:33:31.696" v="6081" actId="478"/>
+          <ac:spMkLst>
+            <pc:docMk/>
+            <pc:sldMk cId="69464842" sldId="271"/>
+            <ac:spMk id="14" creationId="{7D116FF5-88BA-444E-A62D-5180A1091471}"/>
+          </ac:spMkLst>
+        </pc:spChg>
+        <pc:spChg chg="mod topLvl">
+          <ac:chgData name="윤성재" userId="76c7d8b9-0ed6-42c3-8827-8b2f94b0779a" providerId="ADAL" clId="{BE45B969-9097-4DAA-9E48-A61D72BE3E25}" dt="2020-09-29T06:33:30.610" v="6080" actId="165"/>
+          <ac:spMkLst>
+            <pc:docMk/>
+            <pc:sldMk cId="69464842" sldId="271"/>
+            <ac:spMk id="18" creationId="{6260F2DF-0F2A-4901-BBC1-D461585DFC0F}"/>
+          </ac:spMkLst>
+        </pc:spChg>
+        <pc:spChg chg="add del mod topLvl">
+          <ac:chgData name="윤성재" userId="76c7d8b9-0ed6-42c3-8827-8b2f94b0779a" providerId="ADAL" clId="{BE45B969-9097-4DAA-9E48-A61D72BE3E25}" dt="2020-09-29T06:34:04.742" v="6085" actId="478"/>
+          <ac:spMkLst>
+            <pc:docMk/>
+            <pc:sldMk cId="69464842" sldId="271"/>
+            <ac:spMk id="20" creationId="{9CE5E5F9-4BCB-401B-AA77-2E0E725D0B4D}"/>
+          </ac:spMkLst>
+        </pc:spChg>
+        <pc:spChg chg="del mod topLvl">
+          <ac:chgData name="윤성재" userId="76c7d8b9-0ed6-42c3-8827-8b2f94b0779a" providerId="ADAL" clId="{BE45B969-9097-4DAA-9E48-A61D72BE3E25}" dt="2020-09-29T06:34:29.316" v="6086" actId="478"/>
+          <ac:spMkLst>
+            <pc:docMk/>
+            <pc:sldMk cId="69464842" sldId="271"/>
+            <ac:spMk id="22" creationId="{A16E8507-F4BD-4861-8CEC-1543FEDC8E37}"/>
+          </ac:spMkLst>
+        </pc:spChg>
+        <pc:spChg chg="del mod topLvl">
+          <ac:chgData name="윤성재" userId="76c7d8b9-0ed6-42c3-8827-8b2f94b0779a" providerId="ADAL" clId="{BE45B969-9097-4DAA-9E48-A61D72BE3E25}" dt="2020-09-29T06:34:31.930" v="6089" actId="478"/>
+          <ac:spMkLst>
+            <pc:docMk/>
+            <pc:sldMk cId="69464842" sldId="271"/>
+            <ac:spMk id="24" creationId="{E08BE75C-AC27-47E0-B8F6-8AA2E6EF36C1}"/>
+          </ac:spMkLst>
+        </pc:spChg>
+        <pc:spChg chg="mod topLvl">
+          <ac:chgData name="윤성재" userId="76c7d8b9-0ed6-42c3-8827-8b2f94b0779a" providerId="ADAL" clId="{BE45B969-9097-4DAA-9E48-A61D72BE3E25}" dt="2020-09-29T06:33:30.610" v="6080" actId="165"/>
+          <ac:spMkLst>
+            <pc:docMk/>
+            <pc:sldMk cId="69464842" sldId="271"/>
+            <ac:spMk id="28" creationId="{74523349-E141-4614-A63B-5E5307EA244B}"/>
+          </ac:spMkLst>
+        </pc:spChg>
+        <pc:spChg chg="del mod topLvl">
+          <ac:chgData name="윤성재" userId="76c7d8b9-0ed6-42c3-8827-8b2f94b0779a" providerId="ADAL" clId="{BE45B969-9097-4DAA-9E48-A61D72BE3E25}" dt="2020-09-29T06:34:30.907" v="6088" actId="478"/>
+          <ac:spMkLst>
+            <pc:docMk/>
+            <pc:sldMk cId="69464842" sldId="271"/>
+            <ac:spMk id="30" creationId="{E1AF28B2-3B6F-4052-ADF9-00CC894413FD}"/>
+          </ac:spMkLst>
+        </pc:spChg>
+        <pc:spChg chg="del mod topLvl">
+          <ac:chgData name="윤성재" userId="76c7d8b9-0ed6-42c3-8827-8b2f94b0779a" providerId="ADAL" clId="{BE45B969-9097-4DAA-9E48-A61D72BE3E25}" dt="2020-09-29T06:34:33.334" v="6090" actId="478"/>
+          <ac:spMkLst>
+            <pc:docMk/>
+            <pc:sldMk cId="69464842" sldId="271"/>
+            <ac:spMk id="32" creationId="{06F997F2-65A8-44FE-B39D-D960107F3822}"/>
+          </ac:spMkLst>
+        </pc:spChg>
+        <pc:spChg chg="del mod topLvl">
+          <ac:chgData name="윤성재" userId="76c7d8b9-0ed6-42c3-8827-8b2f94b0779a" providerId="ADAL" clId="{BE45B969-9097-4DAA-9E48-A61D72BE3E25}" dt="2020-09-29T06:34:30.080" v="6087" actId="478"/>
+          <ac:spMkLst>
+            <pc:docMk/>
+            <pc:sldMk cId="69464842" sldId="271"/>
+            <ac:spMk id="34" creationId="{767665A5-A1FD-4D8D-AEF0-991E8D58C946}"/>
+          </ac:spMkLst>
+        </pc:spChg>
+        <pc:spChg chg="mod topLvl">
+          <ac:chgData name="윤성재" userId="76c7d8b9-0ed6-42c3-8827-8b2f94b0779a" providerId="ADAL" clId="{BE45B969-9097-4DAA-9E48-A61D72BE3E25}" dt="2020-09-29T06:33:30.610" v="6080" actId="165"/>
+          <ac:spMkLst>
+            <pc:docMk/>
+            <pc:sldMk cId="69464842" sldId="271"/>
+            <ac:spMk id="36" creationId="{1E4F70E2-62E4-4A91-81F8-DBC9DD2E7A7F}"/>
+          </ac:spMkLst>
+        </pc:spChg>
+        <pc:spChg chg="mod topLvl">
+          <ac:chgData name="윤성재" userId="76c7d8b9-0ed6-42c3-8827-8b2f94b0779a" providerId="ADAL" clId="{BE45B969-9097-4DAA-9E48-A61D72BE3E25}" dt="2020-09-29T06:33:30.610" v="6080" actId="165"/>
+          <ac:spMkLst>
+            <pc:docMk/>
+            <pc:sldMk cId="69464842" sldId="271"/>
+            <ac:spMk id="44" creationId="{49DB4571-8F1E-473C-A39A-1341878B46E5}"/>
+          </ac:spMkLst>
+        </pc:spChg>
+        <pc:spChg chg="mod">
+          <ac:chgData name="윤성재" userId="76c7d8b9-0ed6-42c3-8827-8b2f94b0779a" providerId="ADAL" clId="{BE45B969-9097-4DAA-9E48-A61D72BE3E25}" dt="2020-09-29T07:25:35.675" v="6128" actId="20577"/>
+          <ac:spMkLst>
+            <pc:docMk/>
+            <pc:sldMk cId="69464842" sldId="271"/>
+            <ac:spMk id="51" creationId="{74B0F85C-B08B-4FBE-8563-41DE777D9AA9}"/>
+          </ac:spMkLst>
+        </pc:spChg>
+        <pc:grpChg chg="add del mod">
+          <ac:chgData name="윤성재" userId="76c7d8b9-0ed6-42c3-8827-8b2f94b0779a" providerId="ADAL" clId="{BE45B969-9097-4DAA-9E48-A61D72BE3E25}" dt="2020-09-29T06:33:30.610" v="6080" actId="165"/>
+          <ac:grpSpMkLst>
+            <pc:docMk/>
+            <pc:sldMk cId="69464842" sldId="271"/>
+            <ac:grpSpMk id="52" creationId="{CDF757E4-7F13-4D32-8051-C34631A3C07E}"/>
+          </ac:grpSpMkLst>
+        </pc:grpChg>
+      </pc:sldChg>
+    </pc:docChg>
+  </pc:docChgLst>
+  <pc:docChgLst>
     <pc:chgData name="윤성재" userId="76c7d8b9-0ed6-42c3-8827-8b2f94b0779a" providerId="ADAL" clId="{2970B746-A6C8-4DE0-8734-A7350791C1F7}"/>
     <pc:docChg chg="undo custSel addSld delSld modSld modMainMaster">
       <pc:chgData name="윤성재" userId="76c7d8b9-0ed6-42c3-8827-8b2f94b0779a" providerId="ADAL" clId="{2970B746-A6C8-4DE0-8734-A7350791C1F7}" dt="2020-09-22T08:07:57.504" v="6208" actId="20577"/>
@@ -1167,1760 +2921,6 @@
           </pc:spChg>
         </pc:sldLayoutChg>
       </pc:sldMasterChg>
-    </pc:docChg>
-  </pc:docChgLst>
-  <pc:docChgLst>
-    <pc:chgData name="윤성재" userId="76c7d8b9-0ed6-42c3-8827-8b2f94b0779a" providerId="ADAL" clId="{BE45B969-9097-4DAA-9E48-A61D72BE3E25}"/>
-    <pc:docChg chg="undo custSel mod addSld delSld modSld sldOrd">
-      <pc:chgData name="윤성재" userId="76c7d8b9-0ed6-42c3-8827-8b2f94b0779a" providerId="ADAL" clId="{BE45B969-9097-4DAA-9E48-A61D72BE3E25}" dt="2020-09-29T07:25:35.675" v="6128" actId="20577"/>
-      <pc:docMkLst>
-        <pc:docMk/>
-      </pc:docMkLst>
-      <pc:sldChg chg="modSp mod">
-        <pc:chgData name="윤성재" userId="76c7d8b9-0ed6-42c3-8827-8b2f94b0779a" providerId="ADAL" clId="{BE45B969-9097-4DAA-9E48-A61D72BE3E25}" dt="2020-09-28T06:42:01.853" v="31" actId="403"/>
-        <pc:sldMkLst>
-          <pc:docMk/>
-          <pc:sldMk cId="2089202195" sldId="256"/>
-        </pc:sldMkLst>
-        <pc:spChg chg="mod">
-          <ac:chgData name="윤성재" userId="76c7d8b9-0ed6-42c3-8827-8b2f94b0779a" providerId="ADAL" clId="{BE45B969-9097-4DAA-9E48-A61D72BE3E25}" dt="2020-09-28T06:41:50.980" v="20" actId="27636"/>
-          <ac:spMkLst>
-            <pc:docMk/>
-            <pc:sldMk cId="2089202195" sldId="256"/>
-            <ac:spMk id="2" creationId="{090AB03A-CACF-4A35-9F35-73E5904B6393}"/>
-          </ac:spMkLst>
-        </pc:spChg>
-        <pc:spChg chg="mod">
-          <ac:chgData name="윤성재" userId="76c7d8b9-0ed6-42c3-8827-8b2f94b0779a" providerId="ADAL" clId="{BE45B969-9097-4DAA-9E48-A61D72BE3E25}" dt="2020-09-28T06:42:01.853" v="31" actId="403"/>
-          <ac:spMkLst>
-            <pc:docMk/>
-            <pc:sldMk cId="2089202195" sldId="256"/>
-            <ac:spMk id="3" creationId="{87B49B06-895E-478F-9BB9-B05DE6A61938}"/>
-          </ac:spMkLst>
-        </pc:spChg>
-      </pc:sldChg>
-      <pc:sldChg chg="addSp delSp modSp mod setBg setClrOvrMap">
-        <pc:chgData name="윤성재" userId="76c7d8b9-0ed6-42c3-8827-8b2f94b0779a" providerId="ADAL" clId="{BE45B969-9097-4DAA-9E48-A61D72BE3E25}" dt="2020-09-28T06:51:07.581" v="932" actId="20577"/>
-        <pc:sldMkLst>
-          <pc:docMk/>
-          <pc:sldMk cId="2947182432" sldId="258"/>
-        </pc:sldMkLst>
-        <pc:spChg chg="mod">
-          <ac:chgData name="윤성재" userId="76c7d8b9-0ed6-42c3-8827-8b2f94b0779a" providerId="ADAL" clId="{BE45B969-9097-4DAA-9E48-A61D72BE3E25}" dt="2020-09-28T06:51:07.581" v="932" actId="20577"/>
-          <ac:spMkLst>
-            <pc:docMk/>
-            <pc:sldMk cId="2947182432" sldId="258"/>
-            <ac:spMk id="2" creationId="{5933B7FC-3145-43DE-8EE5-1D99D422E501}"/>
-          </ac:spMkLst>
-        </pc:spChg>
-        <pc:spChg chg="mod">
-          <ac:chgData name="윤성재" userId="76c7d8b9-0ed6-42c3-8827-8b2f94b0779a" providerId="ADAL" clId="{BE45B969-9097-4DAA-9E48-A61D72BE3E25}" dt="2020-09-28T06:43:38.747" v="41" actId="26606"/>
-          <ac:spMkLst>
-            <pc:docMk/>
-            <pc:sldMk cId="2947182432" sldId="258"/>
-            <ac:spMk id="3" creationId="{639CBFE5-1D01-4F0E-97DC-7DD32983EF8F}"/>
-          </ac:spMkLst>
-        </pc:spChg>
-        <pc:spChg chg="add del">
-          <ac:chgData name="윤성재" userId="76c7d8b9-0ed6-42c3-8827-8b2f94b0779a" providerId="ADAL" clId="{BE45B969-9097-4DAA-9E48-A61D72BE3E25}" dt="2020-09-28T06:43:11.996" v="35" actId="26606"/>
-          <ac:spMkLst>
-            <pc:docMk/>
-            <pc:sldMk cId="2947182432" sldId="258"/>
-            <ac:spMk id="71" creationId="{8FC9BE17-9A7B-462D-AE50-3D8777387304}"/>
-          </ac:spMkLst>
-        </pc:spChg>
-        <pc:spChg chg="add del">
-          <ac:chgData name="윤성재" userId="76c7d8b9-0ed6-42c3-8827-8b2f94b0779a" providerId="ADAL" clId="{BE45B969-9097-4DAA-9E48-A61D72BE3E25}" dt="2020-09-28T06:43:11.996" v="35" actId="26606"/>
-          <ac:spMkLst>
-            <pc:docMk/>
-            <pc:sldMk cId="2947182432" sldId="258"/>
-            <ac:spMk id="73" creationId="{3EBE8569-6AEC-4B8C-8D53-2DE337CDBA65}"/>
-          </ac:spMkLst>
-        </pc:spChg>
-        <pc:spChg chg="add del">
-          <ac:chgData name="윤성재" userId="76c7d8b9-0ed6-42c3-8827-8b2f94b0779a" providerId="ADAL" clId="{BE45B969-9097-4DAA-9E48-A61D72BE3E25}" dt="2020-09-28T06:43:11.996" v="35" actId="26606"/>
-          <ac:spMkLst>
-            <pc:docMk/>
-            <pc:sldMk cId="2947182432" sldId="258"/>
-            <ac:spMk id="75" creationId="{55D4142C-5077-457F-A6AD-3FECFDB39685}"/>
-          </ac:spMkLst>
-        </pc:spChg>
-        <pc:spChg chg="add del">
-          <ac:chgData name="윤성재" userId="76c7d8b9-0ed6-42c3-8827-8b2f94b0779a" providerId="ADAL" clId="{BE45B969-9097-4DAA-9E48-A61D72BE3E25}" dt="2020-09-28T06:43:11.996" v="35" actId="26606"/>
-          <ac:spMkLst>
-            <pc:docMk/>
-            <pc:sldMk cId="2947182432" sldId="258"/>
-            <ac:spMk id="77" creationId="{7A5F0580-5EE9-419F-96EE-B6529EF6E7D0}"/>
-          </ac:spMkLst>
-        </pc:spChg>
-        <pc:spChg chg="add del">
-          <ac:chgData name="윤성재" userId="76c7d8b9-0ed6-42c3-8827-8b2f94b0779a" providerId="ADAL" clId="{BE45B969-9097-4DAA-9E48-A61D72BE3E25}" dt="2020-09-28T06:43:38.747" v="41" actId="26606"/>
-          <ac:spMkLst>
-            <pc:docMk/>
-            <pc:sldMk cId="2947182432" sldId="258"/>
-            <ac:spMk id="1030" creationId="{9AA72BD9-2C5A-4EDC-931F-5AA08EACA0F3}"/>
-          </ac:spMkLst>
-        </pc:spChg>
-        <pc:spChg chg="add del">
-          <ac:chgData name="윤성재" userId="76c7d8b9-0ed6-42c3-8827-8b2f94b0779a" providerId="ADAL" clId="{BE45B969-9097-4DAA-9E48-A61D72BE3E25}" dt="2020-09-28T06:43:38.747" v="41" actId="26606"/>
-          <ac:spMkLst>
-            <pc:docMk/>
-            <pc:sldMk cId="2947182432" sldId="258"/>
-            <ac:spMk id="1031" creationId="{DD3981AC-7B61-4947-BCF3-F7AA7FA385B9}"/>
-          </ac:spMkLst>
-        </pc:spChg>
-        <pc:spChg chg="add del">
-          <ac:chgData name="윤성재" userId="76c7d8b9-0ed6-42c3-8827-8b2f94b0779a" providerId="ADAL" clId="{BE45B969-9097-4DAA-9E48-A61D72BE3E25}" dt="2020-09-28T06:43:38.747" v="41" actId="26606"/>
-          <ac:spMkLst>
-            <pc:docMk/>
-            <pc:sldMk cId="2947182432" sldId="258"/>
-            <ac:spMk id="1032" creationId="{55D4142C-5077-457F-A6AD-3FECFDB39685}"/>
-          </ac:spMkLst>
-        </pc:spChg>
-        <pc:spChg chg="add del">
-          <ac:chgData name="윤성재" userId="76c7d8b9-0ed6-42c3-8827-8b2f94b0779a" providerId="ADAL" clId="{BE45B969-9097-4DAA-9E48-A61D72BE3E25}" dt="2020-09-28T06:43:38.747" v="41" actId="26606"/>
-          <ac:spMkLst>
-            <pc:docMk/>
-            <pc:sldMk cId="2947182432" sldId="258"/>
-            <ac:spMk id="1033" creationId="{7A5F0580-5EE9-419F-96EE-B6529EF6E7D0}"/>
-          </ac:spMkLst>
-        </pc:spChg>
-        <pc:picChg chg="add mod ord">
-          <ac:chgData name="윤성재" userId="76c7d8b9-0ed6-42c3-8827-8b2f94b0779a" providerId="ADAL" clId="{BE45B969-9097-4DAA-9E48-A61D72BE3E25}" dt="2020-09-28T06:43:38.747" v="41" actId="26606"/>
-          <ac:picMkLst>
-            <pc:docMk/>
-            <pc:sldMk cId="2947182432" sldId="258"/>
-            <ac:picMk id="1026" creationId="{030F5514-C2DB-4DFD-BBEE-BE29E1D5A47C}"/>
-          </ac:picMkLst>
-        </pc:picChg>
-        <pc:picChg chg="add del">
-          <ac:chgData name="윤성재" userId="76c7d8b9-0ed6-42c3-8827-8b2f94b0779a" providerId="ADAL" clId="{BE45B969-9097-4DAA-9E48-A61D72BE3E25}" dt="2020-09-28T06:43:17.434" v="37" actId="26606"/>
-          <ac:picMkLst>
-            <pc:docMk/>
-            <pc:sldMk cId="2947182432" sldId="258"/>
-            <ac:picMk id="1028" creationId="{54DDEBDD-D8BD-41A6-8A0D-B00E3768B0F9}"/>
-          </ac:picMkLst>
-        </pc:picChg>
-        <pc:picChg chg="add del">
-          <ac:chgData name="윤성재" userId="76c7d8b9-0ed6-42c3-8827-8b2f94b0779a" providerId="ADAL" clId="{BE45B969-9097-4DAA-9E48-A61D72BE3E25}" dt="2020-09-28T06:43:20.590" v="39" actId="26606"/>
-          <ac:picMkLst>
-            <pc:docMk/>
-            <pc:sldMk cId="2947182432" sldId="258"/>
-            <ac:picMk id="1029" creationId="{54DDEBDD-D8BD-41A6-8A0D-B00E3768B0F9}"/>
-          </ac:picMkLst>
-        </pc:picChg>
-      </pc:sldChg>
-      <pc:sldChg chg="modSp add del mod">
-        <pc:chgData name="윤성재" userId="76c7d8b9-0ed6-42c3-8827-8b2f94b0779a" providerId="ADAL" clId="{BE45B969-9097-4DAA-9E48-A61D72BE3E25}" dt="2020-09-28T07:14:02.761" v="2944" actId="27636"/>
-        <pc:sldMkLst>
-          <pc:docMk/>
-          <pc:sldMk cId="1781822367" sldId="259"/>
-        </pc:sldMkLst>
-        <pc:spChg chg="mod">
-          <ac:chgData name="윤성재" userId="76c7d8b9-0ed6-42c3-8827-8b2f94b0779a" providerId="ADAL" clId="{BE45B969-9097-4DAA-9E48-A61D72BE3E25}" dt="2020-09-28T07:14:02.761" v="2944" actId="27636"/>
-          <ac:spMkLst>
-            <pc:docMk/>
-            <pc:sldMk cId="1781822367" sldId="259"/>
-            <ac:spMk id="23" creationId="{0082D82D-C43D-4444-9232-99F6A5CF6A42}"/>
-          </ac:spMkLst>
-        </pc:spChg>
-      </pc:sldChg>
-      <pc:sldChg chg="del">
-        <pc:chgData name="윤성재" userId="76c7d8b9-0ed6-42c3-8827-8b2f94b0779a" providerId="ADAL" clId="{BE45B969-9097-4DAA-9E48-A61D72BE3E25}" dt="2020-09-28T06:44:06.695" v="45" actId="47"/>
-        <pc:sldMkLst>
-          <pc:docMk/>
-          <pc:sldMk cId="478057021" sldId="260"/>
-        </pc:sldMkLst>
-      </pc:sldChg>
-      <pc:sldChg chg="modSp del mod">
-        <pc:chgData name="윤성재" userId="76c7d8b9-0ed6-42c3-8827-8b2f94b0779a" providerId="ADAL" clId="{BE45B969-9097-4DAA-9E48-A61D72BE3E25}" dt="2020-09-28T06:44:06.695" v="45" actId="47"/>
-        <pc:sldMkLst>
-          <pc:docMk/>
-          <pc:sldMk cId="3101797987" sldId="261"/>
-        </pc:sldMkLst>
-        <pc:spChg chg="mod">
-          <ac:chgData name="윤성재" userId="76c7d8b9-0ed6-42c3-8827-8b2f94b0779a" providerId="ADAL" clId="{BE45B969-9097-4DAA-9E48-A61D72BE3E25}" dt="2020-09-28T06:41:20.635" v="11" actId="27636"/>
-          <ac:spMkLst>
-            <pc:docMk/>
-            <pc:sldMk cId="3101797987" sldId="261"/>
-            <ac:spMk id="23" creationId="{0082D82D-C43D-4444-9232-99F6A5CF6A42}"/>
-          </ac:spMkLst>
-        </pc:spChg>
-      </pc:sldChg>
-      <pc:sldChg chg="modSp del mod">
-        <pc:chgData name="윤성재" userId="76c7d8b9-0ed6-42c3-8827-8b2f94b0779a" providerId="ADAL" clId="{BE45B969-9097-4DAA-9E48-A61D72BE3E25}" dt="2020-09-28T06:44:06.695" v="45" actId="47"/>
-        <pc:sldMkLst>
-          <pc:docMk/>
-          <pc:sldMk cId="1195832901" sldId="262"/>
-        </pc:sldMkLst>
-        <pc:spChg chg="mod">
-          <ac:chgData name="윤성재" userId="76c7d8b9-0ed6-42c3-8827-8b2f94b0779a" providerId="ADAL" clId="{BE45B969-9097-4DAA-9E48-A61D72BE3E25}" dt="2020-09-28T06:41:20.643" v="12" actId="27636"/>
-          <ac:spMkLst>
-            <pc:docMk/>
-            <pc:sldMk cId="1195832901" sldId="262"/>
-            <ac:spMk id="23" creationId="{0082D82D-C43D-4444-9232-99F6A5CF6A42}"/>
-          </ac:spMkLst>
-        </pc:spChg>
-      </pc:sldChg>
-      <pc:sldChg chg="del ord">
-        <pc:chgData name="윤성재" userId="76c7d8b9-0ed6-42c3-8827-8b2f94b0779a" providerId="ADAL" clId="{BE45B969-9097-4DAA-9E48-A61D72BE3E25}" dt="2020-09-28T06:44:10.445" v="47" actId="47"/>
-        <pc:sldMkLst>
-          <pc:docMk/>
-          <pc:sldMk cId="3398729810" sldId="263"/>
-        </pc:sldMkLst>
-      </pc:sldChg>
-      <pc:sldChg chg="modSp mod">
-        <pc:chgData name="윤성재" userId="76c7d8b9-0ed6-42c3-8827-8b2f94b0779a" providerId="ADAL" clId="{BE45B969-9097-4DAA-9E48-A61D72BE3E25}" dt="2020-09-28T07:27:04.304" v="4266"/>
-        <pc:sldMkLst>
-          <pc:docMk/>
-          <pc:sldMk cId="2824757258" sldId="264"/>
-        </pc:sldMkLst>
-        <pc:spChg chg="mod">
-          <ac:chgData name="윤성재" userId="76c7d8b9-0ed6-42c3-8827-8b2f94b0779a" providerId="ADAL" clId="{BE45B969-9097-4DAA-9E48-A61D72BE3E25}" dt="2020-09-28T07:27:04.304" v="4266"/>
-          <ac:spMkLst>
-            <pc:docMk/>
-            <pc:sldMk cId="2824757258" sldId="264"/>
-            <ac:spMk id="3" creationId="{639CBFE5-1D01-4F0E-97DC-7DD32983EF8F}"/>
-          </ac:spMkLst>
-        </pc:spChg>
-      </pc:sldChg>
-      <pc:sldChg chg="addSp delSp modSp new mod">
-        <pc:chgData name="윤성재" userId="76c7d8b9-0ed6-42c3-8827-8b2f94b0779a" providerId="ADAL" clId="{BE45B969-9097-4DAA-9E48-A61D72BE3E25}" dt="2020-09-28T07:07:25.206" v="2446" actId="693"/>
-        <pc:sldMkLst>
-          <pc:docMk/>
-          <pc:sldMk cId="859258854" sldId="265"/>
-        </pc:sldMkLst>
-        <pc:spChg chg="mod">
-          <ac:chgData name="윤성재" userId="76c7d8b9-0ed6-42c3-8827-8b2f94b0779a" providerId="ADAL" clId="{BE45B969-9097-4DAA-9E48-A61D72BE3E25}" dt="2020-09-28T06:51:09.864" v="936" actId="20577"/>
-          <ac:spMkLst>
-            <pc:docMk/>
-            <pc:sldMk cId="859258854" sldId="265"/>
-            <ac:spMk id="2" creationId="{A4EC35AD-8BE7-4CD8-9D12-1B839F81710A}"/>
-          </ac:spMkLst>
-        </pc:spChg>
-        <pc:spChg chg="del">
-          <ac:chgData name="윤성재" userId="76c7d8b9-0ed6-42c3-8827-8b2f94b0779a" providerId="ADAL" clId="{BE45B969-9097-4DAA-9E48-A61D72BE3E25}" dt="2020-09-28T06:46:33.767" v="584" actId="478"/>
-          <ac:spMkLst>
-            <pc:docMk/>
-            <pc:sldMk cId="859258854" sldId="265"/>
-            <ac:spMk id="3" creationId="{CA8C31FF-D58F-49C3-AAB8-E21BA4774D2A}"/>
-          </ac:spMkLst>
-        </pc:spChg>
-        <pc:spChg chg="add mod">
-          <ac:chgData name="윤성재" userId="76c7d8b9-0ed6-42c3-8827-8b2f94b0779a" providerId="ADAL" clId="{BE45B969-9097-4DAA-9E48-A61D72BE3E25}" dt="2020-09-28T06:51:20.404" v="955" actId="207"/>
-          <ac:spMkLst>
-            <pc:docMk/>
-            <pc:sldMk cId="859258854" sldId="265"/>
-            <ac:spMk id="4" creationId="{813B28F4-2027-4E54-9241-CE46C8A92752}"/>
-          </ac:spMkLst>
-        </pc:spChg>
-        <pc:spChg chg="add mod">
-          <ac:chgData name="윤성재" userId="76c7d8b9-0ed6-42c3-8827-8b2f94b0779a" providerId="ADAL" clId="{BE45B969-9097-4DAA-9E48-A61D72BE3E25}" dt="2020-09-28T06:47:56.227" v="733" actId="1076"/>
-          <ac:spMkLst>
-            <pc:docMk/>
-            <pc:sldMk cId="859258854" sldId="265"/>
-            <ac:spMk id="6" creationId="{E53A9888-AB66-4B1A-9B45-8FE05370A2D5}"/>
-          </ac:spMkLst>
-        </pc:spChg>
-        <pc:spChg chg="add mod">
-          <ac:chgData name="윤성재" userId="76c7d8b9-0ed6-42c3-8827-8b2f94b0779a" providerId="ADAL" clId="{BE45B969-9097-4DAA-9E48-A61D72BE3E25}" dt="2020-09-28T06:51:26.371" v="956" actId="207"/>
-          <ac:spMkLst>
-            <pc:docMk/>
-            <pc:sldMk cId="859258854" sldId="265"/>
-            <ac:spMk id="8" creationId="{4ABC94F9-6D3C-4CE8-8212-E1204E218655}"/>
-          </ac:spMkLst>
-        </pc:spChg>
-        <pc:spChg chg="add mod">
-          <ac:chgData name="윤성재" userId="76c7d8b9-0ed6-42c3-8827-8b2f94b0779a" providerId="ADAL" clId="{BE45B969-9097-4DAA-9E48-A61D72BE3E25}" dt="2020-09-28T06:48:27.092" v="769" actId="1076"/>
-          <ac:spMkLst>
-            <pc:docMk/>
-            <pc:sldMk cId="859258854" sldId="265"/>
-            <ac:spMk id="10" creationId="{760C6E2D-181F-4140-87D7-654BB1B87B65}"/>
-          </ac:spMkLst>
-        </pc:spChg>
-        <pc:spChg chg="add mod">
-          <ac:chgData name="윤성재" userId="76c7d8b9-0ed6-42c3-8827-8b2f94b0779a" providerId="ADAL" clId="{BE45B969-9097-4DAA-9E48-A61D72BE3E25}" dt="2020-09-28T06:48:37.176" v="781" actId="20577"/>
-          <ac:spMkLst>
-            <pc:docMk/>
-            <pc:sldMk cId="859258854" sldId="265"/>
-            <ac:spMk id="12" creationId="{F2C30F78-491E-424A-80E0-E3148AADCBD5}"/>
-          </ac:spMkLst>
-        </pc:spChg>
-        <pc:spChg chg="add mod">
-          <ac:chgData name="윤성재" userId="76c7d8b9-0ed6-42c3-8827-8b2f94b0779a" providerId="ADAL" clId="{BE45B969-9097-4DAA-9E48-A61D72BE3E25}" dt="2020-09-28T06:50:04.357" v="902" actId="207"/>
-          <ac:spMkLst>
-            <pc:docMk/>
-            <pc:sldMk cId="859258854" sldId="265"/>
-            <ac:spMk id="14" creationId="{CB397FA2-9465-4ABC-8610-1A408218C74C}"/>
-          </ac:spMkLst>
-        </pc:spChg>
-        <pc:spChg chg="add mod">
-          <ac:chgData name="윤성재" userId="76c7d8b9-0ed6-42c3-8827-8b2f94b0779a" providerId="ADAL" clId="{BE45B969-9097-4DAA-9E48-A61D72BE3E25}" dt="2020-09-28T06:50:16.465" v="929" actId="404"/>
-          <ac:spMkLst>
-            <pc:docMk/>
-            <pc:sldMk cId="859258854" sldId="265"/>
-            <ac:spMk id="16" creationId="{6C360D18-3324-4E26-96CA-DEF0F92B2637}"/>
-          </ac:spMkLst>
-        </pc:spChg>
-        <pc:spChg chg="add del">
-          <ac:chgData name="윤성재" userId="76c7d8b9-0ed6-42c3-8827-8b2f94b0779a" providerId="ADAL" clId="{BE45B969-9097-4DAA-9E48-A61D72BE3E25}" dt="2020-09-28T06:48:54.332" v="797" actId="478"/>
-          <ac:spMkLst>
-            <pc:docMk/>
-            <pc:sldMk cId="859258854" sldId="265"/>
-            <ac:spMk id="41" creationId="{2BE63D7A-A8DA-4485-A7DA-DA8E7C221FE8}"/>
-          </ac:spMkLst>
-        </pc:spChg>
-        <pc:spChg chg="add mod">
-          <ac:chgData name="윤성재" userId="76c7d8b9-0ed6-42c3-8827-8b2f94b0779a" providerId="ADAL" clId="{BE45B969-9097-4DAA-9E48-A61D72BE3E25}" dt="2020-09-28T06:49:13.283" v="824" actId="1076"/>
-          <ac:spMkLst>
-            <pc:docMk/>
-            <pc:sldMk cId="859258854" sldId="265"/>
-            <ac:spMk id="44" creationId="{AF97DFF0-708E-4109-8C5B-0DC966B187A8}"/>
-          </ac:spMkLst>
-        </pc:spChg>
-        <pc:spChg chg="add mod">
-          <ac:chgData name="윤성재" userId="76c7d8b9-0ed6-42c3-8827-8b2f94b0779a" providerId="ADAL" clId="{BE45B969-9097-4DAA-9E48-A61D72BE3E25}" dt="2020-09-28T06:50:04.357" v="902" actId="207"/>
-          <ac:spMkLst>
-            <pc:docMk/>
-            <pc:sldMk cId="859258854" sldId="265"/>
-            <ac:spMk id="54" creationId="{51EECC09-F19B-4A28-B863-FC329AD533E2}"/>
-          </ac:spMkLst>
-        </pc:spChg>
-        <pc:spChg chg="add mod">
-          <ac:chgData name="윤성재" userId="76c7d8b9-0ed6-42c3-8827-8b2f94b0779a" providerId="ADAL" clId="{BE45B969-9097-4DAA-9E48-A61D72BE3E25}" dt="2020-09-28T06:52:13.340" v="1005" actId="208"/>
-          <ac:spMkLst>
-            <pc:docMk/>
-            <pc:sldMk cId="859258854" sldId="265"/>
-            <ac:spMk id="66" creationId="{C7D78D21-966B-4065-8828-B504AA4F3F6E}"/>
-          </ac:spMkLst>
-        </pc:spChg>
-        <pc:spChg chg="add mod">
-          <ac:chgData name="윤성재" userId="76c7d8b9-0ed6-42c3-8827-8b2f94b0779a" providerId="ADAL" clId="{BE45B969-9097-4DAA-9E48-A61D72BE3E25}" dt="2020-09-28T06:52:13.340" v="1005" actId="208"/>
-          <ac:spMkLst>
-            <pc:docMk/>
-            <pc:sldMk cId="859258854" sldId="265"/>
-            <ac:spMk id="68" creationId="{2C016DE1-E224-48BB-92A2-F2D173B7C2DB}"/>
-          </ac:spMkLst>
-        </pc:spChg>
-        <pc:spChg chg="add mod">
-          <ac:chgData name="윤성재" userId="76c7d8b9-0ed6-42c3-8827-8b2f94b0779a" providerId="ADAL" clId="{BE45B969-9097-4DAA-9E48-A61D72BE3E25}" dt="2020-09-28T06:52:13.340" v="1005" actId="208"/>
-          <ac:spMkLst>
-            <pc:docMk/>
-            <pc:sldMk cId="859258854" sldId="265"/>
-            <ac:spMk id="69" creationId="{B65C3B0C-7CF8-4529-9F9A-C3BEAE9C5AA0}"/>
-          </ac:spMkLst>
-        </pc:spChg>
-        <pc:spChg chg="add mod">
-          <ac:chgData name="윤성재" userId="76c7d8b9-0ed6-42c3-8827-8b2f94b0779a" providerId="ADAL" clId="{BE45B969-9097-4DAA-9E48-A61D72BE3E25}" dt="2020-09-28T06:52:13.340" v="1005" actId="208"/>
-          <ac:spMkLst>
-            <pc:docMk/>
-            <pc:sldMk cId="859258854" sldId="265"/>
-            <ac:spMk id="71" creationId="{13D8B77A-341D-441D-851C-FCC4D381CBFF}"/>
-          </ac:spMkLst>
-        </pc:spChg>
-        <pc:spChg chg="add mod">
-          <ac:chgData name="윤성재" userId="76c7d8b9-0ed6-42c3-8827-8b2f94b0779a" providerId="ADAL" clId="{BE45B969-9097-4DAA-9E48-A61D72BE3E25}" dt="2020-09-28T07:07:25.206" v="2446" actId="693"/>
-          <ac:spMkLst>
-            <pc:docMk/>
-            <pc:sldMk cId="859258854" sldId="265"/>
-            <ac:spMk id="73" creationId="{CDE410AD-3703-4839-A938-9D1D960B5EA8}"/>
-          </ac:spMkLst>
-        </pc:spChg>
-        <pc:grpChg chg="add mod">
-          <ac:chgData name="윤성재" userId="76c7d8b9-0ed6-42c3-8827-8b2f94b0779a" providerId="ADAL" clId="{BE45B969-9097-4DAA-9E48-A61D72BE3E25}" dt="2020-09-28T06:52:09.003" v="1003" actId="1076"/>
-          <ac:grpSpMkLst>
-            <pc:docMk/>
-            <pc:sldMk cId="859258854" sldId="265"/>
-            <ac:grpSpMk id="72" creationId="{E35EEA10-1B4F-440E-B295-09FEB86F1756}"/>
-          </ac:grpSpMkLst>
-        </pc:grpChg>
-        <pc:cxnChg chg="add">
-          <ac:chgData name="윤성재" userId="76c7d8b9-0ed6-42c3-8827-8b2f94b0779a" providerId="ADAL" clId="{BE45B969-9097-4DAA-9E48-A61D72BE3E25}" dt="2020-09-28T06:48:02.507" v="735" actId="11529"/>
-          <ac:cxnSpMkLst>
-            <pc:docMk/>
-            <pc:sldMk cId="859258854" sldId="265"/>
-            <ac:cxnSpMk id="18" creationId="{F22B87B9-80FA-4354-941E-005D54976A22}"/>
-          </ac:cxnSpMkLst>
-        </pc:cxnChg>
-        <pc:cxnChg chg="add mod">
-          <ac:chgData name="윤성재" userId="76c7d8b9-0ed6-42c3-8827-8b2f94b0779a" providerId="ADAL" clId="{BE45B969-9097-4DAA-9E48-A61D72BE3E25}" dt="2020-09-28T06:48:05.492" v="738" actId="14100"/>
-          <ac:cxnSpMkLst>
-            <pc:docMk/>
-            <pc:sldMk cId="859258854" sldId="265"/>
-            <ac:cxnSpMk id="19" creationId="{5D1AA3DF-C46C-463F-A337-9845E10095CE}"/>
-          </ac:cxnSpMkLst>
-        </pc:cxnChg>
-        <pc:cxnChg chg="add mod">
-          <ac:chgData name="윤성재" userId="76c7d8b9-0ed6-42c3-8827-8b2f94b0779a" providerId="ADAL" clId="{BE45B969-9097-4DAA-9E48-A61D72BE3E25}" dt="2020-09-28T06:48:19.731" v="764" actId="1076"/>
-          <ac:cxnSpMkLst>
-            <pc:docMk/>
-            <pc:sldMk cId="859258854" sldId="265"/>
-            <ac:cxnSpMk id="22" creationId="{CA265E36-F5DA-492B-995C-B675D63A858A}"/>
-          </ac:cxnSpMkLst>
-        </pc:cxnChg>
-        <pc:cxnChg chg="add mod">
-          <ac:chgData name="윤성재" userId="76c7d8b9-0ed6-42c3-8827-8b2f94b0779a" providerId="ADAL" clId="{BE45B969-9097-4DAA-9E48-A61D72BE3E25}" dt="2020-09-28T06:48:27.092" v="769" actId="1076"/>
-          <ac:cxnSpMkLst>
-            <pc:docMk/>
-            <pc:sldMk cId="859258854" sldId="265"/>
-            <ac:cxnSpMk id="28" creationId="{DD562DDD-D483-4A8D-BD1D-164BF1E940BB}"/>
-          </ac:cxnSpMkLst>
-        </pc:cxnChg>
-        <pc:cxnChg chg="add mod">
-          <ac:chgData name="윤성재" userId="76c7d8b9-0ed6-42c3-8827-8b2f94b0779a" providerId="ADAL" clId="{BE45B969-9097-4DAA-9E48-A61D72BE3E25}" dt="2020-09-28T06:48:35.299" v="772" actId="14100"/>
-          <ac:cxnSpMkLst>
-            <pc:docMk/>
-            <pc:sldMk cId="859258854" sldId="265"/>
-            <ac:cxnSpMk id="32" creationId="{3348B17B-3CD6-4F49-A65D-9EAB22A8FF7B}"/>
-          </ac:cxnSpMkLst>
-        </pc:cxnChg>
-        <pc:cxnChg chg="add mod">
-          <ac:chgData name="윤성재" userId="76c7d8b9-0ed6-42c3-8827-8b2f94b0779a" providerId="ADAL" clId="{BE45B969-9097-4DAA-9E48-A61D72BE3E25}" dt="2020-09-28T06:50:00.979" v="901" actId="1076"/>
-          <ac:cxnSpMkLst>
-            <pc:docMk/>
-            <pc:sldMk cId="859258854" sldId="265"/>
-            <ac:cxnSpMk id="35" creationId="{28D5812A-2BE5-40EE-B1DA-AB55B4ACA91D}"/>
-          </ac:cxnSpMkLst>
-        </pc:cxnChg>
-        <pc:cxnChg chg="add del mod">
-          <ac:chgData name="윤성재" userId="76c7d8b9-0ed6-42c3-8827-8b2f94b0779a" providerId="ADAL" clId="{BE45B969-9097-4DAA-9E48-A61D72BE3E25}" dt="2020-09-28T06:48:56.622" v="799"/>
-          <ac:cxnSpMkLst>
-            <pc:docMk/>
-            <pc:sldMk cId="859258854" sldId="265"/>
-            <ac:cxnSpMk id="42" creationId="{56709C71-5642-41B0-8E00-B25E736DFAD7}"/>
-          </ac:cxnSpMkLst>
-        </pc:cxnChg>
-        <pc:cxnChg chg="add mod">
-          <ac:chgData name="윤성재" userId="76c7d8b9-0ed6-42c3-8827-8b2f94b0779a" providerId="ADAL" clId="{BE45B969-9097-4DAA-9E48-A61D72BE3E25}" dt="2020-09-28T06:50:00.979" v="901" actId="1076"/>
-          <ac:cxnSpMkLst>
-            <pc:docMk/>
-            <pc:sldMk cId="859258854" sldId="265"/>
-            <ac:cxnSpMk id="45" creationId="{2CFA4546-B81B-4580-B579-F49E11B1F92F}"/>
-          </ac:cxnSpMkLst>
-        </pc:cxnChg>
-        <pc:cxnChg chg="add mod">
-          <ac:chgData name="윤성재" userId="76c7d8b9-0ed6-42c3-8827-8b2f94b0779a" providerId="ADAL" clId="{BE45B969-9097-4DAA-9E48-A61D72BE3E25}" dt="2020-09-28T06:49:13.283" v="824" actId="1076"/>
-          <ac:cxnSpMkLst>
-            <pc:docMk/>
-            <pc:sldMk cId="859258854" sldId="265"/>
-            <ac:cxnSpMk id="48" creationId="{7A532701-593A-486A-8F5F-536DB9BEEEC2}"/>
-          </ac:cxnSpMkLst>
-        </pc:cxnChg>
-        <pc:cxnChg chg="add mod">
-          <ac:chgData name="윤성재" userId="76c7d8b9-0ed6-42c3-8827-8b2f94b0779a" providerId="ADAL" clId="{BE45B969-9097-4DAA-9E48-A61D72BE3E25}" dt="2020-09-28T06:49:31.795" v="888" actId="14100"/>
-          <ac:cxnSpMkLst>
-            <pc:docMk/>
-            <pc:sldMk cId="859258854" sldId="265"/>
-            <ac:cxnSpMk id="55" creationId="{CABCFDA5-670E-4A35-9562-DBE1430B5174}"/>
-          </ac:cxnSpMkLst>
-        </pc:cxnChg>
-        <pc:cxnChg chg="add del mod">
-          <ac:chgData name="윤성재" userId="76c7d8b9-0ed6-42c3-8827-8b2f94b0779a" providerId="ADAL" clId="{BE45B969-9097-4DAA-9E48-A61D72BE3E25}" dt="2020-09-28T06:49:40.223" v="892" actId="478"/>
-          <ac:cxnSpMkLst>
-            <pc:docMk/>
-            <pc:sldMk cId="859258854" sldId="265"/>
-            <ac:cxnSpMk id="58" creationId="{6FB019B3-497A-4103-A9B2-737A6668D425}"/>
-          </ac:cxnSpMkLst>
-        </pc:cxnChg>
-        <pc:cxnChg chg="add">
-          <ac:chgData name="윤성재" userId="76c7d8b9-0ed6-42c3-8827-8b2f94b0779a" providerId="ADAL" clId="{BE45B969-9097-4DAA-9E48-A61D72BE3E25}" dt="2020-09-28T06:49:46.614" v="893" actId="11529"/>
-          <ac:cxnSpMkLst>
-            <pc:docMk/>
-            <pc:sldMk cId="859258854" sldId="265"/>
-            <ac:cxnSpMk id="62" creationId="{42DF98BA-81A6-4DDE-B562-95B383BD1B78}"/>
-          </ac:cxnSpMkLst>
-        </pc:cxnChg>
-      </pc:sldChg>
-      <pc:sldChg chg="addSp delSp modSp new mod addCm delCm">
-        <pc:chgData name="윤성재" userId="76c7d8b9-0ed6-42c3-8827-8b2f94b0779a" providerId="ADAL" clId="{BE45B969-9097-4DAA-9E48-A61D72BE3E25}" dt="2020-09-28T08:48:09.184" v="4341" actId="27636"/>
-        <pc:sldMkLst>
-          <pc:docMk/>
-          <pc:sldMk cId="3558948170" sldId="266"/>
-        </pc:sldMkLst>
-        <pc:spChg chg="mod">
-          <ac:chgData name="윤성재" userId="76c7d8b9-0ed6-42c3-8827-8b2f94b0779a" providerId="ADAL" clId="{BE45B969-9097-4DAA-9E48-A61D72BE3E25}" dt="2020-09-28T06:51:15.330" v="954"/>
-          <ac:spMkLst>
-            <pc:docMk/>
-            <pc:sldMk cId="3558948170" sldId="266"/>
-            <ac:spMk id="2" creationId="{198FDC86-4AFC-4D63-9C30-65D37AA7B68B}"/>
-          </ac:spMkLst>
-        </pc:spChg>
-        <pc:spChg chg="mod">
-          <ac:chgData name="윤성재" userId="76c7d8b9-0ed6-42c3-8827-8b2f94b0779a" providerId="ADAL" clId="{BE45B969-9097-4DAA-9E48-A61D72BE3E25}" dt="2020-09-28T08:48:09.184" v="4341" actId="27636"/>
-          <ac:spMkLst>
-            <pc:docMk/>
-            <pc:sldMk cId="3558948170" sldId="266"/>
-            <ac:spMk id="3" creationId="{BAAF2B9A-042F-4182-A4BE-A88E581229C6}"/>
-          </ac:spMkLst>
-        </pc:spChg>
-        <pc:spChg chg="add del mod">
-          <ac:chgData name="윤성재" userId="76c7d8b9-0ed6-42c3-8827-8b2f94b0779a" providerId="ADAL" clId="{BE45B969-9097-4DAA-9E48-A61D72BE3E25}" dt="2020-09-28T06:55:18.529" v="1344" actId="478"/>
-          <ac:spMkLst>
-            <pc:docMk/>
-            <pc:sldMk cId="3558948170" sldId="266"/>
-            <ac:spMk id="4" creationId="{003C310D-E26D-4C1B-89FC-A0CC67B92050}"/>
-          </ac:spMkLst>
-        </pc:spChg>
-        <pc:spChg chg="add mod">
-          <ac:chgData name="윤성재" userId="76c7d8b9-0ed6-42c3-8827-8b2f94b0779a" providerId="ADAL" clId="{BE45B969-9097-4DAA-9E48-A61D72BE3E25}" dt="2020-09-28T07:09:25.490" v="2447" actId="1076"/>
-          <ac:spMkLst>
-            <pc:docMk/>
-            <pc:sldMk cId="3558948170" sldId="266"/>
-            <ac:spMk id="5" creationId="{EB660DA8-AFA6-4B62-8B8C-A8AB1DF2C84C}"/>
-          </ac:spMkLst>
-        </pc:spChg>
-        <pc:spChg chg="add mod">
-          <ac:chgData name="윤성재" userId="76c7d8b9-0ed6-42c3-8827-8b2f94b0779a" providerId="ADAL" clId="{BE45B969-9097-4DAA-9E48-A61D72BE3E25}" dt="2020-09-28T07:09:25.490" v="2447" actId="1076"/>
-          <ac:spMkLst>
-            <pc:docMk/>
-            <pc:sldMk cId="3558948170" sldId="266"/>
-            <ac:spMk id="6" creationId="{B3CA8E49-0310-447E-A536-EBD6F990B361}"/>
-          </ac:spMkLst>
-        </pc:spChg>
-        <pc:spChg chg="mod">
-          <ac:chgData name="윤성재" userId="76c7d8b9-0ed6-42c3-8827-8b2f94b0779a" providerId="ADAL" clId="{BE45B969-9097-4DAA-9E48-A61D72BE3E25}" dt="2020-09-28T07:09:25.490" v="2447" actId="1076"/>
-          <ac:spMkLst>
-            <pc:docMk/>
-            <pc:sldMk cId="3558948170" sldId="266"/>
-            <ac:spMk id="8" creationId="{D22A2774-8D38-4590-BE60-B3D3851B1E3C}"/>
-          </ac:spMkLst>
-        </pc:spChg>
-        <pc:spChg chg="mod">
-          <ac:chgData name="윤성재" userId="76c7d8b9-0ed6-42c3-8827-8b2f94b0779a" providerId="ADAL" clId="{BE45B969-9097-4DAA-9E48-A61D72BE3E25}" dt="2020-09-28T07:09:25.490" v="2447" actId="1076"/>
-          <ac:spMkLst>
-            <pc:docMk/>
-            <pc:sldMk cId="3558948170" sldId="266"/>
-            <ac:spMk id="9" creationId="{66D1EC44-8606-4C27-8E23-C3A7E0C8C5FA}"/>
-          </ac:spMkLst>
-        </pc:spChg>
-        <pc:spChg chg="add del mod">
-          <ac:chgData name="윤성재" userId="76c7d8b9-0ed6-42c3-8827-8b2f94b0779a" providerId="ADAL" clId="{BE45B969-9097-4DAA-9E48-A61D72BE3E25}" dt="2020-09-28T06:55:13.947" v="1342" actId="478"/>
-          <ac:spMkLst>
-            <pc:docMk/>
-            <pc:sldMk cId="3558948170" sldId="266"/>
-            <ac:spMk id="11" creationId="{DA087FDB-372E-4978-814E-AAA59E67E1BE}"/>
-          </ac:spMkLst>
-        </pc:spChg>
-        <pc:spChg chg="mod">
-          <ac:chgData name="윤성재" userId="76c7d8b9-0ed6-42c3-8827-8b2f94b0779a" providerId="ADAL" clId="{BE45B969-9097-4DAA-9E48-A61D72BE3E25}" dt="2020-09-28T06:53:01.957" v="1006"/>
-          <ac:spMkLst>
-            <pc:docMk/>
-            <pc:sldMk cId="3558948170" sldId="266"/>
-            <ac:spMk id="14" creationId="{C0A9966D-B375-4CAF-9F3C-530AD9A074C1}"/>
-          </ac:spMkLst>
-        </pc:spChg>
-        <pc:spChg chg="add mod">
-          <ac:chgData name="윤성재" userId="76c7d8b9-0ed6-42c3-8827-8b2f94b0779a" providerId="ADAL" clId="{BE45B969-9097-4DAA-9E48-A61D72BE3E25}" dt="2020-09-28T07:09:25.490" v="2447" actId="1076"/>
-          <ac:spMkLst>
-            <pc:docMk/>
-            <pc:sldMk cId="3558948170" sldId="266"/>
-            <ac:spMk id="16" creationId="{D61317E7-43A8-41D6-AFB6-18DC0DF9D71A}"/>
-          </ac:spMkLst>
-        </pc:spChg>
-        <pc:spChg chg="add mod ord">
-          <ac:chgData name="윤성재" userId="76c7d8b9-0ed6-42c3-8827-8b2f94b0779a" providerId="ADAL" clId="{BE45B969-9097-4DAA-9E48-A61D72BE3E25}" dt="2020-09-28T07:09:25.490" v="2447" actId="1076"/>
-          <ac:spMkLst>
-            <pc:docMk/>
-            <pc:sldMk cId="3558948170" sldId="266"/>
-            <ac:spMk id="20" creationId="{04B7D4C5-E1CE-48FD-A808-7C38FC2800AC}"/>
-          </ac:spMkLst>
-        </pc:spChg>
-        <pc:spChg chg="add mod">
-          <ac:chgData name="윤성재" userId="76c7d8b9-0ed6-42c3-8827-8b2f94b0779a" providerId="ADAL" clId="{BE45B969-9097-4DAA-9E48-A61D72BE3E25}" dt="2020-09-28T07:09:25.490" v="2447" actId="1076"/>
-          <ac:spMkLst>
-            <pc:docMk/>
-            <pc:sldMk cId="3558948170" sldId="266"/>
-            <ac:spMk id="25" creationId="{F2F3FA1F-7342-4F96-929F-A06D1E7F4879}"/>
-          </ac:spMkLst>
-        </pc:spChg>
-        <pc:spChg chg="add del">
-          <ac:chgData name="윤성재" userId="76c7d8b9-0ed6-42c3-8827-8b2f94b0779a" providerId="ADAL" clId="{BE45B969-9097-4DAA-9E48-A61D72BE3E25}" dt="2020-09-28T06:59:01.036" v="1567" actId="22"/>
-          <ac:spMkLst>
-            <pc:docMk/>
-            <pc:sldMk cId="3558948170" sldId="266"/>
-            <ac:spMk id="27" creationId="{4EB4EE20-AD32-40A6-AFEA-1C2A678F6584}"/>
-          </ac:spMkLst>
-        </pc:spChg>
-        <pc:spChg chg="mod">
-          <ac:chgData name="윤성재" userId="76c7d8b9-0ed6-42c3-8827-8b2f94b0779a" providerId="ADAL" clId="{BE45B969-9097-4DAA-9E48-A61D72BE3E25}" dt="2020-09-28T07:09:25.490" v="2447" actId="1076"/>
-          <ac:spMkLst>
-            <pc:docMk/>
-            <pc:sldMk cId="3558948170" sldId="266"/>
-            <ac:spMk id="30" creationId="{B9C0C9AC-E2DB-4032-B38C-20721A88D727}"/>
-          </ac:spMkLst>
-        </pc:spChg>
-        <pc:grpChg chg="add mod ord">
-          <ac:chgData name="윤성재" userId="76c7d8b9-0ed6-42c3-8827-8b2f94b0779a" providerId="ADAL" clId="{BE45B969-9097-4DAA-9E48-A61D72BE3E25}" dt="2020-09-28T07:09:25.490" v="2447" actId="1076"/>
-          <ac:grpSpMkLst>
-            <pc:docMk/>
-            <pc:sldMk cId="3558948170" sldId="266"/>
-            <ac:grpSpMk id="7" creationId="{97FA19EF-5FBD-4B56-8C52-002CAB2F5F2B}"/>
-          </ac:grpSpMkLst>
-        </pc:grpChg>
-        <pc:grpChg chg="add del mod">
-          <ac:chgData name="윤성재" userId="76c7d8b9-0ed6-42c3-8827-8b2f94b0779a" providerId="ADAL" clId="{BE45B969-9097-4DAA-9E48-A61D72BE3E25}" dt="2020-09-28T06:55:13.947" v="1342" actId="478"/>
-          <ac:grpSpMkLst>
-            <pc:docMk/>
-            <pc:sldMk cId="3558948170" sldId="266"/>
-            <ac:grpSpMk id="12" creationId="{5A217172-D947-4FBC-A799-07A7F2B17BD5}"/>
-          </ac:grpSpMkLst>
-        </pc:grpChg>
-        <pc:grpChg chg="add mod">
-          <ac:chgData name="윤성재" userId="76c7d8b9-0ed6-42c3-8827-8b2f94b0779a" providerId="ADAL" clId="{BE45B969-9097-4DAA-9E48-A61D72BE3E25}" dt="2020-09-28T07:09:25.490" v="2447" actId="1076"/>
-          <ac:grpSpMkLst>
-            <pc:docMk/>
-            <pc:sldMk cId="3558948170" sldId="266"/>
-            <ac:grpSpMk id="28" creationId="{0F00144C-C0DB-456B-A4F3-697D0464368B}"/>
-          </ac:grpSpMkLst>
-        </pc:grpChg>
-        <pc:picChg chg="add del mod">
-          <ac:chgData name="윤성재" userId="76c7d8b9-0ed6-42c3-8827-8b2f94b0779a" providerId="ADAL" clId="{BE45B969-9097-4DAA-9E48-A61D72BE3E25}" dt="2020-09-28T06:55:13.947" v="1342" actId="478"/>
-          <ac:picMkLst>
-            <pc:docMk/>
-            <pc:sldMk cId="3558948170" sldId="266"/>
-            <ac:picMk id="10" creationId="{B2814514-5F92-4A93-97FC-758BF01B712E}"/>
-          </ac:picMkLst>
-        </pc:picChg>
-        <pc:picChg chg="mod">
-          <ac:chgData name="윤성재" userId="76c7d8b9-0ed6-42c3-8827-8b2f94b0779a" providerId="ADAL" clId="{BE45B969-9097-4DAA-9E48-A61D72BE3E25}" dt="2020-09-28T06:53:01.957" v="1006"/>
-          <ac:picMkLst>
-            <pc:docMk/>
-            <pc:sldMk cId="3558948170" sldId="266"/>
-            <ac:picMk id="13" creationId="{41B2EF92-7FD5-4299-B1C3-5DF5E94A2424}"/>
-          </ac:picMkLst>
-        </pc:picChg>
-        <pc:picChg chg="add mod">
-          <ac:chgData name="윤성재" userId="76c7d8b9-0ed6-42c3-8827-8b2f94b0779a" providerId="ADAL" clId="{BE45B969-9097-4DAA-9E48-A61D72BE3E25}" dt="2020-09-28T07:09:25.490" v="2447" actId="1076"/>
-          <ac:picMkLst>
-            <pc:docMk/>
-            <pc:sldMk cId="3558948170" sldId="266"/>
-            <ac:picMk id="23" creationId="{94EC8BAD-2906-4F54-AEB0-C795AF73FCE3}"/>
-          </ac:picMkLst>
-        </pc:picChg>
-        <pc:picChg chg="mod">
-          <ac:chgData name="윤성재" userId="76c7d8b9-0ed6-42c3-8827-8b2f94b0779a" providerId="ADAL" clId="{BE45B969-9097-4DAA-9E48-A61D72BE3E25}" dt="2020-09-28T07:09:25.490" v="2447" actId="1076"/>
-          <ac:picMkLst>
-            <pc:docMk/>
-            <pc:sldMk cId="3558948170" sldId="266"/>
-            <ac:picMk id="29" creationId="{C6F7E66D-5390-4AE4-95DC-AA0424486831}"/>
-          </ac:picMkLst>
-        </pc:picChg>
-        <pc:cxnChg chg="add mod">
-          <ac:chgData name="윤성재" userId="76c7d8b9-0ed6-42c3-8827-8b2f94b0779a" providerId="ADAL" clId="{BE45B969-9097-4DAA-9E48-A61D72BE3E25}" dt="2020-09-28T07:09:25.490" v="2447" actId="1076"/>
-          <ac:cxnSpMkLst>
-            <pc:docMk/>
-            <pc:sldMk cId="3558948170" sldId="266"/>
-            <ac:cxnSpMk id="18" creationId="{5987F4CD-63B5-419C-A093-BA48056BA70C}"/>
-          </ac:cxnSpMkLst>
-        </pc:cxnChg>
-      </pc:sldChg>
-      <pc:sldChg chg="addSp modSp new mod">
-        <pc:chgData name="윤성재" userId="76c7d8b9-0ed6-42c3-8827-8b2f94b0779a" providerId="ADAL" clId="{BE45B969-9097-4DAA-9E48-A61D72BE3E25}" dt="2020-09-28T08:48:34.645" v="4343" actId="207"/>
-        <pc:sldMkLst>
-          <pc:docMk/>
-          <pc:sldMk cId="4027514140" sldId="267"/>
-        </pc:sldMkLst>
-        <pc:spChg chg="mod">
-          <ac:chgData name="윤성재" userId="76c7d8b9-0ed6-42c3-8827-8b2f94b0779a" providerId="ADAL" clId="{BE45B969-9097-4DAA-9E48-A61D72BE3E25}" dt="2020-09-28T07:13:49.830" v="2933" actId="6549"/>
-          <ac:spMkLst>
-            <pc:docMk/>
-            <pc:sldMk cId="4027514140" sldId="267"/>
-            <ac:spMk id="2" creationId="{A7470B02-A05D-4B1F-B07F-F0FC4AB720A8}"/>
-          </ac:spMkLst>
-        </pc:spChg>
-        <pc:spChg chg="mod">
-          <ac:chgData name="윤성재" userId="76c7d8b9-0ed6-42c3-8827-8b2f94b0779a" providerId="ADAL" clId="{BE45B969-9097-4DAA-9E48-A61D72BE3E25}" dt="2020-09-28T08:48:34.645" v="4343" actId="207"/>
-          <ac:spMkLst>
-            <pc:docMk/>
-            <pc:sldMk cId="4027514140" sldId="267"/>
-            <ac:spMk id="3" creationId="{880AF685-A918-4776-BE68-37BFB1210B50}"/>
-          </ac:spMkLst>
-        </pc:spChg>
-        <pc:picChg chg="add mod">
-          <ac:chgData name="윤성재" userId="76c7d8b9-0ed6-42c3-8827-8b2f94b0779a" providerId="ADAL" clId="{BE45B969-9097-4DAA-9E48-A61D72BE3E25}" dt="2020-09-28T07:18:11.985" v="3686" actId="14100"/>
-          <ac:picMkLst>
-            <pc:docMk/>
-            <pc:sldMk cId="4027514140" sldId="267"/>
-            <ac:picMk id="2050" creationId="{3561BB9F-9CB2-4738-8658-9F0C8B8681C7}"/>
-          </ac:picMkLst>
-        </pc:picChg>
-      </pc:sldChg>
-      <pc:sldChg chg="addSp delSp modSp new mod">
-        <pc:chgData name="윤성재" userId="76c7d8b9-0ed6-42c3-8827-8b2f94b0779a" providerId="ADAL" clId="{BE45B969-9097-4DAA-9E48-A61D72BE3E25}" dt="2020-09-29T07:25:27.930" v="6124" actId="6549"/>
-        <pc:sldMkLst>
-          <pc:docMk/>
-          <pc:sldMk cId="2042955228" sldId="268"/>
-        </pc:sldMkLst>
-        <pc:spChg chg="mod">
-          <ac:chgData name="윤성재" userId="76c7d8b9-0ed6-42c3-8827-8b2f94b0779a" providerId="ADAL" clId="{BE45B969-9097-4DAA-9E48-A61D72BE3E25}" dt="2020-09-29T06:28:53.337" v="5989"/>
-          <ac:spMkLst>
-            <pc:docMk/>
-            <pc:sldMk cId="2042955228" sldId="268"/>
-            <ac:spMk id="2" creationId="{8DC282CA-30F9-4B25-A229-375EC981A70B}"/>
-          </ac:spMkLst>
-        </pc:spChg>
-        <pc:spChg chg="del">
-          <ac:chgData name="윤성재" userId="76c7d8b9-0ed6-42c3-8827-8b2f94b0779a" providerId="ADAL" clId="{BE45B969-9097-4DAA-9E48-A61D72BE3E25}" dt="2020-09-29T06:13:33.856" v="4385" actId="478"/>
-          <ac:spMkLst>
-            <pc:docMk/>
-            <pc:sldMk cId="2042955228" sldId="268"/>
-            <ac:spMk id="3" creationId="{39D8FB74-7574-4A7C-A71C-62B10933C7F9}"/>
-          </ac:spMkLst>
-        </pc:spChg>
-        <pc:spChg chg="add mod">
-          <ac:chgData name="윤성재" userId="76c7d8b9-0ed6-42c3-8827-8b2f94b0779a" providerId="ADAL" clId="{BE45B969-9097-4DAA-9E48-A61D72BE3E25}" dt="2020-09-29T06:20:24.485" v="4832" actId="164"/>
-          <ac:spMkLst>
-            <pc:docMk/>
-            <pc:sldMk cId="2042955228" sldId="268"/>
-            <ac:spMk id="4" creationId="{546C1C8D-8527-4202-95D5-43B4FEBB3DE7}"/>
-          </ac:spMkLst>
-        </pc:spChg>
-        <pc:spChg chg="add mod">
-          <ac:chgData name="윤성재" userId="76c7d8b9-0ed6-42c3-8827-8b2f94b0779a" providerId="ADAL" clId="{BE45B969-9097-4DAA-9E48-A61D72BE3E25}" dt="2020-09-29T06:20:24.485" v="4832" actId="164"/>
-          <ac:spMkLst>
-            <pc:docMk/>
-            <pc:sldMk cId="2042955228" sldId="268"/>
-            <ac:spMk id="6" creationId="{1D33AF0D-139F-44AD-B10F-CEBFBD00ACBE}"/>
-          </ac:spMkLst>
-        </pc:spChg>
-        <pc:spChg chg="add mod">
-          <ac:chgData name="윤성재" userId="76c7d8b9-0ed6-42c3-8827-8b2f94b0779a" providerId="ADAL" clId="{BE45B969-9097-4DAA-9E48-A61D72BE3E25}" dt="2020-09-29T06:20:24.485" v="4832" actId="164"/>
-          <ac:spMkLst>
-            <pc:docMk/>
-            <pc:sldMk cId="2042955228" sldId="268"/>
-            <ac:spMk id="8" creationId="{A7F61406-EFBE-451B-B60A-FD3E9D5703E3}"/>
-          </ac:spMkLst>
-        </pc:spChg>
-        <pc:spChg chg="add mod">
-          <ac:chgData name="윤성재" userId="76c7d8b9-0ed6-42c3-8827-8b2f94b0779a" providerId="ADAL" clId="{BE45B969-9097-4DAA-9E48-A61D72BE3E25}" dt="2020-09-29T06:20:24.485" v="4832" actId="164"/>
-          <ac:spMkLst>
-            <pc:docMk/>
-            <pc:sldMk cId="2042955228" sldId="268"/>
-            <ac:spMk id="10" creationId="{81467237-12CC-45C3-B0EC-477A39CADEBD}"/>
-          </ac:spMkLst>
-        </pc:spChg>
-        <pc:spChg chg="add mod">
-          <ac:chgData name="윤성재" userId="76c7d8b9-0ed6-42c3-8827-8b2f94b0779a" providerId="ADAL" clId="{BE45B969-9097-4DAA-9E48-A61D72BE3E25}" dt="2020-09-29T06:20:24.485" v="4832" actId="164"/>
-          <ac:spMkLst>
-            <pc:docMk/>
-            <pc:sldMk cId="2042955228" sldId="268"/>
-            <ac:spMk id="12" creationId="{31F6869D-E20E-43C2-872D-7BF06B327E55}"/>
-          </ac:spMkLst>
-        </pc:spChg>
-        <pc:spChg chg="add mod">
-          <ac:chgData name="윤성재" userId="76c7d8b9-0ed6-42c3-8827-8b2f94b0779a" providerId="ADAL" clId="{BE45B969-9097-4DAA-9E48-A61D72BE3E25}" dt="2020-09-29T06:20:24.485" v="4832" actId="164"/>
-          <ac:spMkLst>
-            <pc:docMk/>
-            <pc:sldMk cId="2042955228" sldId="268"/>
-            <ac:spMk id="14" creationId="{7D116FF5-88BA-444E-A62D-5180A1091471}"/>
-          </ac:spMkLst>
-        </pc:spChg>
-        <pc:spChg chg="add del mod">
-          <ac:chgData name="윤성재" userId="76c7d8b9-0ed6-42c3-8827-8b2f94b0779a" providerId="ADAL" clId="{BE45B969-9097-4DAA-9E48-A61D72BE3E25}" dt="2020-09-29T06:15:59.405" v="4494" actId="478"/>
-          <ac:spMkLst>
-            <pc:docMk/>
-            <pc:sldMk cId="2042955228" sldId="268"/>
-            <ac:spMk id="16" creationId="{CF6291A3-BBA6-41D9-8B4F-E3C36716564A}"/>
-          </ac:spMkLst>
-        </pc:spChg>
-        <pc:spChg chg="add mod">
-          <ac:chgData name="윤성재" userId="76c7d8b9-0ed6-42c3-8827-8b2f94b0779a" providerId="ADAL" clId="{BE45B969-9097-4DAA-9E48-A61D72BE3E25}" dt="2020-09-29T06:20:24.485" v="4832" actId="164"/>
-          <ac:spMkLst>
-            <pc:docMk/>
-            <pc:sldMk cId="2042955228" sldId="268"/>
-            <ac:spMk id="18" creationId="{6260F2DF-0F2A-4901-BBC1-D461585DFC0F}"/>
-          </ac:spMkLst>
-        </pc:spChg>
-        <pc:spChg chg="add mod">
-          <ac:chgData name="윤성재" userId="76c7d8b9-0ed6-42c3-8827-8b2f94b0779a" providerId="ADAL" clId="{BE45B969-9097-4DAA-9E48-A61D72BE3E25}" dt="2020-09-29T06:20:24.485" v="4832" actId="164"/>
-          <ac:spMkLst>
-            <pc:docMk/>
-            <pc:sldMk cId="2042955228" sldId="268"/>
-            <ac:spMk id="20" creationId="{9CE5E5F9-4BCB-401B-AA77-2E0E725D0B4D}"/>
-          </ac:spMkLst>
-        </pc:spChg>
-        <pc:spChg chg="add mod">
-          <ac:chgData name="윤성재" userId="76c7d8b9-0ed6-42c3-8827-8b2f94b0779a" providerId="ADAL" clId="{BE45B969-9097-4DAA-9E48-A61D72BE3E25}" dt="2020-09-29T06:20:24.485" v="4832" actId="164"/>
-          <ac:spMkLst>
-            <pc:docMk/>
-            <pc:sldMk cId="2042955228" sldId="268"/>
-            <ac:spMk id="22" creationId="{A16E8507-F4BD-4861-8CEC-1543FEDC8E37}"/>
-          </ac:spMkLst>
-        </pc:spChg>
-        <pc:spChg chg="add mod">
-          <ac:chgData name="윤성재" userId="76c7d8b9-0ed6-42c3-8827-8b2f94b0779a" providerId="ADAL" clId="{BE45B969-9097-4DAA-9E48-A61D72BE3E25}" dt="2020-09-29T06:20:24.485" v="4832" actId="164"/>
-          <ac:spMkLst>
-            <pc:docMk/>
-            <pc:sldMk cId="2042955228" sldId="268"/>
-            <ac:spMk id="24" creationId="{E08BE75C-AC27-47E0-B8F6-8AA2E6EF36C1}"/>
-          </ac:spMkLst>
-        </pc:spChg>
-        <pc:spChg chg="add del">
-          <ac:chgData name="윤성재" userId="76c7d8b9-0ed6-42c3-8827-8b2f94b0779a" providerId="ADAL" clId="{BE45B969-9097-4DAA-9E48-A61D72BE3E25}" dt="2020-09-29T06:17:23.324" v="4565" actId="478"/>
-          <ac:spMkLst>
-            <pc:docMk/>
-            <pc:sldMk cId="2042955228" sldId="268"/>
-            <ac:spMk id="26" creationId="{E5DF18F2-CBD0-4111-BC6C-815870D97870}"/>
-          </ac:spMkLst>
-        </pc:spChg>
-        <pc:spChg chg="add mod">
-          <ac:chgData name="윤성재" userId="76c7d8b9-0ed6-42c3-8827-8b2f94b0779a" providerId="ADAL" clId="{BE45B969-9097-4DAA-9E48-A61D72BE3E25}" dt="2020-09-29T06:20:24.485" v="4832" actId="164"/>
-          <ac:spMkLst>
-            <pc:docMk/>
-            <pc:sldMk cId="2042955228" sldId="268"/>
-            <ac:spMk id="28" creationId="{74523349-E141-4614-A63B-5E5307EA244B}"/>
-          </ac:spMkLst>
-        </pc:spChg>
-        <pc:spChg chg="add mod">
-          <ac:chgData name="윤성재" userId="76c7d8b9-0ed6-42c3-8827-8b2f94b0779a" providerId="ADAL" clId="{BE45B969-9097-4DAA-9E48-A61D72BE3E25}" dt="2020-09-29T06:20:24.485" v="4832" actId="164"/>
-          <ac:spMkLst>
-            <pc:docMk/>
-            <pc:sldMk cId="2042955228" sldId="268"/>
-            <ac:spMk id="30" creationId="{E1AF28B2-3B6F-4052-ADF9-00CC894413FD}"/>
-          </ac:spMkLst>
-        </pc:spChg>
-        <pc:spChg chg="add mod">
-          <ac:chgData name="윤성재" userId="76c7d8b9-0ed6-42c3-8827-8b2f94b0779a" providerId="ADAL" clId="{BE45B969-9097-4DAA-9E48-A61D72BE3E25}" dt="2020-09-29T06:20:24.485" v="4832" actId="164"/>
-          <ac:spMkLst>
-            <pc:docMk/>
-            <pc:sldMk cId="2042955228" sldId="268"/>
-            <ac:spMk id="32" creationId="{06F997F2-65A8-44FE-B39D-D960107F3822}"/>
-          </ac:spMkLst>
-        </pc:spChg>
-        <pc:spChg chg="add mod">
-          <ac:chgData name="윤성재" userId="76c7d8b9-0ed6-42c3-8827-8b2f94b0779a" providerId="ADAL" clId="{BE45B969-9097-4DAA-9E48-A61D72BE3E25}" dt="2020-09-29T06:20:24.485" v="4832" actId="164"/>
-          <ac:spMkLst>
-            <pc:docMk/>
-            <pc:sldMk cId="2042955228" sldId="268"/>
-            <ac:spMk id="34" creationId="{767665A5-A1FD-4D8D-AEF0-991E8D58C946}"/>
-          </ac:spMkLst>
-        </pc:spChg>
-        <pc:spChg chg="add mod">
-          <ac:chgData name="윤성재" userId="76c7d8b9-0ed6-42c3-8827-8b2f94b0779a" providerId="ADAL" clId="{BE45B969-9097-4DAA-9E48-A61D72BE3E25}" dt="2020-09-29T06:20:24.485" v="4832" actId="164"/>
-          <ac:spMkLst>
-            <pc:docMk/>
-            <pc:sldMk cId="2042955228" sldId="268"/>
-            <ac:spMk id="36" creationId="{1E4F70E2-62E4-4A91-81F8-DBC9DD2E7A7F}"/>
-          </ac:spMkLst>
-        </pc:spChg>
-        <pc:spChg chg="add mod">
-          <ac:chgData name="윤성재" userId="76c7d8b9-0ed6-42c3-8827-8b2f94b0779a" providerId="ADAL" clId="{BE45B969-9097-4DAA-9E48-A61D72BE3E25}" dt="2020-09-29T06:18:41.922" v="4623" actId="1076"/>
-          <ac:spMkLst>
-            <pc:docMk/>
-            <pc:sldMk cId="2042955228" sldId="268"/>
-            <ac:spMk id="38" creationId="{7697E859-69C4-454F-9F21-B6F30613A898}"/>
-          </ac:spMkLst>
-        </pc:spChg>
-        <pc:spChg chg="add mod">
-          <ac:chgData name="윤성재" userId="76c7d8b9-0ed6-42c3-8827-8b2f94b0779a" providerId="ADAL" clId="{BE45B969-9097-4DAA-9E48-A61D72BE3E25}" dt="2020-09-29T06:18:39.675" v="4622" actId="207"/>
-          <ac:spMkLst>
-            <pc:docMk/>
-            <pc:sldMk cId="2042955228" sldId="268"/>
-            <ac:spMk id="40" creationId="{E6B90C67-0AA2-414C-98EB-DAC7CA559BD3}"/>
-          </ac:spMkLst>
-        </pc:spChg>
-        <pc:spChg chg="add mod">
-          <ac:chgData name="윤성재" userId="76c7d8b9-0ed6-42c3-8827-8b2f94b0779a" providerId="ADAL" clId="{BE45B969-9097-4DAA-9E48-A61D72BE3E25}" dt="2020-09-29T06:18:47.139" v="4634" actId="1076"/>
-          <ac:spMkLst>
-            <pc:docMk/>
-            <pc:sldMk cId="2042955228" sldId="268"/>
-            <ac:spMk id="42" creationId="{1E6176C7-47F5-49E5-AB5D-7E2CD955EC0E}"/>
-          </ac:spMkLst>
-        </pc:spChg>
-        <pc:spChg chg="add mod">
-          <ac:chgData name="윤성재" userId="76c7d8b9-0ed6-42c3-8827-8b2f94b0779a" providerId="ADAL" clId="{BE45B969-9097-4DAA-9E48-A61D72BE3E25}" dt="2020-09-29T06:20:24.485" v="4832" actId="164"/>
-          <ac:spMkLst>
-            <pc:docMk/>
-            <pc:sldMk cId="2042955228" sldId="268"/>
-            <ac:spMk id="44" creationId="{49DB4571-8F1E-473C-A39A-1341878B46E5}"/>
-          </ac:spMkLst>
-        </pc:spChg>
-        <pc:spChg chg="add mod">
-          <ac:chgData name="윤성재" userId="76c7d8b9-0ed6-42c3-8827-8b2f94b0779a" providerId="ADAL" clId="{BE45B969-9097-4DAA-9E48-A61D72BE3E25}" dt="2020-09-29T06:18:58.505" v="4656" actId="1076"/>
-          <ac:spMkLst>
-            <pc:docMk/>
-            <pc:sldMk cId="2042955228" sldId="268"/>
-            <ac:spMk id="46" creationId="{FC868735-43BC-4357-82BA-339350CD8E6A}"/>
-          </ac:spMkLst>
-        </pc:spChg>
-        <pc:spChg chg="add mod">
-          <ac:chgData name="윤성재" userId="76c7d8b9-0ed6-42c3-8827-8b2f94b0779a" providerId="ADAL" clId="{BE45B969-9097-4DAA-9E48-A61D72BE3E25}" dt="2020-09-29T07:25:27.930" v="6124" actId="6549"/>
-          <ac:spMkLst>
-            <pc:docMk/>
-            <pc:sldMk cId="2042955228" sldId="268"/>
-            <ac:spMk id="51" creationId="{74B0F85C-B08B-4FBE-8563-41DE777D9AA9}"/>
-          </ac:spMkLst>
-        </pc:spChg>
-        <pc:spChg chg="add mod">
-          <ac:chgData name="윤성재" userId="76c7d8b9-0ed6-42c3-8827-8b2f94b0779a" providerId="ADAL" clId="{BE45B969-9097-4DAA-9E48-A61D72BE3E25}" dt="2020-09-29T06:24:23.610" v="5023" actId="1076"/>
-          <ac:spMkLst>
-            <pc:docMk/>
-            <pc:sldMk cId="2042955228" sldId="268"/>
-            <ac:spMk id="54" creationId="{6FA503E1-C355-4BB9-8A8D-C33B023D0877}"/>
-          </ac:spMkLst>
-        </pc:spChg>
-        <pc:grpChg chg="add mod">
-          <ac:chgData name="윤성재" userId="76c7d8b9-0ed6-42c3-8827-8b2f94b0779a" providerId="ADAL" clId="{BE45B969-9097-4DAA-9E48-A61D72BE3E25}" dt="2020-09-29T06:20:24.485" v="4832" actId="164"/>
-          <ac:grpSpMkLst>
-            <pc:docMk/>
-            <pc:sldMk cId="2042955228" sldId="268"/>
-            <ac:grpSpMk id="52" creationId="{CDF757E4-7F13-4D32-8051-C34631A3C07E}"/>
-          </ac:grpSpMkLst>
-        </pc:grpChg>
-        <pc:cxnChg chg="add mod">
-          <ac:chgData name="윤성재" userId="76c7d8b9-0ed6-42c3-8827-8b2f94b0779a" providerId="ADAL" clId="{BE45B969-9097-4DAA-9E48-A61D72BE3E25}" dt="2020-09-29T06:19:31.818" v="4684" actId="1076"/>
-          <ac:cxnSpMkLst>
-            <pc:docMk/>
-            <pc:sldMk cId="2042955228" sldId="268"/>
-            <ac:cxnSpMk id="47" creationId="{A8540E20-AFF2-4E40-B10D-050620E662B5}"/>
-          </ac:cxnSpMkLst>
-        </pc:cxnChg>
-      </pc:sldChg>
-      <pc:sldChg chg="addSp delSp modSp new mod">
-        <pc:chgData name="윤성재" userId="76c7d8b9-0ed6-42c3-8827-8b2f94b0779a" providerId="ADAL" clId="{BE45B969-9097-4DAA-9E48-A61D72BE3E25}" dt="2020-09-29T06:29:03.435" v="6011" actId="6549"/>
-        <pc:sldMkLst>
-          <pc:docMk/>
-          <pc:sldMk cId="745412383" sldId="269"/>
-        </pc:sldMkLst>
-        <pc:spChg chg="mod">
-          <ac:chgData name="윤성재" userId="76c7d8b9-0ed6-42c3-8827-8b2f94b0779a" providerId="ADAL" clId="{BE45B969-9097-4DAA-9E48-A61D72BE3E25}" dt="2020-09-29T06:28:58.283" v="6008"/>
-          <ac:spMkLst>
-            <pc:docMk/>
-            <pc:sldMk cId="745412383" sldId="269"/>
-            <ac:spMk id="2" creationId="{C05FD4FC-AD69-47D4-84F3-131F318CC2BD}"/>
-          </ac:spMkLst>
-        </pc:spChg>
-        <pc:spChg chg="del">
-          <ac:chgData name="윤성재" userId="76c7d8b9-0ed6-42c3-8827-8b2f94b0779a" providerId="ADAL" clId="{BE45B969-9097-4DAA-9E48-A61D72BE3E25}" dt="2020-09-29T06:20:27.146" v="4834" actId="478"/>
-          <ac:spMkLst>
-            <pc:docMk/>
-            <pc:sldMk cId="745412383" sldId="269"/>
-            <ac:spMk id="3" creationId="{FF66B148-228E-46BD-85CC-EE08E997D5AC}"/>
-          </ac:spMkLst>
-        </pc:spChg>
-        <pc:spChg chg="mod">
-          <ac:chgData name="윤성재" userId="76c7d8b9-0ed6-42c3-8827-8b2f94b0779a" providerId="ADAL" clId="{BE45B969-9097-4DAA-9E48-A61D72BE3E25}" dt="2020-09-29T06:20:25.588" v="4833"/>
-          <ac:spMkLst>
-            <pc:docMk/>
-            <pc:sldMk cId="745412383" sldId="269"/>
-            <ac:spMk id="5" creationId="{726F551C-5CF0-4748-8E92-C42F0740CB9F}"/>
-          </ac:spMkLst>
-        </pc:spChg>
-        <pc:spChg chg="mod">
-          <ac:chgData name="윤성재" userId="76c7d8b9-0ed6-42c3-8827-8b2f94b0779a" providerId="ADAL" clId="{BE45B969-9097-4DAA-9E48-A61D72BE3E25}" dt="2020-09-29T06:20:25.588" v="4833"/>
-          <ac:spMkLst>
-            <pc:docMk/>
-            <pc:sldMk cId="745412383" sldId="269"/>
-            <ac:spMk id="6" creationId="{7056E405-8AE2-4B37-907F-75052B837F8E}"/>
-          </ac:spMkLst>
-        </pc:spChg>
-        <pc:spChg chg="mod">
-          <ac:chgData name="윤성재" userId="76c7d8b9-0ed6-42c3-8827-8b2f94b0779a" providerId="ADAL" clId="{BE45B969-9097-4DAA-9E48-A61D72BE3E25}" dt="2020-09-29T06:20:25.588" v="4833"/>
-          <ac:spMkLst>
-            <pc:docMk/>
-            <pc:sldMk cId="745412383" sldId="269"/>
-            <ac:spMk id="7" creationId="{76101337-A9F5-430D-8223-464D38799ECC}"/>
-          </ac:spMkLst>
-        </pc:spChg>
-        <pc:spChg chg="mod">
-          <ac:chgData name="윤성재" userId="76c7d8b9-0ed6-42c3-8827-8b2f94b0779a" providerId="ADAL" clId="{BE45B969-9097-4DAA-9E48-A61D72BE3E25}" dt="2020-09-29T06:20:25.588" v="4833"/>
-          <ac:spMkLst>
-            <pc:docMk/>
-            <pc:sldMk cId="745412383" sldId="269"/>
-            <ac:spMk id="8" creationId="{2147FA68-95D3-4F49-A0DB-6B3DF41E10AD}"/>
-          </ac:spMkLst>
-        </pc:spChg>
-        <pc:spChg chg="mod">
-          <ac:chgData name="윤성재" userId="76c7d8b9-0ed6-42c3-8827-8b2f94b0779a" providerId="ADAL" clId="{BE45B969-9097-4DAA-9E48-A61D72BE3E25}" dt="2020-09-29T06:20:25.588" v="4833"/>
-          <ac:spMkLst>
-            <pc:docMk/>
-            <pc:sldMk cId="745412383" sldId="269"/>
-            <ac:spMk id="9" creationId="{D51E7E73-91AC-48BE-AB42-0FCB83A9D830}"/>
-          </ac:spMkLst>
-        </pc:spChg>
-        <pc:spChg chg="mod">
-          <ac:chgData name="윤성재" userId="76c7d8b9-0ed6-42c3-8827-8b2f94b0779a" providerId="ADAL" clId="{BE45B969-9097-4DAA-9E48-A61D72BE3E25}" dt="2020-09-29T06:20:25.588" v="4833"/>
-          <ac:spMkLst>
-            <pc:docMk/>
-            <pc:sldMk cId="745412383" sldId="269"/>
-            <ac:spMk id="10" creationId="{1817EE94-6F5C-47B0-9F0F-442708444651}"/>
-          </ac:spMkLst>
-        </pc:spChg>
-        <pc:spChg chg="mod">
-          <ac:chgData name="윤성재" userId="76c7d8b9-0ed6-42c3-8827-8b2f94b0779a" providerId="ADAL" clId="{BE45B969-9097-4DAA-9E48-A61D72BE3E25}" dt="2020-09-29T06:20:25.588" v="4833"/>
-          <ac:spMkLst>
-            <pc:docMk/>
-            <pc:sldMk cId="745412383" sldId="269"/>
-            <ac:spMk id="11" creationId="{96BFB4EC-25EB-42BD-AFCA-2666EE0E3921}"/>
-          </ac:spMkLst>
-        </pc:spChg>
-        <pc:spChg chg="mod">
-          <ac:chgData name="윤성재" userId="76c7d8b9-0ed6-42c3-8827-8b2f94b0779a" providerId="ADAL" clId="{BE45B969-9097-4DAA-9E48-A61D72BE3E25}" dt="2020-09-29T06:20:25.588" v="4833"/>
-          <ac:spMkLst>
-            <pc:docMk/>
-            <pc:sldMk cId="745412383" sldId="269"/>
-            <ac:spMk id="12" creationId="{C619ECF8-93BE-48C6-B3A6-1FE3B540224A}"/>
-          </ac:spMkLst>
-        </pc:spChg>
-        <pc:spChg chg="mod">
-          <ac:chgData name="윤성재" userId="76c7d8b9-0ed6-42c3-8827-8b2f94b0779a" providerId="ADAL" clId="{BE45B969-9097-4DAA-9E48-A61D72BE3E25}" dt="2020-09-29T06:20:25.588" v="4833"/>
-          <ac:spMkLst>
-            <pc:docMk/>
-            <pc:sldMk cId="745412383" sldId="269"/>
-            <ac:spMk id="13" creationId="{0C762D78-9030-4D0F-9A66-0040049CB407}"/>
-          </ac:spMkLst>
-        </pc:spChg>
-        <pc:spChg chg="mod">
-          <ac:chgData name="윤성재" userId="76c7d8b9-0ed6-42c3-8827-8b2f94b0779a" providerId="ADAL" clId="{BE45B969-9097-4DAA-9E48-A61D72BE3E25}" dt="2020-09-29T06:20:25.588" v="4833"/>
-          <ac:spMkLst>
-            <pc:docMk/>
-            <pc:sldMk cId="745412383" sldId="269"/>
-            <ac:spMk id="14" creationId="{E32B808A-CDF8-4B87-B140-733B8960D755}"/>
-          </ac:spMkLst>
-        </pc:spChg>
-        <pc:spChg chg="mod">
-          <ac:chgData name="윤성재" userId="76c7d8b9-0ed6-42c3-8827-8b2f94b0779a" providerId="ADAL" clId="{BE45B969-9097-4DAA-9E48-A61D72BE3E25}" dt="2020-09-29T06:20:25.588" v="4833"/>
-          <ac:spMkLst>
-            <pc:docMk/>
-            <pc:sldMk cId="745412383" sldId="269"/>
-            <ac:spMk id="15" creationId="{5503648B-722E-479F-BDFB-4D95F7077C07}"/>
-          </ac:spMkLst>
-        </pc:spChg>
-        <pc:spChg chg="mod">
-          <ac:chgData name="윤성재" userId="76c7d8b9-0ed6-42c3-8827-8b2f94b0779a" providerId="ADAL" clId="{BE45B969-9097-4DAA-9E48-A61D72BE3E25}" dt="2020-09-29T06:20:25.588" v="4833"/>
-          <ac:spMkLst>
-            <pc:docMk/>
-            <pc:sldMk cId="745412383" sldId="269"/>
-            <ac:spMk id="16" creationId="{EB20A092-1C4B-4B65-909B-2717A56FFD95}"/>
-          </ac:spMkLst>
-        </pc:spChg>
-        <pc:spChg chg="mod">
-          <ac:chgData name="윤성재" userId="76c7d8b9-0ed6-42c3-8827-8b2f94b0779a" providerId="ADAL" clId="{BE45B969-9097-4DAA-9E48-A61D72BE3E25}" dt="2020-09-29T06:20:25.588" v="4833"/>
-          <ac:spMkLst>
-            <pc:docMk/>
-            <pc:sldMk cId="745412383" sldId="269"/>
-            <ac:spMk id="17" creationId="{58A1CA52-B464-4B4B-82A1-166C2040122F}"/>
-          </ac:spMkLst>
-        </pc:spChg>
-        <pc:spChg chg="mod">
-          <ac:chgData name="윤성재" userId="76c7d8b9-0ed6-42c3-8827-8b2f94b0779a" providerId="ADAL" clId="{BE45B969-9097-4DAA-9E48-A61D72BE3E25}" dt="2020-09-29T06:20:25.588" v="4833"/>
-          <ac:spMkLst>
-            <pc:docMk/>
-            <pc:sldMk cId="745412383" sldId="269"/>
-            <ac:spMk id="18" creationId="{AC0ED61B-B508-44A2-AA47-018321F563E5}"/>
-          </ac:spMkLst>
-        </pc:spChg>
-        <pc:spChg chg="del mod">
-          <ac:chgData name="윤성재" userId="76c7d8b9-0ed6-42c3-8827-8b2f94b0779a" providerId="ADAL" clId="{BE45B969-9097-4DAA-9E48-A61D72BE3E25}" dt="2020-09-29T06:20:29.684" v="4836" actId="478"/>
-          <ac:spMkLst>
-            <pc:docMk/>
-            <pc:sldMk cId="745412383" sldId="269"/>
-            <ac:spMk id="19" creationId="{DACAC704-F107-4FC3-86A7-A3C5FC2D165F}"/>
-          </ac:spMkLst>
-        </pc:spChg>
-        <pc:spChg chg="del mod">
-          <ac:chgData name="윤성재" userId="76c7d8b9-0ed6-42c3-8827-8b2f94b0779a" providerId="ADAL" clId="{BE45B969-9097-4DAA-9E48-A61D72BE3E25}" dt="2020-09-29T06:20:28.792" v="4835" actId="478"/>
-          <ac:spMkLst>
-            <pc:docMk/>
-            <pc:sldMk cId="745412383" sldId="269"/>
-            <ac:spMk id="20" creationId="{9941F198-3AC4-448A-B786-01D46B2FFD33}"/>
-          </ac:spMkLst>
-        </pc:spChg>
-        <pc:spChg chg="add del mod">
-          <ac:chgData name="윤성재" userId="76c7d8b9-0ed6-42c3-8827-8b2f94b0779a" providerId="ADAL" clId="{BE45B969-9097-4DAA-9E48-A61D72BE3E25}" dt="2020-09-29T06:20:46.044" v="4841" actId="478"/>
-          <ac:spMkLst>
-            <pc:docMk/>
-            <pc:sldMk cId="745412383" sldId="269"/>
-            <ac:spMk id="21" creationId="{27EDDDC9-B34E-4298-9DAF-F20E55B30F1D}"/>
-          </ac:spMkLst>
-        </pc:spChg>
-        <pc:spChg chg="add mod">
-          <ac:chgData name="윤성재" userId="76c7d8b9-0ed6-42c3-8827-8b2f94b0779a" providerId="ADAL" clId="{BE45B969-9097-4DAA-9E48-A61D72BE3E25}" dt="2020-09-29T06:22:38.731" v="4876" actId="1037"/>
-          <ac:spMkLst>
-            <pc:docMk/>
-            <pc:sldMk cId="745412383" sldId="269"/>
-            <ac:spMk id="40" creationId="{B782FD96-A568-4EE9-9D8C-94AD757F09BA}"/>
-          </ac:spMkLst>
-        </pc:spChg>
-        <pc:spChg chg="add mod">
-          <ac:chgData name="윤성재" userId="76c7d8b9-0ed6-42c3-8827-8b2f94b0779a" providerId="ADAL" clId="{BE45B969-9097-4DAA-9E48-A61D72BE3E25}" dt="2020-09-29T06:29:03.435" v="6011" actId="6549"/>
-          <ac:spMkLst>
-            <pc:docMk/>
-            <pc:sldMk cId="745412383" sldId="269"/>
-            <ac:spMk id="96" creationId="{0A6991DC-4E23-410C-BD7D-0B6EB844F579}"/>
-          </ac:spMkLst>
-        </pc:spChg>
-        <pc:spChg chg="add del">
-          <ac:chgData name="윤성재" userId="76c7d8b9-0ed6-42c3-8827-8b2f94b0779a" providerId="ADAL" clId="{BE45B969-9097-4DAA-9E48-A61D72BE3E25}" dt="2020-09-29T06:24:29.429" v="5025" actId="22"/>
-          <ac:spMkLst>
-            <pc:docMk/>
-            <pc:sldMk cId="745412383" sldId="269"/>
-            <ac:spMk id="98" creationId="{791F167B-2783-4B9B-992C-B0C4388366EB}"/>
-          </ac:spMkLst>
-        </pc:spChg>
-        <pc:spChg chg="add mod">
-          <ac:chgData name="윤성재" userId="76c7d8b9-0ed6-42c3-8827-8b2f94b0779a" providerId="ADAL" clId="{BE45B969-9097-4DAA-9E48-A61D72BE3E25}" dt="2020-09-29T06:24:33.732" v="5027" actId="1076"/>
-          <ac:spMkLst>
-            <pc:docMk/>
-            <pc:sldMk cId="745412383" sldId="269"/>
-            <ac:spMk id="100" creationId="{DD28F1FE-D4B8-422E-B2FB-0CDF573E325D}"/>
-          </ac:spMkLst>
-        </pc:spChg>
-        <pc:spChg chg="add mod">
-          <ac:chgData name="윤성재" userId="76c7d8b9-0ed6-42c3-8827-8b2f94b0779a" providerId="ADAL" clId="{BE45B969-9097-4DAA-9E48-A61D72BE3E25}" dt="2020-09-29T06:27:51.333" v="5970" actId="20577"/>
-          <ac:spMkLst>
-            <pc:docMk/>
-            <pc:sldMk cId="745412383" sldId="269"/>
-            <ac:spMk id="116" creationId="{66898A8E-1C7F-4764-B2F6-1F284B1CDD40}"/>
-          </ac:spMkLst>
-        </pc:spChg>
-        <pc:grpChg chg="add mod">
-          <ac:chgData name="윤성재" userId="76c7d8b9-0ed6-42c3-8827-8b2f94b0779a" providerId="ADAL" clId="{BE45B969-9097-4DAA-9E48-A61D72BE3E25}" dt="2020-09-29T06:20:34.314" v="4838" actId="1076"/>
-          <ac:grpSpMkLst>
-            <pc:docMk/>
-            <pc:sldMk cId="745412383" sldId="269"/>
-            <ac:grpSpMk id="4" creationId="{875AA8F6-8090-4C2A-BE7F-24210FC7A81F}"/>
-          </ac:grpSpMkLst>
-        </pc:grpChg>
-        <pc:cxnChg chg="add del mod">
-          <ac:chgData name="윤성재" userId="76c7d8b9-0ed6-42c3-8827-8b2f94b0779a" providerId="ADAL" clId="{BE45B969-9097-4DAA-9E48-A61D72BE3E25}" dt="2020-09-29T06:20:56.017" v="4844" actId="478"/>
-          <ac:cxnSpMkLst>
-            <pc:docMk/>
-            <pc:sldMk cId="745412383" sldId="269"/>
-            <ac:cxnSpMk id="23" creationId="{69FE14A5-51D7-482D-8533-F97936862950}"/>
-          </ac:cxnSpMkLst>
-        </pc:cxnChg>
-        <pc:cxnChg chg="add del mod">
-          <ac:chgData name="윤성재" userId="76c7d8b9-0ed6-42c3-8827-8b2f94b0779a" providerId="ADAL" clId="{BE45B969-9097-4DAA-9E48-A61D72BE3E25}" dt="2020-09-29T06:21:11.268" v="4848" actId="11529"/>
-          <ac:cxnSpMkLst>
-            <pc:docMk/>
-            <pc:sldMk cId="745412383" sldId="269"/>
-            <ac:cxnSpMk id="26" creationId="{B5290548-2438-4BA1-ABDB-5DC576F7081B}"/>
-          </ac:cxnSpMkLst>
-        </pc:cxnChg>
-        <pc:cxnChg chg="add mod">
-          <ac:chgData name="윤성재" userId="76c7d8b9-0ed6-42c3-8827-8b2f94b0779a" providerId="ADAL" clId="{BE45B969-9097-4DAA-9E48-A61D72BE3E25}" dt="2020-09-29T06:21:29.601" v="4851" actId="208"/>
-          <ac:cxnSpMkLst>
-            <pc:docMk/>
-            <pc:sldMk cId="745412383" sldId="269"/>
-            <ac:cxnSpMk id="29" creationId="{D4706248-7533-48A6-B37A-21F8C40B84D5}"/>
-          </ac:cxnSpMkLst>
-        </pc:cxnChg>
-        <pc:cxnChg chg="add del mod">
-          <ac:chgData name="윤성재" userId="76c7d8b9-0ed6-42c3-8827-8b2f94b0779a" providerId="ADAL" clId="{BE45B969-9097-4DAA-9E48-A61D72BE3E25}" dt="2020-09-29T06:21:32.961" v="4853" actId="478"/>
-          <ac:cxnSpMkLst>
-            <pc:docMk/>
-            <pc:sldMk cId="745412383" sldId="269"/>
-            <ac:cxnSpMk id="31" creationId="{7A886F54-901D-41A0-AA00-C7A97FB3B0BB}"/>
-          </ac:cxnSpMkLst>
-        </pc:cxnChg>
-        <pc:cxnChg chg="add del mod">
-          <ac:chgData name="윤성재" userId="76c7d8b9-0ed6-42c3-8827-8b2f94b0779a" providerId="ADAL" clId="{BE45B969-9097-4DAA-9E48-A61D72BE3E25}" dt="2020-09-29T06:21:41.955" v="4855" actId="478"/>
-          <ac:cxnSpMkLst>
-            <pc:docMk/>
-            <pc:sldMk cId="745412383" sldId="269"/>
-            <ac:cxnSpMk id="33" creationId="{50CA704C-8CC9-45F8-B659-7065B81DCC21}"/>
-          </ac:cxnSpMkLst>
-        </pc:cxnChg>
-        <pc:cxnChg chg="add mod">
-          <ac:chgData name="윤성재" userId="76c7d8b9-0ed6-42c3-8827-8b2f94b0779a" providerId="ADAL" clId="{BE45B969-9097-4DAA-9E48-A61D72BE3E25}" dt="2020-09-29T06:24:38.483" v="5029" actId="14100"/>
-          <ac:cxnSpMkLst>
-            <pc:docMk/>
-            <pc:sldMk cId="745412383" sldId="269"/>
-            <ac:cxnSpMk id="35" creationId="{1E7A633D-2707-4527-AE67-6234659C255E}"/>
-          </ac:cxnSpMkLst>
-        </pc:cxnChg>
-        <pc:cxnChg chg="add mod">
-          <ac:chgData name="윤성재" userId="76c7d8b9-0ed6-42c3-8827-8b2f94b0779a" providerId="ADAL" clId="{BE45B969-9097-4DAA-9E48-A61D72BE3E25}" dt="2020-09-29T06:21:56.939" v="4859" actId="1076"/>
-          <ac:cxnSpMkLst>
-            <pc:docMk/>
-            <pc:sldMk cId="745412383" sldId="269"/>
-            <ac:cxnSpMk id="36" creationId="{A487FF07-85A9-476B-B0E2-EBF01E941F3E}"/>
-          </ac:cxnSpMkLst>
-        </pc:cxnChg>
-        <pc:cxnChg chg="add mod">
-          <ac:chgData name="윤성재" userId="76c7d8b9-0ed6-42c3-8827-8b2f94b0779a" providerId="ADAL" clId="{BE45B969-9097-4DAA-9E48-A61D72BE3E25}" dt="2020-09-29T06:22:00.517" v="4861" actId="1076"/>
-          <ac:cxnSpMkLst>
-            <pc:docMk/>
-            <pc:sldMk cId="745412383" sldId="269"/>
-            <ac:cxnSpMk id="37" creationId="{059DAB48-53AA-4119-9DA7-0CF105B7021F}"/>
-          </ac:cxnSpMkLst>
-        </pc:cxnChg>
-        <pc:cxnChg chg="add del mod">
-          <ac:chgData name="윤성재" userId="76c7d8b9-0ed6-42c3-8827-8b2f94b0779a" providerId="ADAL" clId="{BE45B969-9097-4DAA-9E48-A61D72BE3E25}" dt="2020-09-29T06:22:11.687" v="4863" actId="478"/>
-          <ac:cxnSpMkLst>
-            <pc:docMk/>
-            <pc:sldMk cId="745412383" sldId="269"/>
-            <ac:cxnSpMk id="39" creationId="{B657AA32-9DF8-42AF-8822-37E0BA00022B}"/>
-          </ac:cxnSpMkLst>
-        </pc:cxnChg>
-        <pc:cxnChg chg="add mod">
-          <ac:chgData name="윤성재" userId="76c7d8b9-0ed6-42c3-8827-8b2f94b0779a" providerId="ADAL" clId="{BE45B969-9097-4DAA-9E48-A61D72BE3E25}" dt="2020-09-29T06:22:46.379" v="4879" actId="14100"/>
-          <ac:cxnSpMkLst>
-            <pc:docMk/>
-            <pc:sldMk cId="745412383" sldId="269"/>
-            <ac:cxnSpMk id="41" creationId="{18623BC2-1179-40DF-A4CC-E07352B48E86}"/>
-          </ac:cxnSpMkLst>
-        </pc:cxnChg>
-        <pc:cxnChg chg="add mod">
-          <ac:chgData name="윤성재" userId="76c7d8b9-0ed6-42c3-8827-8b2f94b0779a" providerId="ADAL" clId="{BE45B969-9097-4DAA-9E48-A61D72BE3E25}" dt="2020-09-29T06:22:49.794" v="4882" actId="14100"/>
-          <ac:cxnSpMkLst>
-            <pc:docMk/>
-            <pc:sldMk cId="745412383" sldId="269"/>
-            <ac:cxnSpMk id="44" creationId="{9E2B1147-598D-4A8C-8C8C-F1923F09C3CE}"/>
-          </ac:cxnSpMkLst>
-        </pc:cxnChg>
-        <pc:cxnChg chg="add mod">
-          <ac:chgData name="윤성재" userId="76c7d8b9-0ed6-42c3-8827-8b2f94b0779a" providerId="ADAL" clId="{BE45B969-9097-4DAA-9E48-A61D72BE3E25}" dt="2020-09-29T06:22:52.764" v="4885" actId="14100"/>
-          <ac:cxnSpMkLst>
-            <pc:docMk/>
-            <pc:sldMk cId="745412383" sldId="269"/>
-            <ac:cxnSpMk id="47" creationId="{CD4FAC89-895C-45AE-8F27-811D8261DCA1}"/>
-          </ac:cxnSpMkLst>
-        </pc:cxnChg>
-        <pc:cxnChg chg="add mod">
-          <ac:chgData name="윤성재" userId="76c7d8b9-0ed6-42c3-8827-8b2f94b0779a" providerId="ADAL" clId="{BE45B969-9097-4DAA-9E48-A61D72BE3E25}" dt="2020-09-29T06:22:56.769" v="4888" actId="14100"/>
-          <ac:cxnSpMkLst>
-            <pc:docMk/>
-            <pc:sldMk cId="745412383" sldId="269"/>
-            <ac:cxnSpMk id="50" creationId="{A62A7C35-AFCD-4F09-8D46-2A52615A7880}"/>
-          </ac:cxnSpMkLst>
-        </pc:cxnChg>
-        <pc:cxnChg chg="add mod">
-          <ac:chgData name="윤성재" userId="76c7d8b9-0ed6-42c3-8827-8b2f94b0779a" providerId="ADAL" clId="{BE45B969-9097-4DAA-9E48-A61D72BE3E25}" dt="2020-09-29T06:23:00.234" v="4891" actId="14100"/>
-          <ac:cxnSpMkLst>
-            <pc:docMk/>
-            <pc:sldMk cId="745412383" sldId="269"/>
-            <ac:cxnSpMk id="53" creationId="{E394813B-B46B-4022-BE51-45D0A70C8DC4}"/>
-          </ac:cxnSpMkLst>
-        </pc:cxnChg>
-        <pc:cxnChg chg="add mod">
-          <ac:chgData name="윤성재" userId="76c7d8b9-0ed6-42c3-8827-8b2f94b0779a" providerId="ADAL" clId="{BE45B969-9097-4DAA-9E48-A61D72BE3E25}" dt="2020-09-29T06:23:03.313" v="4894" actId="14100"/>
-          <ac:cxnSpMkLst>
-            <pc:docMk/>
-            <pc:sldMk cId="745412383" sldId="269"/>
-            <ac:cxnSpMk id="56" creationId="{20BF709C-61E5-4C43-934E-9C33EB87AD8F}"/>
-          </ac:cxnSpMkLst>
-        </pc:cxnChg>
-        <pc:cxnChg chg="add del mod">
-          <ac:chgData name="윤성재" userId="76c7d8b9-0ed6-42c3-8827-8b2f94b0779a" providerId="ADAL" clId="{BE45B969-9097-4DAA-9E48-A61D72BE3E25}" dt="2020-09-29T06:23:17.899" v="4901" actId="478"/>
-          <ac:cxnSpMkLst>
-            <pc:docMk/>
-            <pc:sldMk cId="745412383" sldId="269"/>
-            <ac:cxnSpMk id="59" creationId="{7A195467-7E50-486C-844C-B868756DF8C9}"/>
-          </ac:cxnSpMkLst>
-        </pc:cxnChg>
-        <pc:cxnChg chg="add del mod">
-          <ac:chgData name="윤성재" userId="76c7d8b9-0ed6-42c3-8827-8b2f94b0779a" providerId="ADAL" clId="{BE45B969-9097-4DAA-9E48-A61D72BE3E25}" dt="2020-09-29T06:23:17.899" v="4901" actId="478"/>
-          <ac:cxnSpMkLst>
-            <pc:docMk/>
-            <pc:sldMk cId="745412383" sldId="269"/>
-            <ac:cxnSpMk id="60" creationId="{29A53881-DE25-4C92-9E86-13EA93F3B086}"/>
-          </ac:cxnSpMkLst>
-        </pc:cxnChg>
-        <pc:cxnChg chg="add del mod">
-          <ac:chgData name="윤성재" userId="76c7d8b9-0ed6-42c3-8827-8b2f94b0779a" providerId="ADAL" clId="{BE45B969-9097-4DAA-9E48-A61D72BE3E25}" dt="2020-09-29T06:23:17.899" v="4901" actId="478"/>
-          <ac:cxnSpMkLst>
-            <pc:docMk/>
-            <pc:sldMk cId="745412383" sldId="269"/>
-            <ac:cxnSpMk id="61" creationId="{85664941-8321-45BA-BF80-AACD3109798D}"/>
-          </ac:cxnSpMkLst>
-        </pc:cxnChg>
-        <pc:cxnChg chg="add del mod">
-          <ac:chgData name="윤성재" userId="76c7d8b9-0ed6-42c3-8827-8b2f94b0779a" providerId="ADAL" clId="{BE45B969-9097-4DAA-9E48-A61D72BE3E25}" dt="2020-09-29T06:23:17.899" v="4901" actId="478"/>
-          <ac:cxnSpMkLst>
-            <pc:docMk/>
-            <pc:sldMk cId="745412383" sldId="269"/>
-            <ac:cxnSpMk id="62" creationId="{9798A991-8C17-40F0-95E5-2D4D8BF0D9C3}"/>
-          </ac:cxnSpMkLst>
-        </pc:cxnChg>
-        <pc:cxnChg chg="add del mod">
-          <ac:chgData name="윤성재" userId="76c7d8b9-0ed6-42c3-8827-8b2f94b0779a" providerId="ADAL" clId="{BE45B969-9097-4DAA-9E48-A61D72BE3E25}" dt="2020-09-29T06:23:17.899" v="4901" actId="478"/>
-          <ac:cxnSpMkLst>
-            <pc:docMk/>
-            <pc:sldMk cId="745412383" sldId="269"/>
-            <ac:cxnSpMk id="63" creationId="{1A10387E-39CF-41DF-8C4F-FF2DDB9E5E8F}"/>
-          </ac:cxnSpMkLst>
-        </pc:cxnChg>
-        <pc:cxnChg chg="add del mod">
-          <ac:chgData name="윤성재" userId="76c7d8b9-0ed6-42c3-8827-8b2f94b0779a" providerId="ADAL" clId="{BE45B969-9097-4DAA-9E48-A61D72BE3E25}" dt="2020-09-29T06:23:17.899" v="4901" actId="478"/>
-          <ac:cxnSpMkLst>
-            <pc:docMk/>
-            <pc:sldMk cId="745412383" sldId="269"/>
-            <ac:cxnSpMk id="64" creationId="{B2D3DA5A-CB66-4480-AC80-F7302EC464E0}"/>
-          </ac:cxnSpMkLst>
-        </pc:cxnChg>
-        <pc:cxnChg chg="add mod">
-          <ac:chgData name="윤성재" userId="76c7d8b9-0ed6-42c3-8827-8b2f94b0779a" providerId="ADAL" clId="{BE45B969-9097-4DAA-9E48-A61D72BE3E25}" dt="2020-09-29T06:23:22.185" v="4904" actId="14100"/>
-          <ac:cxnSpMkLst>
-            <pc:docMk/>
-            <pc:sldMk cId="745412383" sldId="269"/>
-            <ac:cxnSpMk id="77" creationId="{CC89F590-D686-44C9-8C9E-52741255D79A}"/>
-          </ac:cxnSpMkLst>
-        </pc:cxnChg>
-        <pc:cxnChg chg="add mod">
-          <ac:chgData name="윤성재" userId="76c7d8b9-0ed6-42c3-8827-8b2f94b0779a" providerId="ADAL" clId="{BE45B969-9097-4DAA-9E48-A61D72BE3E25}" dt="2020-09-29T06:23:27.106" v="4907" actId="14100"/>
-          <ac:cxnSpMkLst>
-            <pc:docMk/>
-            <pc:sldMk cId="745412383" sldId="269"/>
-            <ac:cxnSpMk id="80" creationId="{F08B391A-C93A-4A4A-AC4C-D00C68EC93A2}"/>
-          </ac:cxnSpMkLst>
-        </pc:cxnChg>
-        <pc:cxnChg chg="add mod">
-          <ac:chgData name="윤성재" userId="76c7d8b9-0ed6-42c3-8827-8b2f94b0779a" providerId="ADAL" clId="{BE45B969-9097-4DAA-9E48-A61D72BE3E25}" dt="2020-09-29T06:23:29.610" v="4910" actId="14100"/>
-          <ac:cxnSpMkLst>
-            <pc:docMk/>
-            <pc:sldMk cId="745412383" sldId="269"/>
-            <ac:cxnSpMk id="83" creationId="{F79B2ED6-EAA5-4077-82D2-BC13871C3709}"/>
-          </ac:cxnSpMkLst>
-        </pc:cxnChg>
-        <pc:cxnChg chg="add mod">
-          <ac:chgData name="윤성재" userId="76c7d8b9-0ed6-42c3-8827-8b2f94b0779a" providerId="ADAL" clId="{BE45B969-9097-4DAA-9E48-A61D72BE3E25}" dt="2020-09-29T06:23:32.778" v="4913" actId="14100"/>
-          <ac:cxnSpMkLst>
-            <pc:docMk/>
-            <pc:sldMk cId="745412383" sldId="269"/>
-            <ac:cxnSpMk id="86" creationId="{9D63467F-1BCE-4B1B-B2FA-7D316C0137EC}"/>
-          </ac:cxnSpMkLst>
-        </pc:cxnChg>
-        <pc:cxnChg chg="add mod">
-          <ac:chgData name="윤성재" userId="76c7d8b9-0ed6-42c3-8827-8b2f94b0779a" providerId="ADAL" clId="{BE45B969-9097-4DAA-9E48-A61D72BE3E25}" dt="2020-09-29T06:23:35.402" v="4916" actId="14100"/>
-          <ac:cxnSpMkLst>
-            <pc:docMk/>
-            <pc:sldMk cId="745412383" sldId="269"/>
-            <ac:cxnSpMk id="89" creationId="{D5B11397-F25A-4F9E-AFC3-D0BF3DBE28DC}"/>
-          </ac:cxnSpMkLst>
-        </pc:cxnChg>
-        <pc:cxnChg chg="add mod">
-          <ac:chgData name="윤성재" userId="76c7d8b9-0ed6-42c3-8827-8b2f94b0779a" providerId="ADAL" clId="{BE45B969-9097-4DAA-9E48-A61D72BE3E25}" dt="2020-09-29T06:23:38.106" v="4919" actId="14100"/>
-          <ac:cxnSpMkLst>
-            <pc:docMk/>
-            <pc:sldMk cId="745412383" sldId="269"/>
-            <ac:cxnSpMk id="92" creationId="{9B5886FC-CA96-40CE-B36B-F91F8B112098}"/>
-          </ac:cxnSpMkLst>
-        </pc:cxnChg>
-        <pc:cxnChg chg="add mod">
-          <ac:chgData name="윤성재" userId="76c7d8b9-0ed6-42c3-8827-8b2f94b0779a" providerId="ADAL" clId="{BE45B969-9097-4DAA-9E48-A61D72BE3E25}" dt="2020-09-29T06:24:42.451" v="5032" actId="14100"/>
-          <ac:cxnSpMkLst>
-            <pc:docMk/>
-            <pc:sldMk cId="745412383" sldId="269"/>
-            <ac:cxnSpMk id="103" creationId="{13559331-3278-4CDC-86CF-B23DC5109A1E}"/>
-          </ac:cxnSpMkLst>
-        </pc:cxnChg>
-        <pc:cxnChg chg="add mod">
-          <ac:chgData name="윤성재" userId="76c7d8b9-0ed6-42c3-8827-8b2f94b0779a" providerId="ADAL" clId="{BE45B969-9097-4DAA-9E48-A61D72BE3E25}" dt="2020-09-29T06:24:46.033" v="5035" actId="14100"/>
-          <ac:cxnSpMkLst>
-            <pc:docMk/>
-            <pc:sldMk cId="745412383" sldId="269"/>
-            <ac:cxnSpMk id="106" creationId="{85E8D100-D41F-437C-A267-209BE5E68629}"/>
-          </ac:cxnSpMkLst>
-        </pc:cxnChg>
-        <pc:cxnChg chg="add mod">
-          <ac:chgData name="윤성재" userId="76c7d8b9-0ed6-42c3-8827-8b2f94b0779a" providerId="ADAL" clId="{BE45B969-9097-4DAA-9E48-A61D72BE3E25}" dt="2020-09-29T06:25:29.643" v="5307" actId="14100"/>
-          <ac:cxnSpMkLst>
-            <pc:docMk/>
-            <pc:sldMk cId="745412383" sldId="269"/>
-            <ac:cxnSpMk id="110" creationId="{D63B8B5A-F514-4D40-8BCC-52D0121D2494}"/>
-          </ac:cxnSpMkLst>
-        </pc:cxnChg>
-        <pc:cxnChg chg="add mod">
-          <ac:chgData name="윤성재" userId="76c7d8b9-0ed6-42c3-8827-8b2f94b0779a" providerId="ADAL" clId="{BE45B969-9097-4DAA-9E48-A61D72BE3E25}" dt="2020-09-29T06:25:52.578" v="5406" actId="14100"/>
-          <ac:cxnSpMkLst>
-            <pc:docMk/>
-            <pc:sldMk cId="745412383" sldId="269"/>
-            <ac:cxnSpMk id="112" creationId="{686D3582-73B8-4C1A-8990-6CC69221549B}"/>
-          </ac:cxnSpMkLst>
-        </pc:cxnChg>
-      </pc:sldChg>
-      <pc:sldChg chg="addSp delSp modSp add del mod">
-        <pc:chgData name="윤성재" userId="76c7d8b9-0ed6-42c3-8827-8b2f94b0779a" providerId="ADAL" clId="{BE45B969-9097-4DAA-9E48-A61D72BE3E25}" dt="2020-09-29T07:18:49.946" v="6092" actId="47"/>
-        <pc:sldMkLst>
-          <pc:docMk/>
-          <pc:sldMk cId="2013118764" sldId="270"/>
-        </pc:sldMkLst>
-        <pc:spChg chg="mod">
-          <ac:chgData name="윤성재" userId="76c7d8b9-0ed6-42c3-8827-8b2f94b0779a" providerId="ADAL" clId="{BE45B969-9097-4DAA-9E48-A61D72BE3E25}" dt="2020-09-29T06:31:46.449" v="6058" actId="20577"/>
-          <ac:spMkLst>
-            <pc:docMk/>
-            <pc:sldMk cId="2013118764" sldId="270"/>
-            <ac:spMk id="2" creationId="{8DC282CA-30F9-4B25-A229-375EC981A70B}"/>
-          </ac:spMkLst>
-        </pc:spChg>
-        <pc:spChg chg="add mod">
-          <ac:chgData name="윤성재" userId="76c7d8b9-0ed6-42c3-8827-8b2f94b0779a" providerId="ADAL" clId="{BE45B969-9097-4DAA-9E48-A61D72BE3E25}" dt="2020-09-29T06:30:26.856" v="6036" actId="6549"/>
-          <ac:spMkLst>
-            <pc:docMk/>
-            <pc:sldMk cId="2013118764" sldId="270"/>
-            <ac:spMk id="3" creationId="{8A5E5F41-3EA6-4EF5-BAD0-72E99AFC4DC3}"/>
-          </ac:spMkLst>
-        </pc:spChg>
-        <pc:spChg chg="mod topLvl">
-          <ac:chgData name="윤성재" userId="76c7d8b9-0ed6-42c3-8827-8b2f94b0779a" providerId="ADAL" clId="{BE45B969-9097-4DAA-9E48-A61D72BE3E25}" dt="2020-09-29T06:29:48.642" v="6021" actId="1038"/>
-          <ac:spMkLst>
-            <pc:docMk/>
-            <pc:sldMk cId="2013118764" sldId="270"/>
-            <ac:spMk id="4" creationId="{546C1C8D-8527-4202-95D5-43B4FEBB3DE7}"/>
-          </ac:spMkLst>
-        </pc:spChg>
-        <pc:spChg chg="add mod">
-          <ac:chgData name="윤성재" userId="76c7d8b9-0ed6-42c3-8827-8b2f94b0779a" providerId="ADAL" clId="{BE45B969-9097-4DAA-9E48-A61D72BE3E25}" dt="2020-09-29T06:32:36.608" v="6065" actId="1076"/>
-          <ac:spMkLst>
-            <pc:docMk/>
-            <pc:sldMk cId="2013118764" sldId="270"/>
-            <ac:spMk id="5" creationId="{DD83B7BB-4F98-4EC0-A907-832F4FE02C68}"/>
-          </ac:spMkLst>
-        </pc:spChg>
-        <pc:spChg chg="mod topLvl">
-          <ac:chgData name="윤성재" userId="76c7d8b9-0ed6-42c3-8827-8b2f94b0779a" providerId="ADAL" clId="{BE45B969-9097-4DAA-9E48-A61D72BE3E25}" dt="2020-09-29T06:29:46.905" v="6018" actId="1076"/>
-          <ac:spMkLst>
-            <pc:docMk/>
-            <pc:sldMk cId="2013118764" sldId="270"/>
-            <ac:spMk id="6" creationId="{1D33AF0D-139F-44AD-B10F-CEBFBD00ACBE}"/>
-          </ac:spMkLst>
-        </pc:spChg>
-        <pc:spChg chg="add mod">
-          <ac:chgData name="윤성재" userId="76c7d8b9-0ed6-42c3-8827-8b2f94b0779a" providerId="ADAL" clId="{BE45B969-9097-4DAA-9E48-A61D72BE3E25}" dt="2020-09-29T06:31:06.953" v="6047" actId="1076"/>
-          <ac:spMkLst>
-            <pc:docMk/>
-            <pc:sldMk cId="2013118764" sldId="270"/>
-            <ac:spMk id="7" creationId="{A177458D-FD83-4EF6-9D80-D09D32566A94}"/>
-          </ac:spMkLst>
-        </pc:spChg>
-        <pc:spChg chg="mod topLvl">
-          <ac:chgData name="윤성재" userId="76c7d8b9-0ed6-42c3-8827-8b2f94b0779a" providerId="ADAL" clId="{BE45B969-9097-4DAA-9E48-A61D72BE3E25}" dt="2020-09-29T06:30:06.489" v="6030" actId="1076"/>
-          <ac:spMkLst>
-            <pc:docMk/>
-            <pc:sldMk cId="2013118764" sldId="270"/>
-            <ac:spMk id="8" creationId="{A7F61406-EFBE-451B-B60A-FD3E9D5703E3}"/>
-          </ac:spMkLst>
-        </pc:spChg>
-        <pc:spChg chg="add mod">
-          <ac:chgData name="윤성재" userId="76c7d8b9-0ed6-42c3-8827-8b2f94b0779a" providerId="ADAL" clId="{BE45B969-9097-4DAA-9E48-A61D72BE3E25}" dt="2020-09-29T06:31:18.528" v="6054" actId="1036"/>
-          <ac:spMkLst>
-            <pc:docMk/>
-            <pc:sldMk cId="2013118764" sldId="270"/>
-            <ac:spMk id="9" creationId="{2EAF84A9-05E6-41F3-BC99-CBDFACD83A09}"/>
-          </ac:spMkLst>
-        </pc:spChg>
-        <pc:spChg chg="mod topLvl">
-          <ac:chgData name="윤성재" userId="76c7d8b9-0ed6-42c3-8827-8b2f94b0779a" providerId="ADAL" clId="{BE45B969-9097-4DAA-9E48-A61D72BE3E25}" dt="2020-09-29T06:30:02.113" v="6029" actId="1076"/>
-          <ac:spMkLst>
-            <pc:docMk/>
-            <pc:sldMk cId="2013118764" sldId="270"/>
-            <ac:spMk id="10" creationId="{81467237-12CC-45C3-B0EC-477A39CADEBD}"/>
-          </ac:spMkLst>
-        </pc:spChg>
-        <pc:spChg chg="mod topLvl">
-          <ac:chgData name="윤성재" userId="76c7d8b9-0ed6-42c3-8827-8b2f94b0779a" providerId="ADAL" clId="{BE45B969-9097-4DAA-9E48-A61D72BE3E25}" dt="2020-09-29T06:29:44.425" v="6017" actId="165"/>
-          <ac:spMkLst>
-            <pc:docMk/>
-            <pc:sldMk cId="2013118764" sldId="270"/>
-            <ac:spMk id="12" creationId="{31F6869D-E20E-43C2-872D-7BF06B327E55}"/>
-          </ac:spMkLst>
-        </pc:spChg>
-        <pc:spChg chg="del">
-          <ac:chgData name="윤성재" userId="76c7d8b9-0ed6-42c3-8827-8b2f94b0779a" providerId="ADAL" clId="{BE45B969-9097-4DAA-9E48-A61D72BE3E25}" dt="2020-09-29T06:29:36.215" v="6013" actId="478"/>
-          <ac:spMkLst>
-            <pc:docMk/>
-            <pc:sldMk cId="2013118764" sldId="270"/>
-            <ac:spMk id="14" creationId="{7D116FF5-88BA-444E-A62D-5180A1091471}"/>
-          </ac:spMkLst>
-        </pc:spChg>
-        <pc:spChg chg="mod topLvl">
-          <ac:chgData name="윤성재" userId="76c7d8b9-0ed6-42c3-8827-8b2f94b0779a" providerId="ADAL" clId="{BE45B969-9097-4DAA-9E48-A61D72BE3E25}" dt="2020-09-29T06:29:44.425" v="6017" actId="165"/>
-          <ac:spMkLst>
-            <pc:docMk/>
-            <pc:sldMk cId="2013118764" sldId="270"/>
-            <ac:spMk id="18" creationId="{6260F2DF-0F2A-4901-BBC1-D461585DFC0F}"/>
-          </ac:spMkLst>
-        </pc:spChg>
-        <pc:spChg chg="del mod topLvl">
-          <ac:chgData name="윤성재" userId="76c7d8b9-0ed6-42c3-8827-8b2f94b0779a" providerId="ADAL" clId="{BE45B969-9097-4DAA-9E48-A61D72BE3E25}" dt="2020-09-29T06:29:51.148" v="6022" actId="478"/>
-          <ac:spMkLst>
-            <pc:docMk/>
-            <pc:sldMk cId="2013118764" sldId="270"/>
-            <ac:spMk id="20" creationId="{9CE5E5F9-4BCB-401B-AA77-2E0E725D0B4D}"/>
-          </ac:spMkLst>
-        </pc:spChg>
-        <pc:spChg chg="del mod topLvl">
-          <ac:chgData name="윤성재" userId="76c7d8b9-0ed6-42c3-8827-8b2f94b0779a" providerId="ADAL" clId="{BE45B969-9097-4DAA-9E48-A61D72BE3E25}" dt="2020-09-29T06:29:52.756" v="6024" actId="478"/>
-          <ac:spMkLst>
-            <pc:docMk/>
-            <pc:sldMk cId="2013118764" sldId="270"/>
-            <ac:spMk id="22" creationId="{A16E8507-F4BD-4861-8CEC-1543FEDC8E37}"/>
-          </ac:spMkLst>
-        </pc:spChg>
-        <pc:spChg chg="del mod topLvl">
-          <ac:chgData name="윤성재" userId="76c7d8b9-0ed6-42c3-8827-8b2f94b0779a" providerId="ADAL" clId="{BE45B969-9097-4DAA-9E48-A61D72BE3E25}" dt="2020-09-29T06:29:55.807" v="6027" actId="478"/>
-          <ac:spMkLst>
-            <pc:docMk/>
-            <pc:sldMk cId="2013118764" sldId="270"/>
-            <ac:spMk id="24" creationId="{E08BE75C-AC27-47E0-B8F6-8AA2E6EF36C1}"/>
-          </ac:spMkLst>
-        </pc:spChg>
-        <pc:spChg chg="mod topLvl">
-          <ac:chgData name="윤성재" userId="76c7d8b9-0ed6-42c3-8827-8b2f94b0779a" providerId="ADAL" clId="{BE45B969-9097-4DAA-9E48-A61D72BE3E25}" dt="2020-09-29T06:29:44.425" v="6017" actId="165"/>
-          <ac:spMkLst>
-            <pc:docMk/>
-            <pc:sldMk cId="2013118764" sldId="270"/>
-            <ac:spMk id="28" creationId="{74523349-E141-4614-A63B-5E5307EA244B}"/>
-          </ac:spMkLst>
-        </pc:spChg>
-        <pc:spChg chg="del mod topLvl">
-          <ac:chgData name="윤성재" userId="76c7d8b9-0ed6-42c3-8827-8b2f94b0779a" providerId="ADAL" clId="{BE45B969-9097-4DAA-9E48-A61D72BE3E25}" dt="2020-09-29T06:29:54.906" v="6026" actId="478"/>
-          <ac:spMkLst>
-            <pc:docMk/>
-            <pc:sldMk cId="2013118764" sldId="270"/>
-            <ac:spMk id="30" creationId="{E1AF28B2-3B6F-4052-ADF9-00CC894413FD}"/>
-          </ac:spMkLst>
-        </pc:spChg>
-        <pc:spChg chg="del mod topLvl">
-          <ac:chgData name="윤성재" userId="76c7d8b9-0ed6-42c3-8827-8b2f94b0779a" providerId="ADAL" clId="{BE45B969-9097-4DAA-9E48-A61D72BE3E25}" dt="2020-09-29T06:29:56.742" v="6028" actId="478"/>
-          <ac:spMkLst>
-            <pc:docMk/>
-            <pc:sldMk cId="2013118764" sldId="270"/>
-            <ac:spMk id="32" creationId="{06F997F2-65A8-44FE-B39D-D960107F3822}"/>
-          </ac:spMkLst>
-        </pc:spChg>
-        <pc:spChg chg="del mod topLvl">
-          <ac:chgData name="윤성재" userId="76c7d8b9-0ed6-42c3-8827-8b2f94b0779a" providerId="ADAL" clId="{BE45B969-9097-4DAA-9E48-A61D72BE3E25}" dt="2020-09-29T06:29:53.912" v="6025" actId="478"/>
-          <ac:spMkLst>
-            <pc:docMk/>
-            <pc:sldMk cId="2013118764" sldId="270"/>
-            <ac:spMk id="34" creationId="{767665A5-A1FD-4D8D-AEF0-991E8D58C946}"/>
-          </ac:spMkLst>
-        </pc:spChg>
-        <pc:spChg chg="mod topLvl">
-          <ac:chgData name="윤성재" userId="76c7d8b9-0ed6-42c3-8827-8b2f94b0779a" providerId="ADAL" clId="{BE45B969-9097-4DAA-9E48-A61D72BE3E25}" dt="2020-09-29T06:29:44.425" v="6017" actId="165"/>
-          <ac:spMkLst>
-            <pc:docMk/>
-            <pc:sldMk cId="2013118764" sldId="270"/>
-            <ac:spMk id="36" creationId="{1E4F70E2-62E4-4A91-81F8-DBC9DD2E7A7F}"/>
-          </ac:spMkLst>
-        </pc:spChg>
-        <pc:spChg chg="mod topLvl">
-          <ac:chgData name="윤성재" userId="76c7d8b9-0ed6-42c3-8827-8b2f94b0779a" providerId="ADAL" clId="{BE45B969-9097-4DAA-9E48-A61D72BE3E25}" dt="2020-09-29T06:29:44.425" v="6017" actId="165"/>
-          <ac:spMkLst>
-            <pc:docMk/>
-            <pc:sldMk cId="2013118764" sldId="270"/>
-            <ac:spMk id="44" creationId="{49DB4571-8F1E-473C-A39A-1341878B46E5}"/>
-          </ac:spMkLst>
-        </pc:spChg>
-        <pc:spChg chg="mod">
-          <ac:chgData name="윤성재" userId="76c7d8b9-0ed6-42c3-8827-8b2f94b0779a" providerId="ADAL" clId="{BE45B969-9097-4DAA-9E48-A61D72BE3E25}" dt="2020-09-29T06:31:59.945" v="6060" actId="14100"/>
-          <ac:spMkLst>
-            <pc:docMk/>
-            <pc:sldMk cId="2013118764" sldId="270"/>
-            <ac:spMk id="51" creationId="{74B0F85C-B08B-4FBE-8563-41DE777D9AA9}"/>
-          </ac:spMkLst>
-        </pc:spChg>
-        <pc:spChg chg="del">
-          <ac:chgData name="윤성재" userId="76c7d8b9-0ed6-42c3-8827-8b2f94b0779a" providerId="ADAL" clId="{BE45B969-9097-4DAA-9E48-A61D72BE3E25}" dt="2020-09-29T06:29:51.895" v="6023" actId="478"/>
-          <ac:spMkLst>
-            <pc:docMk/>
-            <pc:sldMk cId="2013118764" sldId="270"/>
-            <ac:spMk id="54" creationId="{6FA503E1-C355-4BB9-8A8D-C33B023D0877}"/>
-          </ac:spMkLst>
-        </pc:spChg>
-        <pc:grpChg chg="del mod">
-          <ac:chgData name="윤성재" userId="76c7d8b9-0ed6-42c3-8827-8b2f94b0779a" providerId="ADAL" clId="{BE45B969-9097-4DAA-9E48-A61D72BE3E25}" dt="2020-09-29T06:29:44.425" v="6017" actId="165"/>
-          <ac:grpSpMkLst>
-            <pc:docMk/>
-            <pc:sldMk cId="2013118764" sldId="270"/>
-            <ac:grpSpMk id="52" creationId="{CDF757E4-7F13-4D32-8051-C34631A3C07E}"/>
-          </ac:grpSpMkLst>
-        </pc:grpChg>
-        <pc:cxnChg chg="mod">
-          <ac:chgData name="윤성재" userId="76c7d8b9-0ed6-42c3-8827-8b2f94b0779a" providerId="ADAL" clId="{BE45B969-9097-4DAA-9E48-A61D72BE3E25}" dt="2020-09-29T06:32:03.016" v="6061" actId="14100"/>
-          <ac:cxnSpMkLst>
-            <pc:docMk/>
-            <pc:sldMk cId="2013118764" sldId="270"/>
-            <ac:cxnSpMk id="47" creationId="{A8540E20-AFF2-4E40-B10D-050620E662B5}"/>
-          </ac:cxnSpMkLst>
-        </pc:cxnChg>
-      </pc:sldChg>
-      <pc:sldChg chg="addSp delSp modSp add mod">
-        <pc:chgData name="윤성재" userId="76c7d8b9-0ed6-42c3-8827-8b2f94b0779a" providerId="ADAL" clId="{BE45B969-9097-4DAA-9E48-A61D72BE3E25}" dt="2020-09-29T07:25:35.675" v="6128" actId="20577"/>
-        <pc:sldMkLst>
-          <pc:docMk/>
-          <pc:sldMk cId="69464842" sldId="271"/>
-        </pc:sldMkLst>
-        <pc:spChg chg="mod">
-          <ac:chgData name="윤성재" userId="76c7d8b9-0ed6-42c3-8827-8b2f94b0779a" providerId="ADAL" clId="{BE45B969-9097-4DAA-9E48-A61D72BE3E25}" dt="2020-09-29T06:33:18.087" v="6070" actId="20577"/>
-          <ac:spMkLst>
-            <pc:docMk/>
-            <pc:sldMk cId="69464842" sldId="271"/>
-            <ac:spMk id="2" creationId="{8DC282CA-30F9-4B25-A229-375EC981A70B}"/>
-          </ac:spMkLst>
-        </pc:spChg>
-        <pc:spChg chg="add mod">
-          <ac:chgData name="윤성재" userId="76c7d8b9-0ed6-42c3-8827-8b2f94b0779a" providerId="ADAL" clId="{BE45B969-9097-4DAA-9E48-A61D72BE3E25}" dt="2020-09-29T07:19:52.766" v="6120" actId="1076"/>
-          <ac:spMkLst>
-            <pc:docMk/>
-            <pc:sldMk cId="69464842" sldId="271"/>
-            <ac:spMk id="3" creationId="{67706727-F16F-4232-B554-CA8D2DF6C30B}"/>
-          </ac:spMkLst>
-        </pc:spChg>
-        <pc:spChg chg="mod topLvl">
-          <ac:chgData name="윤성재" userId="76c7d8b9-0ed6-42c3-8827-8b2f94b0779a" providerId="ADAL" clId="{BE45B969-9097-4DAA-9E48-A61D72BE3E25}" dt="2020-09-29T06:33:30.610" v="6080" actId="165"/>
-          <ac:spMkLst>
-            <pc:docMk/>
-            <pc:sldMk cId="69464842" sldId="271"/>
-            <ac:spMk id="4" creationId="{546C1C8D-8527-4202-95D5-43B4FEBB3DE7}"/>
-          </ac:spMkLst>
-        </pc:spChg>
-        <pc:spChg chg="add del">
-          <ac:chgData name="윤성재" userId="76c7d8b9-0ed6-42c3-8827-8b2f94b0779a" providerId="ADAL" clId="{BE45B969-9097-4DAA-9E48-A61D72BE3E25}" dt="2020-09-29T07:19:35.977" v="6099" actId="478"/>
-          <ac:spMkLst>
-            <pc:docMk/>
-            <pc:sldMk cId="69464842" sldId="271"/>
-            <ac:spMk id="5" creationId="{2ACBF8FB-6C3A-4CA2-8950-12F2E2DD7341}"/>
-          </ac:spMkLst>
-        </pc:spChg>
-        <pc:spChg chg="mod topLvl">
-          <ac:chgData name="윤성재" userId="76c7d8b9-0ed6-42c3-8827-8b2f94b0779a" providerId="ADAL" clId="{BE45B969-9097-4DAA-9E48-A61D72BE3E25}" dt="2020-09-29T06:33:30.610" v="6080" actId="165"/>
-          <ac:spMkLst>
-            <pc:docMk/>
-            <pc:sldMk cId="69464842" sldId="271"/>
-            <ac:spMk id="6" creationId="{1D33AF0D-139F-44AD-B10F-CEBFBD00ACBE}"/>
-          </ac:spMkLst>
-        </pc:spChg>
-        <pc:spChg chg="add mod">
-          <ac:chgData name="윤성재" userId="76c7d8b9-0ed6-42c3-8827-8b2f94b0779a" providerId="ADAL" clId="{BE45B969-9097-4DAA-9E48-A61D72BE3E25}" dt="2020-09-29T07:19:51.365" v="6119" actId="1076"/>
-          <ac:spMkLst>
-            <pc:docMk/>
-            <pc:sldMk cId="69464842" sldId="271"/>
-            <ac:spMk id="7" creationId="{A8138C32-62DB-41B8-A9EB-F6A476229384}"/>
-          </ac:spMkLst>
-        </pc:spChg>
-        <pc:spChg chg="mod topLvl">
-          <ac:chgData name="윤성재" userId="76c7d8b9-0ed6-42c3-8827-8b2f94b0779a" providerId="ADAL" clId="{BE45B969-9097-4DAA-9E48-A61D72BE3E25}" dt="2020-09-29T06:33:30.610" v="6080" actId="165"/>
-          <ac:spMkLst>
-            <pc:docMk/>
-            <pc:sldMk cId="69464842" sldId="271"/>
-            <ac:spMk id="8" creationId="{A7F61406-EFBE-451B-B60A-FD3E9D5703E3}"/>
-          </ac:spMkLst>
-        </pc:spChg>
-        <pc:spChg chg="mod topLvl">
-          <ac:chgData name="윤성재" userId="76c7d8b9-0ed6-42c3-8827-8b2f94b0779a" providerId="ADAL" clId="{BE45B969-9097-4DAA-9E48-A61D72BE3E25}" dt="2020-09-29T06:33:30.610" v="6080" actId="165"/>
-          <ac:spMkLst>
-            <pc:docMk/>
-            <pc:sldMk cId="69464842" sldId="271"/>
-            <ac:spMk id="10" creationId="{81467237-12CC-45C3-B0EC-477A39CADEBD}"/>
-          </ac:spMkLst>
-        </pc:spChg>
-        <pc:spChg chg="mod topLvl">
-          <ac:chgData name="윤성재" userId="76c7d8b9-0ed6-42c3-8827-8b2f94b0779a" providerId="ADAL" clId="{BE45B969-9097-4DAA-9E48-A61D72BE3E25}" dt="2020-09-29T06:34:38.625" v="6091" actId="14100"/>
-          <ac:spMkLst>
-            <pc:docMk/>
-            <pc:sldMk cId="69464842" sldId="271"/>
-            <ac:spMk id="12" creationId="{31F6869D-E20E-43C2-872D-7BF06B327E55}"/>
-          </ac:spMkLst>
-        </pc:spChg>
-        <pc:spChg chg="del mod topLvl">
-          <ac:chgData name="윤성재" userId="76c7d8b9-0ed6-42c3-8827-8b2f94b0779a" providerId="ADAL" clId="{BE45B969-9097-4DAA-9E48-A61D72BE3E25}" dt="2020-09-29T06:33:31.696" v="6081" actId="478"/>
-          <ac:spMkLst>
-            <pc:docMk/>
-            <pc:sldMk cId="69464842" sldId="271"/>
-            <ac:spMk id="14" creationId="{7D116FF5-88BA-444E-A62D-5180A1091471}"/>
-          </ac:spMkLst>
-        </pc:spChg>
-        <pc:spChg chg="mod topLvl">
-          <ac:chgData name="윤성재" userId="76c7d8b9-0ed6-42c3-8827-8b2f94b0779a" providerId="ADAL" clId="{BE45B969-9097-4DAA-9E48-A61D72BE3E25}" dt="2020-09-29T06:33:30.610" v="6080" actId="165"/>
-          <ac:spMkLst>
-            <pc:docMk/>
-            <pc:sldMk cId="69464842" sldId="271"/>
-            <ac:spMk id="18" creationId="{6260F2DF-0F2A-4901-BBC1-D461585DFC0F}"/>
-          </ac:spMkLst>
-        </pc:spChg>
-        <pc:spChg chg="add del mod topLvl">
-          <ac:chgData name="윤성재" userId="76c7d8b9-0ed6-42c3-8827-8b2f94b0779a" providerId="ADAL" clId="{BE45B969-9097-4DAA-9E48-A61D72BE3E25}" dt="2020-09-29T06:34:04.742" v="6085" actId="478"/>
-          <ac:spMkLst>
-            <pc:docMk/>
-            <pc:sldMk cId="69464842" sldId="271"/>
-            <ac:spMk id="20" creationId="{9CE5E5F9-4BCB-401B-AA77-2E0E725D0B4D}"/>
-          </ac:spMkLst>
-        </pc:spChg>
-        <pc:spChg chg="del mod topLvl">
-          <ac:chgData name="윤성재" userId="76c7d8b9-0ed6-42c3-8827-8b2f94b0779a" providerId="ADAL" clId="{BE45B969-9097-4DAA-9E48-A61D72BE3E25}" dt="2020-09-29T06:34:29.316" v="6086" actId="478"/>
-          <ac:spMkLst>
-            <pc:docMk/>
-            <pc:sldMk cId="69464842" sldId="271"/>
-            <ac:spMk id="22" creationId="{A16E8507-F4BD-4861-8CEC-1543FEDC8E37}"/>
-          </ac:spMkLst>
-        </pc:spChg>
-        <pc:spChg chg="del mod topLvl">
-          <ac:chgData name="윤성재" userId="76c7d8b9-0ed6-42c3-8827-8b2f94b0779a" providerId="ADAL" clId="{BE45B969-9097-4DAA-9E48-A61D72BE3E25}" dt="2020-09-29T06:34:31.930" v="6089" actId="478"/>
-          <ac:spMkLst>
-            <pc:docMk/>
-            <pc:sldMk cId="69464842" sldId="271"/>
-            <ac:spMk id="24" creationId="{E08BE75C-AC27-47E0-B8F6-8AA2E6EF36C1}"/>
-          </ac:spMkLst>
-        </pc:spChg>
-        <pc:spChg chg="mod topLvl">
-          <ac:chgData name="윤성재" userId="76c7d8b9-0ed6-42c3-8827-8b2f94b0779a" providerId="ADAL" clId="{BE45B969-9097-4DAA-9E48-A61D72BE3E25}" dt="2020-09-29T06:33:30.610" v="6080" actId="165"/>
-          <ac:spMkLst>
-            <pc:docMk/>
-            <pc:sldMk cId="69464842" sldId="271"/>
-            <ac:spMk id="28" creationId="{74523349-E141-4614-A63B-5E5307EA244B}"/>
-          </ac:spMkLst>
-        </pc:spChg>
-        <pc:spChg chg="del mod topLvl">
-          <ac:chgData name="윤성재" userId="76c7d8b9-0ed6-42c3-8827-8b2f94b0779a" providerId="ADAL" clId="{BE45B969-9097-4DAA-9E48-A61D72BE3E25}" dt="2020-09-29T06:34:30.907" v="6088" actId="478"/>
-          <ac:spMkLst>
-            <pc:docMk/>
-            <pc:sldMk cId="69464842" sldId="271"/>
-            <ac:spMk id="30" creationId="{E1AF28B2-3B6F-4052-ADF9-00CC894413FD}"/>
-          </ac:spMkLst>
-        </pc:spChg>
-        <pc:spChg chg="del mod topLvl">
-          <ac:chgData name="윤성재" userId="76c7d8b9-0ed6-42c3-8827-8b2f94b0779a" providerId="ADAL" clId="{BE45B969-9097-4DAA-9E48-A61D72BE3E25}" dt="2020-09-29T06:34:33.334" v="6090" actId="478"/>
-          <ac:spMkLst>
-            <pc:docMk/>
-            <pc:sldMk cId="69464842" sldId="271"/>
-            <ac:spMk id="32" creationId="{06F997F2-65A8-44FE-B39D-D960107F3822}"/>
-          </ac:spMkLst>
-        </pc:spChg>
-        <pc:spChg chg="del mod topLvl">
-          <ac:chgData name="윤성재" userId="76c7d8b9-0ed6-42c3-8827-8b2f94b0779a" providerId="ADAL" clId="{BE45B969-9097-4DAA-9E48-A61D72BE3E25}" dt="2020-09-29T06:34:30.080" v="6087" actId="478"/>
-          <ac:spMkLst>
-            <pc:docMk/>
-            <pc:sldMk cId="69464842" sldId="271"/>
-            <ac:spMk id="34" creationId="{767665A5-A1FD-4D8D-AEF0-991E8D58C946}"/>
-          </ac:spMkLst>
-        </pc:spChg>
-        <pc:spChg chg="mod topLvl">
-          <ac:chgData name="윤성재" userId="76c7d8b9-0ed6-42c3-8827-8b2f94b0779a" providerId="ADAL" clId="{BE45B969-9097-4DAA-9E48-A61D72BE3E25}" dt="2020-09-29T06:33:30.610" v="6080" actId="165"/>
-          <ac:spMkLst>
-            <pc:docMk/>
-            <pc:sldMk cId="69464842" sldId="271"/>
-            <ac:spMk id="36" creationId="{1E4F70E2-62E4-4A91-81F8-DBC9DD2E7A7F}"/>
-          </ac:spMkLst>
-        </pc:spChg>
-        <pc:spChg chg="mod topLvl">
-          <ac:chgData name="윤성재" userId="76c7d8b9-0ed6-42c3-8827-8b2f94b0779a" providerId="ADAL" clId="{BE45B969-9097-4DAA-9E48-A61D72BE3E25}" dt="2020-09-29T06:33:30.610" v="6080" actId="165"/>
-          <ac:spMkLst>
-            <pc:docMk/>
-            <pc:sldMk cId="69464842" sldId="271"/>
-            <ac:spMk id="44" creationId="{49DB4571-8F1E-473C-A39A-1341878B46E5}"/>
-          </ac:spMkLst>
-        </pc:spChg>
-        <pc:spChg chg="mod">
-          <ac:chgData name="윤성재" userId="76c7d8b9-0ed6-42c3-8827-8b2f94b0779a" providerId="ADAL" clId="{BE45B969-9097-4DAA-9E48-A61D72BE3E25}" dt="2020-09-29T07:25:35.675" v="6128" actId="20577"/>
-          <ac:spMkLst>
-            <pc:docMk/>
-            <pc:sldMk cId="69464842" sldId="271"/>
-            <ac:spMk id="51" creationId="{74B0F85C-B08B-4FBE-8563-41DE777D9AA9}"/>
-          </ac:spMkLst>
-        </pc:spChg>
-        <pc:grpChg chg="add del mod">
-          <ac:chgData name="윤성재" userId="76c7d8b9-0ed6-42c3-8827-8b2f94b0779a" providerId="ADAL" clId="{BE45B969-9097-4DAA-9E48-A61D72BE3E25}" dt="2020-09-29T06:33:30.610" v="6080" actId="165"/>
-          <ac:grpSpMkLst>
-            <pc:docMk/>
-            <pc:sldMk cId="69464842" sldId="271"/>
-            <ac:grpSpMk id="52" creationId="{CDF757E4-7F13-4D32-8051-C34631A3C07E}"/>
-          </ac:grpSpMkLst>
-        </pc:grpChg>
-      </pc:sldChg>
     </pc:docChg>
   </pc:docChgLst>
   <pc:docChgLst>
@@ -4537,7 +4537,7 @@
           <a:p>
             <a:fld id="{9FDFB0B4-68A7-4621-AE88-76ADBE9E2A01}" type="datetimeFigureOut">
               <a:rPr lang="ko-KR" altLang="en-US" smtClean="0"/>
-              <a:t>2020-10-02</a:t>
+              <a:t>2020-10-03</a:t>
             </a:fld>
             <a:endParaRPr lang="ko-KR" altLang="en-US"/>
           </a:p>
@@ -5035,7 +5035,7 @@
           <a:p>
             <a:fld id="{12076847-FD7E-4126-9BE7-3719C8A975B3}" type="datetimeFigureOut">
               <a:rPr lang="ko-KR" altLang="en-US" smtClean="0"/>
-              <a:t>2020-10-02</a:t>
+              <a:t>2020-10-03</a:t>
             </a:fld>
             <a:endParaRPr lang="ko-KR" altLang="en-US"/>
           </a:p>
@@ -5233,7 +5233,7 @@
           <a:p>
             <a:fld id="{12076847-FD7E-4126-9BE7-3719C8A975B3}" type="datetimeFigureOut">
               <a:rPr lang="ko-KR" altLang="en-US" smtClean="0"/>
-              <a:t>2020-10-02</a:t>
+              <a:t>2020-10-03</a:t>
             </a:fld>
             <a:endParaRPr lang="ko-KR" altLang="en-US"/>
           </a:p>
@@ -5441,7 +5441,7 @@
           <a:p>
             <a:fld id="{12076847-FD7E-4126-9BE7-3719C8A975B3}" type="datetimeFigureOut">
               <a:rPr lang="ko-KR" altLang="en-US" smtClean="0"/>
-              <a:t>2020-10-02</a:t>
+              <a:t>2020-10-03</a:t>
             </a:fld>
             <a:endParaRPr lang="ko-KR" altLang="en-US"/>
           </a:p>
@@ -5695,7 +5695,7 @@
             <a:fld id="{12076847-FD7E-4126-9BE7-3719C8A975B3}" type="datetimeFigureOut">
               <a:rPr lang="ko-KR" altLang="en-US" smtClean="0"/>
               <a:pPr/>
-              <a:t>2020-10-02</a:t>
+              <a:t>2020-10-03</a:t>
             </a:fld>
             <a:endParaRPr lang="ko-KR" altLang="en-US"/>
           </a:p>
@@ -6089,7 +6089,7 @@
           <a:p>
             <a:fld id="{12076847-FD7E-4126-9BE7-3719C8A975B3}" type="datetimeFigureOut">
               <a:rPr lang="ko-KR" altLang="en-US" smtClean="0"/>
-              <a:t>2020-10-02</a:t>
+              <a:t>2020-10-03</a:t>
             </a:fld>
             <a:endParaRPr lang="ko-KR" altLang="en-US"/>
           </a:p>
@@ -6354,7 +6354,7 @@
           <a:p>
             <a:fld id="{12076847-FD7E-4126-9BE7-3719C8A975B3}" type="datetimeFigureOut">
               <a:rPr lang="ko-KR" altLang="en-US" smtClean="0"/>
-              <a:t>2020-10-02</a:t>
+              <a:t>2020-10-03</a:t>
             </a:fld>
             <a:endParaRPr lang="ko-KR" altLang="en-US"/>
           </a:p>
@@ -6766,7 +6766,7 @@
           <a:p>
             <a:fld id="{12076847-FD7E-4126-9BE7-3719C8A975B3}" type="datetimeFigureOut">
               <a:rPr lang="ko-KR" altLang="en-US" smtClean="0"/>
-              <a:t>2020-10-02</a:t>
+              <a:t>2020-10-03</a:t>
             </a:fld>
             <a:endParaRPr lang="ko-KR" altLang="en-US"/>
           </a:p>
@@ -6907,7 +6907,7 @@
           <a:p>
             <a:fld id="{12076847-FD7E-4126-9BE7-3719C8A975B3}" type="datetimeFigureOut">
               <a:rPr lang="ko-KR" altLang="en-US" smtClean="0"/>
-              <a:t>2020-10-02</a:t>
+              <a:t>2020-10-03</a:t>
             </a:fld>
             <a:endParaRPr lang="ko-KR" altLang="en-US"/>
           </a:p>
@@ -7020,7 +7020,7 @@
           <a:p>
             <a:fld id="{12076847-FD7E-4126-9BE7-3719C8A975B3}" type="datetimeFigureOut">
               <a:rPr lang="ko-KR" altLang="en-US" smtClean="0"/>
-              <a:t>2020-10-02</a:t>
+              <a:t>2020-10-03</a:t>
             </a:fld>
             <a:endParaRPr lang="ko-KR" altLang="en-US"/>
           </a:p>
@@ -7331,7 +7331,7 @@
           <a:p>
             <a:fld id="{12076847-FD7E-4126-9BE7-3719C8A975B3}" type="datetimeFigureOut">
               <a:rPr lang="ko-KR" altLang="en-US" smtClean="0"/>
-              <a:t>2020-10-02</a:t>
+              <a:t>2020-10-03</a:t>
             </a:fld>
             <a:endParaRPr lang="ko-KR" altLang="en-US"/>
           </a:p>
@@ -7619,7 +7619,7 @@
           <a:p>
             <a:fld id="{12076847-FD7E-4126-9BE7-3719C8A975B3}" type="datetimeFigureOut">
               <a:rPr lang="ko-KR" altLang="en-US" smtClean="0"/>
-              <a:t>2020-10-02</a:t>
+              <a:t>2020-10-03</a:t>
             </a:fld>
             <a:endParaRPr lang="ko-KR" altLang="en-US"/>
           </a:p>
@@ -7860,7 +7860,7 @@
           <a:p>
             <a:fld id="{12076847-FD7E-4126-9BE7-3719C8A975B3}" type="datetimeFigureOut">
               <a:rPr lang="ko-KR" altLang="en-US" smtClean="0"/>
-              <a:t>2020-10-02</a:t>
+              <a:t>2020-10-03</a:t>
             </a:fld>
             <a:endParaRPr lang="ko-KR" altLang="en-US"/>
           </a:p>
@@ -9624,7 +9624,7 @@
         </p:blipFill>
         <p:spPr bwMode="auto">
           <a:xfrm>
-            <a:off x="6124744" y="2358545"/>
+            <a:off x="6135502" y="2369303"/>
             <a:ext cx="2300312" cy="1226833"/>
           </a:xfrm>
           <a:prstGeom prst="rect">
@@ -9910,250 +9910,6 @@
           </a:p>
         </p:txBody>
       </p:sp>
-      <p:sp>
-        <p:nvSpPr>
-          <p:cNvPr id="7" name="내용 개체 틀 2">
-            <a:extLst>
-              <a:ext uri="{FF2B5EF4-FFF2-40B4-BE49-F238E27FC236}">
-                <a16:creationId xmlns:a16="http://schemas.microsoft.com/office/drawing/2014/main" id="{4641CF7D-3797-41A7-9D88-71A8DA929BE3}"/>
-              </a:ext>
-            </a:extLst>
-          </p:cNvPr>
-          <p:cNvSpPr txBox="1">
-            <a:spLocks/>
-          </p:cNvSpPr>
-          <p:nvPr/>
-        </p:nvSpPr>
-        <p:spPr>
-          <a:xfrm>
-            <a:off x="8717325" y="4137104"/>
-            <a:ext cx="2592581" cy="2647375"/>
-          </a:xfrm>
-          <a:prstGeom prst="rect">
-            <a:avLst/>
-          </a:prstGeom>
-        </p:spPr>
-        <p:txBody>
-          <a:bodyPr vert="horz" lIns="91440" tIns="45720" rIns="91440" bIns="45720" rtlCol="0">
-            <a:normAutofit/>
-          </a:bodyPr>
-          <a:lstStyle>
-            <a:lvl1pPr marL="228600" indent="-228600" algn="l" defTabSz="914400" rtl="0" eaLnBrk="1" latinLnBrk="1" hangingPunct="1">
-              <a:lnSpc>
-                <a:spcPct val="90000"/>
-              </a:lnSpc>
-              <a:spcBef>
-                <a:spcPts val="1000"/>
-              </a:spcBef>
-              <a:buFont typeface="Arial" panose="020B0604020202020204" pitchFamily="34" charset="0"/>
-              <a:buChar char="•"/>
-              <a:defRPr sz="2800" kern="1200">
-                <a:solidFill>
-                  <a:schemeClr val="tx1"/>
-                </a:solidFill>
-                <a:latin typeface="Sandoll 격동굴림" panose="020B0600000101010101" pitchFamily="34" charset="-127"/>
-                <a:ea typeface="Sandoll 격동굴림" panose="020B0600000101010101" pitchFamily="34" charset="-127"/>
-                <a:cs typeface="+mn-cs"/>
-              </a:defRPr>
-            </a:lvl1pPr>
-            <a:lvl2pPr marL="685800" indent="-228600" algn="l" defTabSz="914400" rtl="0" eaLnBrk="1" latinLnBrk="1" hangingPunct="1">
-              <a:lnSpc>
-                <a:spcPct val="90000"/>
-              </a:lnSpc>
-              <a:spcBef>
-                <a:spcPts val="500"/>
-              </a:spcBef>
-              <a:buFont typeface="Arial" panose="020B0604020202020204" pitchFamily="34" charset="0"/>
-              <a:buChar char="•"/>
-              <a:defRPr sz="2400" kern="1200">
-                <a:solidFill>
-                  <a:schemeClr val="tx1"/>
-                </a:solidFill>
-                <a:latin typeface="Sandoll 격동굴림" panose="020B0600000101010101" pitchFamily="34" charset="-127"/>
-                <a:ea typeface="Sandoll 격동굴림" panose="020B0600000101010101" pitchFamily="34" charset="-127"/>
-                <a:cs typeface="+mn-cs"/>
-              </a:defRPr>
-            </a:lvl2pPr>
-            <a:lvl3pPr marL="1143000" indent="-228600" algn="l" defTabSz="914400" rtl="0" eaLnBrk="1" latinLnBrk="1" hangingPunct="1">
-              <a:lnSpc>
-                <a:spcPct val="90000"/>
-              </a:lnSpc>
-              <a:spcBef>
-                <a:spcPts val="500"/>
-              </a:spcBef>
-              <a:buFont typeface="Arial" panose="020B0604020202020204" pitchFamily="34" charset="0"/>
-              <a:buChar char="•"/>
-              <a:defRPr sz="2000" kern="1200">
-                <a:solidFill>
-                  <a:schemeClr val="tx1"/>
-                </a:solidFill>
-                <a:latin typeface="Sandoll 격동굴림" panose="020B0600000101010101" pitchFamily="34" charset="-127"/>
-                <a:ea typeface="Sandoll 격동굴림" panose="020B0600000101010101" pitchFamily="34" charset="-127"/>
-                <a:cs typeface="+mn-cs"/>
-              </a:defRPr>
-            </a:lvl3pPr>
-            <a:lvl4pPr marL="1600200" indent="-228600" algn="l" defTabSz="914400" rtl="0" eaLnBrk="1" latinLnBrk="1" hangingPunct="1">
-              <a:lnSpc>
-                <a:spcPct val="90000"/>
-              </a:lnSpc>
-              <a:spcBef>
-                <a:spcPts val="500"/>
-              </a:spcBef>
-              <a:buFont typeface="Arial" panose="020B0604020202020204" pitchFamily="34" charset="0"/>
-              <a:buChar char="•"/>
-              <a:defRPr sz="1800" kern="1200">
-                <a:solidFill>
-                  <a:schemeClr val="tx1"/>
-                </a:solidFill>
-                <a:latin typeface="Sandoll 격동굴림" panose="020B0600000101010101" pitchFamily="34" charset="-127"/>
-                <a:ea typeface="Sandoll 격동굴림" panose="020B0600000101010101" pitchFamily="34" charset="-127"/>
-                <a:cs typeface="+mn-cs"/>
-              </a:defRPr>
-            </a:lvl4pPr>
-            <a:lvl5pPr marL="2057400" indent="-228600" algn="l" defTabSz="914400" rtl="0" eaLnBrk="1" latinLnBrk="1" hangingPunct="1">
-              <a:lnSpc>
-                <a:spcPct val="90000"/>
-              </a:lnSpc>
-              <a:spcBef>
-                <a:spcPts val="500"/>
-              </a:spcBef>
-              <a:buFont typeface="Arial" panose="020B0604020202020204" pitchFamily="34" charset="0"/>
-              <a:buChar char="•"/>
-              <a:defRPr sz="1800" kern="1200">
-                <a:solidFill>
-                  <a:schemeClr val="tx1"/>
-                </a:solidFill>
-                <a:latin typeface="Sandoll 격동굴림" panose="020B0600000101010101" pitchFamily="34" charset="-127"/>
-                <a:ea typeface="Sandoll 격동굴림" panose="020B0600000101010101" pitchFamily="34" charset="-127"/>
-                <a:cs typeface="+mn-cs"/>
-              </a:defRPr>
-            </a:lvl5pPr>
-            <a:lvl6pPr marL="2514600" indent="-228600" algn="l" defTabSz="914400" rtl="0" eaLnBrk="1" latinLnBrk="1" hangingPunct="1">
-              <a:lnSpc>
-                <a:spcPct val="90000"/>
-              </a:lnSpc>
-              <a:spcBef>
-                <a:spcPts val="500"/>
-              </a:spcBef>
-              <a:buFont typeface="Arial" panose="020B0604020202020204" pitchFamily="34" charset="0"/>
-              <a:buChar char="•"/>
-              <a:defRPr sz="1800" kern="1200">
-                <a:solidFill>
-                  <a:schemeClr val="tx1"/>
-                </a:solidFill>
-                <a:latin typeface="+mn-lt"/>
-                <a:ea typeface="+mn-ea"/>
-                <a:cs typeface="+mn-cs"/>
-              </a:defRPr>
-            </a:lvl6pPr>
-            <a:lvl7pPr marL="2971800" indent="-228600" algn="l" defTabSz="914400" rtl="0" eaLnBrk="1" latinLnBrk="1" hangingPunct="1">
-              <a:lnSpc>
-                <a:spcPct val="90000"/>
-              </a:lnSpc>
-              <a:spcBef>
-                <a:spcPts val="500"/>
-              </a:spcBef>
-              <a:buFont typeface="Arial" panose="020B0604020202020204" pitchFamily="34" charset="0"/>
-              <a:buChar char="•"/>
-              <a:defRPr sz="1800" kern="1200">
-                <a:solidFill>
-                  <a:schemeClr val="tx1"/>
-                </a:solidFill>
-                <a:latin typeface="+mn-lt"/>
-                <a:ea typeface="+mn-ea"/>
-                <a:cs typeface="+mn-cs"/>
-              </a:defRPr>
-            </a:lvl7pPr>
-            <a:lvl8pPr marL="3429000" indent="-228600" algn="l" defTabSz="914400" rtl="0" eaLnBrk="1" latinLnBrk="1" hangingPunct="1">
-              <a:lnSpc>
-                <a:spcPct val="90000"/>
-              </a:lnSpc>
-              <a:spcBef>
-                <a:spcPts val="500"/>
-              </a:spcBef>
-              <a:buFont typeface="Arial" panose="020B0604020202020204" pitchFamily="34" charset="0"/>
-              <a:buChar char="•"/>
-              <a:defRPr sz="1800" kern="1200">
-                <a:solidFill>
-                  <a:schemeClr val="tx1"/>
-                </a:solidFill>
-                <a:latin typeface="+mn-lt"/>
-                <a:ea typeface="+mn-ea"/>
-                <a:cs typeface="+mn-cs"/>
-              </a:defRPr>
-            </a:lvl8pPr>
-            <a:lvl9pPr marL="3886200" indent="-228600" algn="l" defTabSz="914400" rtl="0" eaLnBrk="1" latinLnBrk="1" hangingPunct="1">
-              <a:lnSpc>
-                <a:spcPct val="90000"/>
-              </a:lnSpc>
-              <a:spcBef>
-                <a:spcPts val="500"/>
-              </a:spcBef>
-              <a:buFont typeface="Arial" panose="020B0604020202020204" pitchFamily="34" charset="0"/>
-              <a:buChar char="•"/>
-              <a:defRPr sz="1800" kern="1200">
-                <a:solidFill>
-                  <a:schemeClr val="tx1"/>
-                </a:solidFill>
-                <a:latin typeface="+mn-lt"/>
-                <a:ea typeface="+mn-ea"/>
-                <a:cs typeface="+mn-cs"/>
-              </a:defRPr>
-            </a:lvl9pPr>
-          </a:lstStyle>
-          <a:p>
-            <a:pPr marL="0" indent="0">
-              <a:buFont typeface="Arial" panose="020B0604020202020204" pitchFamily="34" charset="0"/>
-              <a:buNone/>
-            </a:pPr>
-            <a:r>
-              <a:rPr lang="ko-KR" altLang="en-US"/>
-              <a:t>부스터존</a:t>
-            </a:r>
-            <a:endParaRPr lang="en-US" altLang="ko-KR"/>
-          </a:p>
-          <a:p>
-            <a:pPr>
-              <a:buFontTx/>
-              <a:buChar char="-"/>
-            </a:pPr>
-            <a:r>
-              <a:rPr lang="en-US" altLang="ko-KR" sz="1800"/>
-              <a:t>Ground </a:t>
-            </a:r>
-            <a:r>
-              <a:rPr lang="ko-KR" altLang="en-US" sz="1800"/>
-              <a:t>위</a:t>
-            </a:r>
-            <a:br>
-              <a:rPr lang="en-US" altLang="ko-KR" sz="1800"/>
-            </a:br>
-            <a:r>
-              <a:rPr lang="ko-KR" altLang="en-US" sz="1800"/>
-              <a:t>특정 위치에 설치됨</a:t>
-            </a:r>
-            <a:endParaRPr lang="en-US" altLang="ko-KR" sz="1800"/>
-          </a:p>
-          <a:p>
-            <a:pPr>
-              <a:buFontTx/>
-              <a:buChar char="-"/>
-            </a:pPr>
-            <a:r>
-              <a:rPr lang="ko-KR" altLang="en-US" sz="1800"/>
-              <a:t>존을 밟으면 화살표 방향으로 </a:t>
-            </a:r>
-            <a:br>
-              <a:rPr lang="en-US" altLang="ko-KR" sz="1800"/>
-            </a:br>
-            <a:r>
-              <a:rPr lang="ko-KR" altLang="en-US" sz="1800"/>
-              <a:t>순간 가속도를 얻음</a:t>
-            </a:r>
-            <a:endParaRPr lang="en-US" altLang="ko-KR" sz="1800"/>
-          </a:p>
-        </p:txBody>
-      </p:sp>
       <p:pic>
         <p:nvPicPr>
           <p:cNvPr id="1034" name="Picture 10" descr="허들 Hurdle | 기타 | 두피디아 포토커뮤니티">
@@ -10185,51 +9941,6 @@
           <a:xfrm>
             <a:off x="3784211" y="2255597"/>
             <a:ext cx="2138400" cy="1432728"/>
-          </a:xfrm>
-          <a:prstGeom prst="rect">
-            <a:avLst/>
-          </a:prstGeom>
-          <a:noFill/>
-          <a:extLst>
-            <a:ext uri="{909E8E84-426E-40DD-AFC4-6F175D3DCCD1}">
-              <a14:hiddenFill xmlns:a14="http://schemas.microsoft.com/office/drawing/2010/main">
-                <a:solidFill>
-                  <a:srgbClr val="FFFFFF"/>
-                </a:solidFill>
-              </a14:hiddenFill>
-            </a:ext>
-          </a:extLst>
-        </p:spPr>
-      </p:pic>
-      <p:pic>
-        <p:nvPicPr>
-          <p:cNvPr id="1036" name="Picture 12" descr="리뷰] 우주로 날아간 카트라이더">
-            <a:extLst>
-              <a:ext uri="{FF2B5EF4-FFF2-40B4-BE49-F238E27FC236}">
-                <a16:creationId xmlns:a16="http://schemas.microsoft.com/office/drawing/2014/main" id="{17A40339-72A4-44D9-921C-D8505E1C5E5F}"/>
-              </a:ext>
-            </a:extLst>
-          </p:cNvPr>
-          <p:cNvPicPr>
-            <a:picLocks noChangeAspect="1" noChangeArrowheads="1"/>
-          </p:cNvPicPr>
-          <p:nvPr/>
-        </p:nvPicPr>
-        <p:blipFill rotWithShape="1">
-          <a:blip r:embed="rId5">
-            <a:extLst>
-              <a:ext uri="{28A0092B-C50C-407E-A947-70E740481C1C}">
-                <a14:useLocalDpi xmlns:a14="http://schemas.microsoft.com/office/drawing/2010/main" val="0"/>
-              </a:ext>
-            </a:extLst>
-          </a:blip>
-          <a:srcRect r="54069"/>
-          <a:stretch/>
-        </p:blipFill>
-        <p:spPr bwMode="auto">
-          <a:xfrm>
-            <a:off x="8717325" y="2019050"/>
-            <a:ext cx="1749977" cy="2028825"/>
           </a:xfrm>
           <a:prstGeom prst="rect">
             <a:avLst/>
@@ -10406,530 +10117,6 @@
           </a:p>
         </p:txBody>
       </p:sp>
-      <p:sp>
-        <p:nvSpPr>
-          <p:cNvPr id="8" name="내용 개체 틀 2">
-            <a:extLst>
-              <a:ext uri="{FF2B5EF4-FFF2-40B4-BE49-F238E27FC236}">
-                <a16:creationId xmlns:a16="http://schemas.microsoft.com/office/drawing/2014/main" id="{0560394E-584D-414A-944C-9C010700D280}"/>
-              </a:ext>
-            </a:extLst>
-          </p:cNvPr>
-          <p:cNvSpPr txBox="1">
-            <a:spLocks/>
-          </p:cNvSpPr>
-          <p:nvPr/>
-        </p:nvSpPr>
-        <p:spPr>
-          <a:xfrm>
-            <a:off x="3645782" y="3986510"/>
-            <a:ext cx="2592581" cy="2653764"/>
-          </a:xfrm>
-          <a:prstGeom prst="rect">
-            <a:avLst/>
-          </a:prstGeom>
-        </p:spPr>
-        <p:txBody>
-          <a:bodyPr vert="horz" lIns="91440" tIns="45720" rIns="91440" bIns="45720" rtlCol="0">
-            <a:normAutofit/>
-          </a:bodyPr>
-          <a:lstStyle>
-            <a:lvl1pPr marL="228600" indent="-228600" algn="l" defTabSz="914400" rtl="0" eaLnBrk="1" latinLnBrk="1" hangingPunct="1">
-              <a:lnSpc>
-                <a:spcPct val="90000"/>
-              </a:lnSpc>
-              <a:spcBef>
-                <a:spcPts val="1000"/>
-              </a:spcBef>
-              <a:buFont typeface="Arial" panose="020B0604020202020204" pitchFamily="34" charset="0"/>
-              <a:buChar char="•"/>
-              <a:defRPr sz="2800" kern="1200">
-                <a:solidFill>
-                  <a:schemeClr val="tx1"/>
-                </a:solidFill>
-                <a:latin typeface="Sandoll 격동굴림" panose="020B0600000101010101" pitchFamily="34" charset="-127"/>
-                <a:ea typeface="Sandoll 격동굴림" panose="020B0600000101010101" pitchFamily="34" charset="-127"/>
-                <a:cs typeface="+mn-cs"/>
-              </a:defRPr>
-            </a:lvl1pPr>
-            <a:lvl2pPr marL="685800" indent="-228600" algn="l" defTabSz="914400" rtl="0" eaLnBrk="1" latinLnBrk="1" hangingPunct="1">
-              <a:lnSpc>
-                <a:spcPct val="90000"/>
-              </a:lnSpc>
-              <a:spcBef>
-                <a:spcPts val="500"/>
-              </a:spcBef>
-              <a:buFont typeface="Arial" panose="020B0604020202020204" pitchFamily="34" charset="0"/>
-              <a:buChar char="•"/>
-              <a:defRPr sz="2400" kern="1200">
-                <a:solidFill>
-                  <a:schemeClr val="tx1"/>
-                </a:solidFill>
-                <a:latin typeface="Sandoll 격동굴림" panose="020B0600000101010101" pitchFamily="34" charset="-127"/>
-                <a:ea typeface="Sandoll 격동굴림" panose="020B0600000101010101" pitchFamily="34" charset="-127"/>
-                <a:cs typeface="+mn-cs"/>
-              </a:defRPr>
-            </a:lvl2pPr>
-            <a:lvl3pPr marL="1143000" indent="-228600" algn="l" defTabSz="914400" rtl="0" eaLnBrk="1" latinLnBrk="1" hangingPunct="1">
-              <a:lnSpc>
-                <a:spcPct val="90000"/>
-              </a:lnSpc>
-              <a:spcBef>
-                <a:spcPts val="500"/>
-              </a:spcBef>
-              <a:buFont typeface="Arial" panose="020B0604020202020204" pitchFamily="34" charset="0"/>
-              <a:buChar char="•"/>
-              <a:defRPr sz="2000" kern="1200">
-                <a:solidFill>
-                  <a:schemeClr val="tx1"/>
-                </a:solidFill>
-                <a:latin typeface="Sandoll 격동굴림" panose="020B0600000101010101" pitchFamily="34" charset="-127"/>
-                <a:ea typeface="Sandoll 격동굴림" panose="020B0600000101010101" pitchFamily="34" charset="-127"/>
-                <a:cs typeface="+mn-cs"/>
-              </a:defRPr>
-            </a:lvl3pPr>
-            <a:lvl4pPr marL="1600200" indent="-228600" algn="l" defTabSz="914400" rtl="0" eaLnBrk="1" latinLnBrk="1" hangingPunct="1">
-              <a:lnSpc>
-                <a:spcPct val="90000"/>
-              </a:lnSpc>
-              <a:spcBef>
-                <a:spcPts val="500"/>
-              </a:spcBef>
-              <a:buFont typeface="Arial" panose="020B0604020202020204" pitchFamily="34" charset="0"/>
-              <a:buChar char="•"/>
-              <a:defRPr sz="1800" kern="1200">
-                <a:solidFill>
-                  <a:schemeClr val="tx1"/>
-                </a:solidFill>
-                <a:latin typeface="Sandoll 격동굴림" panose="020B0600000101010101" pitchFamily="34" charset="-127"/>
-                <a:ea typeface="Sandoll 격동굴림" panose="020B0600000101010101" pitchFamily="34" charset="-127"/>
-                <a:cs typeface="+mn-cs"/>
-              </a:defRPr>
-            </a:lvl4pPr>
-            <a:lvl5pPr marL="2057400" indent="-228600" algn="l" defTabSz="914400" rtl="0" eaLnBrk="1" latinLnBrk="1" hangingPunct="1">
-              <a:lnSpc>
-                <a:spcPct val="90000"/>
-              </a:lnSpc>
-              <a:spcBef>
-                <a:spcPts val="500"/>
-              </a:spcBef>
-              <a:buFont typeface="Arial" panose="020B0604020202020204" pitchFamily="34" charset="0"/>
-              <a:buChar char="•"/>
-              <a:defRPr sz="1800" kern="1200">
-                <a:solidFill>
-                  <a:schemeClr val="tx1"/>
-                </a:solidFill>
-                <a:latin typeface="Sandoll 격동굴림" panose="020B0600000101010101" pitchFamily="34" charset="-127"/>
-                <a:ea typeface="Sandoll 격동굴림" panose="020B0600000101010101" pitchFamily="34" charset="-127"/>
-                <a:cs typeface="+mn-cs"/>
-              </a:defRPr>
-            </a:lvl5pPr>
-            <a:lvl6pPr marL="2514600" indent="-228600" algn="l" defTabSz="914400" rtl="0" eaLnBrk="1" latinLnBrk="1" hangingPunct="1">
-              <a:lnSpc>
-                <a:spcPct val="90000"/>
-              </a:lnSpc>
-              <a:spcBef>
-                <a:spcPts val="500"/>
-              </a:spcBef>
-              <a:buFont typeface="Arial" panose="020B0604020202020204" pitchFamily="34" charset="0"/>
-              <a:buChar char="•"/>
-              <a:defRPr sz="1800" kern="1200">
-                <a:solidFill>
-                  <a:schemeClr val="tx1"/>
-                </a:solidFill>
-                <a:latin typeface="+mn-lt"/>
-                <a:ea typeface="+mn-ea"/>
-                <a:cs typeface="+mn-cs"/>
-              </a:defRPr>
-            </a:lvl6pPr>
-            <a:lvl7pPr marL="2971800" indent="-228600" algn="l" defTabSz="914400" rtl="0" eaLnBrk="1" latinLnBrk="1" hangingPunct="1">
-              <a:lnSpc>
-                <a:spcPct val="90000"/>
-              </a:lnSpc>
-              <a:spcBef>
-                <a:spcPts val="500"/>
-              </a:spcBef>
-              <a:buFont typeface="Arial" panose="020B0604020202020204" pitchFamily="34" charset="0"/>
-              <a:buChar char="•"/>
-              <a:defRPr sz="1800" kern="1200">
-                <a:solidFill>
-                  <a:schemeClr val="tx1"/>
-                </a:solidFill>
-                <a:latin typeface="+mn-lt"/>
-                <a:ea typeface="+mn-ea"/>
-                <a:cs typeface="+mn-cs"/>
-              </a:defRPr>
-            </a:lvl7pPr>
-            <a:lvl8pPr marL="3429000" indent="-228600" algn="l" defTabSz="914400" rtl="0" eaLnBrk="1" latinLnBrk="1" hangingPunct="1">
-              <a:lnSpc>
-                <a:spcPct val="90000"/>
-              </a:lnSpc>
-              <a:spcBef>
-                <a:spcPts val="500"/>
-              </a:spcBef>
-              <a:buFont typeface="Arial" panose="020B0604020202020204" pitchFamily="34" charset="0"/>
-              <a:buChar char="•"/>
-              <a:defRPr sz="1800" kern="1200">
-                <a:solidFill>
-                  <a:schemeClr val="tx1"/>
-                </a:solidFill>
-                <a:latin typeface="+mn-lt"/>
-                <a:ea typeface="+mn-ea"/>
-                <a:cs typeface="+mn-cs"/>
-              </a:defRPr>
-            </a:lvl8pPr>
-            <a:lvl9pPr marL="3886200" indent="-228600" algn="l" defTabSz="914400" rtl="0" eaLnBrk="1" latinLnBrk="1" hangingPunct="1">
-              <a:lnSpc>
-                <a:spcPct val="90000"/>
-              </a:lnSpc>
-              <a:spcBef>
-                <a:spcPts val="500"/>
-              </a:spcBef>
-              <a:buFont typeface="Arial" panose="020B0604020202020204" pitchFamily="34" charset="0"/>
-              <a:buChar char="•"/>
-              <a:defRPr sz="1800" kern="1200">
-                <a:solidFill>
-                  <a:schemeClr val="tx1"/>
-                </a:solidFill>
-                <a:latin typeface="+mn-lt"/>
-                <a:ea typeface="+mn-ea"/>
-                <a:cs typeface="+mn-cs"/>
-              </a:defRPr>
-            </a:lvl9pPr>
-          </a:lstStyle>
-          <a:p>
-            <a:pPr marL="0" indent="0">
-              <a:buFont typeface="Arial" panose="020B0604020202020204" pitchFamily="34" charset="0"/>
-              <a:buNone/>
-            </a:pPr>
-            <a:r>
-              <a:rPr lang="ko-KR" altLang="en-US"/>
-              <a:t>진자운동 공</a:t>
-            </a:r>
-            <a:endParaRPr lang="en-US" altLang="ko-KR"/>
-          </a:p>
-          <a:p>
-            <a:pPr>
-              <a:buFontTx/>
-              <a:buChar char="-"/>
-            </a:pPr>
-            <a:r>
-              <a:rPr lang="en-US" altLang="ko-KR" sz="1800"/>
-              <a:t>Ground </a:t>
-            </a:r>
-            <a:r>
-              <a:rPr lang="ko-KR" altLang="en-US" sz="1800"/>
-              <a:t>위 </a:t>
-            </a:r>
-            <a:br>
-              <a:rPr lang="en-US" altLang="ko-KR" sz="1800"/>
-            </a:br>
-            <a:r>
-              <a:rPr lang="ko-KR" altLang="en-US" sz="1800"/>
-              <a:t>특정 위치에 설치됨</a:t>
-            </a:r>
-            <a:endParaRPr lang="en-US" altLang="ko-KR" sz="1800"/>
-          </a:p>
-          <a:p>
-            <a:pPr>
-              <a:buFontTx/>
-              <a:buChar char="-"/>
-            </a:pPr>
-            <a:r>
-              <a:rPr lang="ko-KR" altLang="en-US" sz="1800"/>
-              <a:t>일정 속도로 왔다갔다 하며 이동을 방해</a:t>
-            </a:r>
-            <a:endParaRPr lang="en-US" altLang="ko-KR" sz="1800"/>
-          </a:p>
-          <a:p>
-            <a:pPr>
-              <a:buFontTx/>
-              <a:buChar char="-"/>
-            </a:pPr>
-            <a:r>
-              <a:rPr lang="ko-KR" altLang="en-US" sz="1800"/>
-              <a:t>지나갈 때 타이밍에 맞춰 피해 가야함</a:t>
-            </a:r>
-            <a:endParaRPr lang="en-US" altLang="ko-KR" sz="1800"/>
-          </a:p>
-          <a:p>
-            <a:pPr>
-              <a:buFontTx/>
-              <a:buChar char="-"/>
-            </a:pPr>
-            <a:endParaRPr lang="en-US" altLang="ko-KR" sz="1800"/>
-          </a:p>
-        </p:txBody>
-      </p:sp>
-      <p:sp>
-        <p:nvSpPr>
-          <p:cNvPr id="7" name="내용 개체 틀 2">
-            <a:extLst>
-              <a:ext uri="{FF2B5EF4-FFF2-40B4-BE49-F238E27FC236}">
-                <a16:creationId xmlns:a16="http://schemas.microsoft.com/office/drawing/2014/main" id="{4641CF7D-3797-41A7-9D88-71A8DA929BE3}"/>
-              </a:ext>
-            </a:extLst>
-          </p:cNvPr>
-          <p:cNvSpPr txBox="1">
-            <a:spLocks/>
-          </p:cNvSpPr>
-          <p:nvPr/>
-        </p:nvSpPr>
-        <p:spPr>
-          <a:xfrm>
-            <a:off x="8672937" y="3999287"/>
-            <a:ext cx="2592581" cy="2647375"/>
-          </a:xfrm>
-          <a:prstGeom prst="rect">
-            <a:avLst/>
-          </a:prstGeom>
-        </p:spPr>
-        <p:txBody>
-          <a:bodyPr vert="horz" lIns="91440" tIns="45720" rIns="91440" bIns="45720" rtlCol="0">
-            <a:normAutofit fontScale="92500"/>
-          </a:bodyPr>
-          <a:lstStyle>
-            <a:lvl1pPr marL="228600" indent="-228600" algn="l" defTabSz="914400" rtl="0" eaLnBrk="1" latinLnBrk="1" hangingPunct="1">
-              <a:lnSpc>
-                <a:spcPct val="90000"/>
-              </a:lnSpc>
-              <a:spcBef>
-                <a:spcPts val="1000"/>
-              </a:spcBef>
-              <a:buFont typeface="Arial" panose="020B0604020202020204" pitchFamily="34" charset="0"/>
-              <a:buChar char="•"/>
-              <a:defRPr sz="2800" kern="1200">
-                <a:solidFill>
-                  <a:schemeClr val="tx1"/>
-                </a:solidFill>
-                <a:latin typeface="Sandoll 격동굴림" panose="020B0600000101010101" pitchFamily="34" charset="-127"/>
-                <a:ea typeface="Sandoll 격동굴림" panose="020B0600000101010101" pitchFamily="34" charset="-127"/>
-                <a:cs typeface="+mn-cs"/>
-              </a:defRPr>
-            </a:lvl1pPr>
-            <a:lvl2pPr marL="685800" indent="-228600" algn="l" defTabSz="914400" rtl="0" eaLnBrk="1" latinLnBrk="1" hangingPunct="1">
-              <a:lnSpc>
-                <a:spcPct val="90000"/>
-              </a:lnSpc>
-              <a:spcBef>
-                <a:spcPts val="500"/>
-              </a:spcBef>
-              <a:buFont typeface="Arial" panose="020B0604020202020204" pitchFamily="34" charset="0"/>
-              <a:buChar char="•"/>
-              <a:defRPr sz="2400" kern="1200">
-                <a:solidFill>
-                  <a:schemeClr val="tx1"/>
-                </a:solidFill>
-                <a:latin typeface="Sandoll 격동굴림" panose="020B0600000101010101" pitchFamily="34" charset="-127"/>
-                <a:ea typeface="Sandoll 격동굴림" panose="020B0600000101010101" pitchFamily="34" charset="-127"/>
-                <a:cs typeface="+mn-cs"/>
-              </a:defRPr>
-            </a:lvl2pPr>
-            <a:lvl3pPr marL="1143000" indent="-228600" algn="l" defTabSz="914400" rtl="0" eaLnBrk="1" latinLnBrk="1" hangingPunct="1">
-              <a:lnSpc>
-                <a:spcPct val="90000"/>
-              </a:lnSpc>
-              <a:spcBef>
-                <a:spcPts val="500"/>
-              </a:spcBef>
-              <a:buFont typeface="Arial" panose="020B0604020202020204" pitchFamily="34" charset="0"/>
-              <a:buChar char="•"/>
-              <a:defRPr sz="2000" kern="1200">
-                <a:solidFill>
-                  <a:schemeClr val="tx1"/>
-                </a:solidFill>
-                <a:latin typeface="Sandoll 격동굴림" panose="020B0600000101010101" pitchFamily="34" charset="-127"/>
-                <a:ea typeface="Sandoll 격동굴림" panose="020B0600000101010101" pitchFamily="34" charset="-127"/>
-                <a:cs typeface="+mn-cs"/>
-              </a:defRPr>
-            </a:lvl3pPr>
-            <a:lvl4pPr marL="1600200" indent="-228600" algn="l" defTabSz="914400" rtl="0" eaLnBrk="1" latinLnBrk="1" hangingPunct="1">
-              <a:lnSpc>
-                <a:spcPct val="90000"/>
-              </a:lnSpc>
-              <a:spcBef>
-                <a:spcPts val="500"/>
-              </a:spcBef>
-              <a:buFont typeface="Arial" panose="020B0604020202020204" pitchFamily="34" charset="0"/>
-              <a:buChar char="•"/>
-              <a:defRPr sz="1800" kern="1200">
-                <a:solidFill>
-                  <a:schemeClr val="tx1"/>
-                </a:solidFill>
-                <a:latin typeface="Sandoll 격동굴림" panose="020B0600000101010101" pitchFamily="34" charset="-127"/>
-                <a:ea typeface="Sandoll 격동굴림" panose="020B0600000101010101" pitchFamily="34" charset="-127"/>
-                <a:cs typeface="+mn-cs"/>
-              </a:defRPr>
-            </a:lvl4pPr>
-            <a:lvl5pPr marL="2057400" indent="-228600" algn="l" defTabSz="914400" rtl="0" eaLnBrk="1" latinLnBrk="1" hangingPunct="1">
-              <a:lnSpc>
-                <a:spcPct val="90000"/>
-              </a:lnSpc>
-              <a:spcBef>
-                <a:spcPts val="500"/>
-              </a:spcBef>
-              <a:buFont typeface="Arial" panose="020B0604020202020204" pitchFamily="34" charset="0"/>
-              <a:buChar char="•"/>
-              <a:defRPr sz="1800" kern="1200">
-                <a:solidFill>
-                  <a:schemeClr val="tx1"/>
-                </a:solidFill>
-                <a:latin typeface="Sandoll 격동굴림" panose="020B0600000101010101" pitchFamily="34" charset="-127"/>
-                <a:ea typeface="Sandoll 격동굴림" panose="020B0600000101010101" pitchFamily="34" charset="-127"/>
-                <a:cs typeface="+mn-cs"/>
-              </a:defRPr>
-            </a:lvl5pPr>
-            <a:lvl6pPr marL="2514600" indent="-228600" algn="l" defTabSz="914400" rtl="0" eaLnBrk="1" latinLnBrk="1" hangingPunct="1">
-              <a:lnSpc>
-                <a:spcPct val="90000"/>
-              </a:lnSpc>
-              <a:spcBef>
-                <a:spcPts val="500"/>
-              </a:spcBef>
-              <a:buFont typeface="Arial" panose="020B0604020202020204" pitchFamily="34" charset="0"/>
-              <a:buChar char="•"/>
-              <a:defRPr sz="1800" kern="1200">
-                <a:solidFill>
-                  <a:schemeClr val="tx1"/>
-                </a:solidFill>
-                <a:latin typeface="+mn-lt"/>
-                <a:ea typeface="+mn-ea"/>
-                <a:cs typeface="+mn-cs"/>
-              </a:defRPr>
-            </a:lvl6pPr>
-            <a:lvl7pPr marL="2971800" indent="-228600" algn="l" defTabSz="914400" rtl="0" eaLnBrk="1" latinLnBrk="1" hangingPunct="1">
-              <a:lnSpc>
-                <a:spcPct val="90000"/>
-              </a:lnSpc>
-              <a:spcBef>
-                <a:spcPts val="500"/>
-              </a:spcBef>
-              <a:buFont typeface="Arial" panose="020B0604020202020204" pitchFamily="34" charset="0"/>
-              <a:buChar char="•"/>
-              <a:defRPr sz="1800" kern="1200">
-                <a:solidFill>
-                  <a:schemeClr val="tx1"/>
-                </a:solidFill>
-                <a:latin typeface="+mn-lt"/>
-                <a:ea typeface="+mn-ea"/>
-                <a:cs typeface="+mn-cs"/>
-              </a:defRPr>
-            </a:lvl7pPr>
-            <a:lvl8pPr marL="3429000" indent="-228600" algn="l" defTabSz="914400" rtl="0" eaLnBrk="1" latinLnBrk="1" hangingPunct="1">
-              <a:lnSpc>
-                <a:spcPct val="90000"/>
-              </a:lnSpc>
-              <a:spcBef>
-                <a:spcPts val="500"/>
-              </a:spcBef>
-              <a:buFont typeface="Arial" panose="020B0604020202020204" pitchFamily="34" charset="0"/>
-              <a:buChar char="•"/>
-              <a:defRPr sz="1800" kern="1200">
-                <a:solidFill>
-                  <a:schemeClr val="tx1"/>
-                </a:solidFill>
-                <a:latin typeface="+mn-lt"/>
-                <a:ea typeface="+mn-ea"/>
-                <a:cs typeface="+mn-cs"/>
-              </a:defRPr>
-            </a:lvl8pPr>
-            <a:lvl9pPr marL="3886200" indent="-228600" algn="l" defTabSz="914400" rtl="0" eaLnBrk="1" latinLnBrk="1" hangingPunct="1">
-              <a:lnSpc>
-                <a:spcPct val="90000"/>
-              </a:lnSpc>
-              <a:spcBef>
-                <a:spcPts val="500"/>
-              </a:spcBef>
-              <a:buFont typeface="Arial" panose="020B0604020202020204" pitchFamily="34" charset="0"/>
-              <a:buChar char="•"/>
-              <a:defRPr sz="1800" kern="1200">
-                <a:solidFill>
-                  <a:schemeClr val="tx1"/>
-                </a:solidFill>
-                <a:latin typeface="+mn-lt"/>
-                <a:ea typeface="+mn-ea"/>
-                <a:cs typeface="+mn-cs"/>
-              </a:defRPr>
-            </a:lvl9pPr>
-          </a:lstStyle>
-          <a:p>
-            <a:pPr marL="0" indent="0">
-              <a:buFont typeface="Arial" panose="020B0604020202020204" pitchFamily="34" charset="0"/>
-              <a:buNone/>
-            </a:pPr>
-            <a:r>
-              <a:rPr lang="ko-KR" altLang="en-US"/>
-              <a:t>풍차</a:t>
-            </a:r>
-            <a:endParaRPr lang="en-US" altLang="ko-KR"/>
-          </a:p>
-          <a:p>
-            <a:pPr>
-              <a:buFontTx/>
-              <a:buChar char="-"/>
-            </a:pPr>
-            <a:r>
-              <a:rPr lang="en-US" altLang="ko-KR" sz="1800"/>
-              <a:t>Ground </a:t>
-            </a:r>
-            <a:r>
-              <a:rPr lang="ko-KR" altLang="en-US" sz="1800"/>
-              <a:t>위</a:t>
-            </a:r>
-            <a:br>
-              <a:rPr lang="en-US" altLang="ko-KR" sz="1800"/>
-            </a:br>
-            <a:r>
-              <a:rPr lang="ko-KR" altLang="en-US" sz="1800"/>
-              <a:t>특정 위치에 설치됨</a:t>
-            </a:r>
-            <a:endParaRPr lang="en-US" altLang="ko-KR" sz="1800"/>
-          </a:p>
-          <a:p>
-            <a:pPr>
-              <a:buFontTx/>
-              <a:buChar char="-"/>
-            </a:pPr>
-            <a:r>
-              <a:rPr lang="ko-KR" altLang="en-US" sz="1800"/>
-              <a:t>풍차가 바라보는 </a:t>
-            </a:r>
-            <a:br>
-              <a:rPr lang="en-US" altLang="ko-KR" sz="1800"/>
-            </a:br>
-            <a:r>
-              <a:rPr lang="ko-KR" altLang="en-US" sz="1800"/>
-              <a:t>방향으로 바람을 일으켜 바람이 공과 </a:t>
-            </a:r>
-            <a:br>
-              <a:rPr lang="en-US" altLang="ko-KR" sz="1800"/>
-            </a:br>
-            <a:r>
-              <a:rPr lang="ko-KR" altLang="en-US" sz="1800"/>
-              <a:t>닿으면 바람 방향으로 가속을 준다</a:t>
-            </a:r>
-            <a:r>
-              <a:rPr lang="en-US" altLang="ko-KR" sz="1800"/>
-              <a:t>. </a:t>
-            </a:r>
-            <a:br>
-              <a:rPr lang="en-US" altLang="ko-KR" sz="1800"/>
-            </a:br>
-            <a:r>
-              <a:rPr lang="en-US" altLang="ko-KR" sz="1800"/>
-              <a:t>(</a:t>
-            </a:r>
-            <a:r>
-              <a:rPr lang="ko-KR" altLang="en-US" sz="1800"/>
-              <a:t>주로 이동경로와 반대</a:t>
-            </a:r>
-            <a:r>
-              <a:rPr lang="en-US" altLang="ko-KR" sz="1800"/>
-              <a:t>)</a:t>
-            </a:r>
-          </a:p>
-        </p:txBody>
-      </p:sp>
       <p:pic>
         <p:nvPicPr>
           <p:cNvPr id="3" name="그림 2">
@@ -10954,36 +10141,6 @@
           <a:xfrm>
             <a:off x="1053201" y="1988599"/>
             <a:ext cx="2362933" cy="1615134"/>
-          </a:xfrm>
-          <a:prstGeom prst="rect">
-            <a:avLst/>
-          </a:prstGeom>
-        </p:spPr>
-      </p:pic>
-      <p:pic>
-        <p:nvPicPr>
-          <p:cNvPr id="5" name="그림 4">
-            <a:extLst>
-              <a:ext uri="{FF2B5EF4-FFF2-40B4-BE49-F238E27FC236}">
-                <a16:creationId xmlns:a16="http://schemas.microsoft.com/office/drawing/2014/main" id="{29AD7838-A640-4A55-820A-37B415F2D5F3}"/>
-              </a:ext>
-            </a:extLst>
-          </p:cNvPr>
-          <p:cNvPicPr>
-            <a:picLocks noChangeAspect="1"/>
-          </p:cNvPicPr>
-          <p:nvPr/>
-        </p:nvPicPr>
-        <p:blipFill>
-          <a:blip r:embed="rId3"/>
-          <a:stretch>
-            <a:fillRect/>
-          </a:stretch>
-        </p:blipFill>
-        <p:spPr>
-          <a:xfrm>
-            <a:off x="3645782" y="1879963"/>
-            <a:ext cx="1921006" cy="1832406"/>
           </a:xfrm>
           <a:prstGeom prst="rect">
             <a:avLst/>
@@ -11250,10 +10407,10 @@
       </p:sp>
       <p:pic>
         <p:nvPicPr>
-          <p:cNvPr id="12" name="Picture 6" descr="풍차 무료 아이콘 의 Selman Icons">
+          <p:cNvPr id="14" name="Picture 12" descr="리뷰] 우주로 날아간 카트라이더">
             <a:extLst>
               <a:ext uri="{FF2B5EF4-FFF2-40B4-BE49-F238E27FC236}">
-                <a16:creationId xmlns:a16="http://schemas.microsoft.com/office/drawing/2014/main" id="{F7592659-4A0C-45D4-8862-45B91D231C52}"/>
+                <a16:creationId xmlns:a16="http://schemas.microsoft.com/office/drawing/2014/main" id="{41B0ABB3-69A0-4B66-9348-1A2FF0BC50CA}"/>
               </a:ext>
             </a:extLst>
           </p:cNvPr>
@@ -11262,23 +10419,21 @@
           </p:cNvPicPr>
           <p:nvPr/>
         </p:nvPicPr>
-        <p:blipFill>
-          <a:blip r:embed="rId4">
+        <p:blipFill rotWithShape="1">
+          <a:blip r:embed="rId3">
             <a:extLst>
               <a:ext uri="{28A0092B-C50C-407E-A947-70E740481C1C}">
                 <a14:useLocalDpi xmlns:a14="http://schemas.microsoft.com/office/drawing/2010/main" val="0"/>
               </a:ext>
             </a:extLst>
           </a:blip>
-          <a:srcRect/>
-          <a:stretch>
-            <a:fillRect/>
-          </a:stretch>
+          <a:srcRect l="47110" t="132" r="6959" b="-132"/>
+          <a:stretch/>
         </p:blipFill>
         <p:spPr bwMode="auto">
           <a:xfrm>
-            <a:off x="8652542" y="1799423"/>
-            <a:ext cx="2143125" cy="2143125"/>
+            <a:off x="6238363" y="1879058"/>
+            <a:ext cx="1749977" cy="2028825"/>
           </a:xfrm>
           <a:prstGeom prst="rect">
             <a:avLst/>
@@ -11295,12 +10450,256 @@
           </a:extLst>
         </p:spPr>
       </p:pic>
+      <p:sp>
+        <p:nvSpPr>
+          <p:cNvPr id="4" name="내용 개체 틀 2">
+            <a:extLst>
+              <a:ext uri="{FF2B5EF4-FFF2-40B4-BE49-F238E27FC236}">
+                <a16:creationId xmlns:a16="http://schemas.microsoft.com/office/drawing/2014/main" id="{02875EB2-9683-4758-8A61-16026BBA6BBB}"/>
+              </a:ext>
+            </a:extLst>
+          </p:cNvPr>
+          <p:cNvSpPr txBox="1">
+            <a:spLocks/>
+          </p:cNvSpPr>
+          <p:nvPr/>
+        </p:nvSpPr>
+        <p:spPr>
+          <a:xfrm>
+            <a:off x="8717325" y="4137104"/>
+            <a:ext cx="2592581" cy="2647375"/>
+          </a:xfrm>
+          <a:prstGeom prst="rect">
+            <a:avLst/>
+          </a:prstGeom>
+        </p:spPr>
+        <p:txBody>
+          <a:bodyPr vert="horz" lIns="91440" tIns="45720" rIns="91440" bIns="45720" rtlCol="0">
+            <a:normAutofit/>
+          </a:bodyPr>
+          <a:lstStyle>
+            <a:lvl1pPr marL="228600" indent="-228600" algn="l" defTabSz="914400" rtl="0" eaLnBrk="1" latinLnBrk="1" hangingPunct="1">
+              <a:lnSpc>
+                <a:spcPct val="90000"/>
+              </a:lnSpc>
+              <a:spcBef>
+                <a:spcPts val="1000"/>
+              </a:spcBef>
+              <a:buFont typeface="Arial" panose="020B0604020202020204" pitchFamily="34" charset="0"/>
+              <a:buChar char="•"/>
+              <a:defRPr sz="2800" kern="1200">
+                <a:solidFill>
+                  <a:schemeClr val="tx1"/>
+                </a:solidFill>
+                <a:latin typeface="Sandoll 격동굴림" panose="020B0600000101010101" pitchFamily="34" charset="-127"/>
+                <a:ea typeface="Sandoll 격동굴림" panose="020B0600000101010101" pitchFamily="34" charset="-127"/>
+                <a:cs typeface="+mn-cs"/>
+              </a:defRPr>
+            </a:lvl1pPr>
+            <a:lvl2pPr marL="685800" indent="-228600" algn="l" defTabSz="914400" rtl="0" eaLnBrk="1" latinLnBrk="1" hangingPunct="1">
+              <a:lnSpc>
+                <a:spcPct val="90000"/>
+              </a:lnSpc>
+              <a:spcBef>
+                <a:spcPts val="500"/>
+              </a:spcBef>
+              <a:buFont typeface="Arial" panose="020B0604020202020204" pitchFamily="34" charset="0"/>
+              <a:buChar char="•"/>
+              <a:defRPr sz="2400" kern="1200">
+                <a:solidFill>
+                  <a:schemeClr val="tx1"/>
+                </a:solidFill>
+                <a:latin typeface="Sandoll 격동굴림" panose="020B0600000101010101" pitchFamily="34" charset="-127"/>
+                <a:ea typeface="Sandoll 격동굴림" panose="020B0600000101010101" pitchFamily="34" charset="-127"/>
+                <a:cs typeface="+mn-cs"/>
+              </a:defRPr>
+            </a:lvl2pPr>
+            <a:lvl3pPr marL="1143000" indent="-228600" algn="l" defTabSz="914400" rtl="0" eaLnBrk="1" latinLnBrk="1" hangingPunct="1">
+              <a:lnSpc>
+                <a:spcPct val="90000"/>
+              </a:lnSpc>
+              <a:spcBef>
+                <a:spcPts val="500"/>
+              </a:spcBef>
+              <a:buFont typeface="Arial" panose="020B0604020202020204" pitchFamily="34" charset="0"/>
+              <a:buChar char="•"/>
+              <a:defRPr sz="2000" kern="1200">
+                <a:solidFill>
+                  <a:schemeClr val="tx1"/>
+                </a:solidFill>
+                <a:latin typeface="Sandoll 격동굴림" panose="020B0600000101010101" pitchFamily="34" charset="-127"/>
+                <a:ea typeface="Sandoll 격동굴림" panose="020B0600000101010101" pitchFamily="34" charset="-127"/>
+                <a:cs typeface="+mn-cs"/>
+              </a:defRPr>
+            </a:lvl3pPr>
+            <a:lvl4pPr marL="1600200" indent="-228600" algn="l" defTabSz="914400" rtl="0" eaLnBrk="1" latinLnBrk="1" hangingPunct="1">
+              <a:lnSpc>
+                <a:spcPct val="90000"/>
+              </a:lnSpc>
+              <a:spcBef>
+                <a:spcPts val="500"/>
+              </a:spcBef>
+              <a:buFont typeface="Arial" panose="020B0604020202020204" pitchFamily="34" charset="0"/>
+              <a:buChar char="•"/>
+              <a:defRPr sz="1800" kern="1200">
+                <a:solidFill>
+                  <a:schemeClr val="tx1"/>
+                </a:solidFill>
+                <a:latin typeface="Sandoll 격동굴림" panose="020B0600000101010101" pitchFamily="34" charset="-127"/>
+                <a:ea typeface="Sandoll 격동굴림" panose="020B0600000101010101" pitchFamily="34" charset="-127"/>
+                <a:cs typeface="+mn-cs"/>
+              </a:defRPr>
+            </a:lvl4pPr>
+            <a:lvl5pPr marL="2057400" indent="-228600" algn="l" defTabSz="914400" rtl="0" eaLnBrk="1" latinLnBrk="1" hangingPunct="1">
+              <a:lnSpc>
+                <a:spcPct val="90000"/>
+              </a:lnSpc>
+              <a:spcBef>
+                <a:spcPts val="500"/>
+              </a:spcBef>
+              <a:buFont typeface="Arial" panose="020B0604020202020204" pitchFamily="34" charset="0"/>
+              <a:buChar char="•"/>
+              <a:defRPr sz="1800" kern="1200">
+                <a:solidFill>
+                  <a:schemeClr val="tx1"/>
+                </a:solidFill>
+                <a:latin typeface="Sandoll 격동굴림" panose="020B0600000101010101" pitchFamily="34" charset="-127"/>
+                <a:ea typeface="Sandoll 격동굴림" panose="020B0600000101010101" pitchFamily="34" charset="-127"/>
+                <a:cs typeface="+mn-cs"/>
+              </a:defRPr>
+            </a:lvl5pPr>
+            <a:lvl6pPr marL="2514600" indent="-228600" algn="l" defTabSz="914400" rtl="0" eaLnBrk="1" latinLnBrk="1" hangingPunct="1">
+              <a:lnSpc>
+                <a:spcPct val="90000"/>
+              </a:lnSpc>
+              <a:spcBef>
+                <a:spcPts val="500"/>
+              </a:spcBef>
+              <a:buFont typeface="Arial" panose="020B0604020202020204" pitchFamily="34" charset="0"/>
+              <a:buChar char="•"/>
+              <a:defRPr sz="1800" kern="1200">
+                <a:solidFill>
+                  <a:schemeClr val="tx1"/>
+                </a:solidFill>
+                <a:latin typeface="+mn-lt"/>
+                <a:ea typeface="+mn-ea"/>
+                <a:cs typeface="+mn-cs"/>
+              </a:defRPr>
+            </a:lvl6pPr>
+            <a:lvl7pPr marL="2971800" indent="-228600" algn="l" defTabSz="914400" rtl="0" eaLnBrk="1" latinLnBrk="1" hangingPunct="1">
+              <a:lnSpc>
+                <a:spcPct val="90000"/>
+              </a:lnSpc>
+              <a:spcBef>
+                <a:spcPts val="500"/>
+              </a:spcBef>
+              <a:buFont typeface="Arial" panose="020B0604020202020204" pitchFamily="34" charset="0"/>
+              <a:buChar char="•"/>
+              <a:defRPr sz="1800" kern="1200">
+                <a:solidFill>
+                  <a:schemeClr val="tx1"/>
+                </a:solidFill>
+                <a:latin typeface="+mn-lt"/>
+                <a:ea typeface="+mn-ea"/>
+                <a:cs typeface="+mn-cs"/>
+              </a:defRPr>
+            </a:lvl7pPr>
+            <a:lvl8pPr marL="3429000" indent="-228600" algn="l" defTabSz="914400" rtl="0" eaLnBrk="1" latinLnBrk="1" hangingPunct="1">
+              <a:lnSpc>
+                <a:spcPct val="90000"/>
+              </a:lnSpc>
+              <a:spcBef>
+                <a:spcPts val="500"/>
+              </a:spcBef>
+              <a:buFont typeface="Arial" panose="020B0604020202020204" pitchFamily="34" charset="0"/>
+              <a:buChar char="•"/>
+              <a:defRPr sz="1800" kern="1200">
+                <a:solidFill>
+                  <a:schemeClr val="tx1"/>
+                </a:solidFill>
+                <a:latin typeface="+mn-lt"/>
+                <a:ea typeface="+mn-ea"/>
+                <a:cs typeface="+mn-cs"/>
+              </a:defRPr>
+            </a:lvl8pPr>
+            <a:lvl9pPr marL="3886200" indent="-228600" algn="l" defTabSz="914400" rtl="0" eaLnBrk="1" latinLnBrk="1" hangingPunct="1">
+              <a:lnSpc>
+                <a:spcPct val="90000"/>
+              </a:lnSpc>
+              <a:spcBef>
+                <a:spcPts val="500"/>
+              </a:spcBef>
+              <a:buFont typeface="Arial" panose="020B0604020202020204" pitchFamily="34" charset="0"/>
+              <a:buChar char="•"/>
+              <a:defRPr sz="1800" kern="1200">
+                <a:solidFill>
+                  <a:schemeClr val="tx1"/>
+                </a:solidFill>
+                <a:latin typeface="+mn-lt"/>
+                <a:ea typeface="+mn-ea"/>
+                <a:cs typeface="+mn-cs"/>
+              </a:defRPr>
+            </a:lvl9pPr>
+          </a:lstStyle>
+          <a:p>
+            <a:pPr marL="0" indent="0">
+              <a:buFont typeface="Arial" panose="020B0604020202020204" pitchFamily="34" charset="0"/>
+              <a:buNone/>
+            </a:pPr>
+            <a:r>
+              <a:rPr lang="ko-KR" altLang="en-US"/>
+              <a:t>부스터존</a:t>
+            </a:r>
+            <a:endParaRPr lang="en-US" altLang="ko-KR"/>
+          </a:p>
+          <a:p>
+            <a:pPr>
+              <a:buFontTx/>
+              <a:buChar char="-"/>
+            </a:pPr>
+            <a:r>
+              <a:rPr lang="en-US" altLang="ko-KR" sz="1800"/>
+              <a:t>Ground </a:t>
+            </a:r>
+            <a:r>
+              <a:rPr lang="ko-KR" altLang="en-US" sz="1800"/>
+              <a:t>위</a:t>
+            </a:r>
+            <a:br>
+              <a:rPr lang="en-US" altLang="ko-KR" sz="1800"/>
+            </a:br>
+            <a:r>
+              <a:rPr lang="ko-KR" altLang="en-US" sz="1800"/>
+              <a:t>특정 위치에 설치됨</a:t>
+            </a:r>
+            <a:endParaRPr lang="en-US" altLang="ko-KR" sz="1800"/>
+          </a:p>
+          <a:p>
+            <a:pPr>
+              <a:buFontTx/>
+              <a:buChar char="-"/>
+            </a:pPr>
+            <a:r>
+              <a:rPr lang="ko-KR" altLang="en-US" sz="1800"/>
+              <a:t>존을 밟으면 화살표 방향으로 </a:t>
+            </a:r>
+            <a:br>
+              <a:rPr lang="en-US" altLang="ko-KR" sz="1800"/>
+            </a:br>
+            <a:r>
+              <a:rPr lang="ko-KR" altLang="en-US" sz="1800"/>
+              <a:t>순간 가속도를 얻음</a:t>
+            </a:r>
+            <a:endParaRPr lang="en-US" altLang="ko-KR" sz="1800"/>
+          </a:p>
+        </p:txBody>
+      </p:sp>
       <p:pic>
         <p:nvPicPr>
-          <p:cNvPr id="14" name="Picture 12" descr="리뷰] 우주로 날아간 카트라이더">
+          <p:cNvPr id="6" name="Picture 12" descr="리뷰] 우주로 날아간 카트라이더">
             <a:extLst>
               <a:ext uri="{FF2B5EF4-FFF2-40B4-BE49-F238E27FC236}">
-                <a16:creationId xmlns:a16="http://schemas.microsoft.com/office/drawing/2014/main" id="{41B0ABB3-69A0-4B66-9348-1A2FF0BC50CA}"/>
+                <a16:creationId xmlns:a16="http://schemas.microsoft.com/office/drawing/2014/main" id="{95F8CE46-43C4-4C89-834D-55874FA613B7}"/>
               </a:ext>
             </a:extLst>
           </p:cNvPr>
@@ -11310,19 +10709,19 @@
           <p:nvPr/>
         </p:nvPicPr>
         <p:blipFill rotWithShape="1">
-          <a:blip r:embed="rId5">
+          <a:blip r:embed="rId3">
             <a:extLst>
               <a:ext uri="{28A0092B-C50C-407E-A947-70E740481C1C}">
                 <a14:useLocalDpi xmlns:a14="http://schemas.microsoft.com/office/drawing/2010/main" val="0"/>
               </a:ext>
             </a:extLst>
           </a:blip>
-          <a:srcRect l="47110" t="132" r="6959" b="-132"/>
+          <a:srcRect r="54069"/>
           <a:stretch/>
         </p:blipFill>
         <p:spPr bwMode="auto">
           <a:xfrm>
-            <a:off x="6234676" y="1856572"/>
+            <a:off x="8717325" y="2019050"/>
             <a:ext cx="1749977" cy="2028825"/>
           </a:xfrm>
           <a:prstGeom prst="rect">
@@ -13554,19 +12953,11 @@
             </a:r>
             <a:r>
               <a:rPr lang="ko-KR" altLang="en-US"/>
-              <a:t>공굴리기 </a:t>
+              <a:t>롤링 스톤즈</a:t>
             </a:r>
             <a:r>
               <a:rPr lang="en-US" altLang="ko-KR"/>
-              <a:t>(</a:t>
-            </a:r>
-            <a:r>
-              <a:rPr lang="ko-KR" altLang="en-US"/>
-              <a:t>가제</a:t>
-            </a:r>
-            <a:r>
-              <a:rPr lang="en-US" altLang="ko-KR"/>
-              <a:t>)</a:t>
+              <a:t> </a:t>
             </a:r>
           </a:p>
           <a:p>

</xml_diff>